<commit_message>
-New perceptron python program
</commit_message>
<xml_diff>
--- a/Presentation/SDU_SummerSchool_Presentation.pptx
+++ b/Presentation/SDU_SummerSchool_Presentation.pptx
@@ -271,7 +271,7 @@
           <a:p>
             <a:fld id="{8173B6D1-B9A7-4F74-ADCF-EF56F696349F}" type="datetimeFigureOut">
               <a:rPr lang="it-IT" smtClean="0"/>
-              <a:t>08/08/2019</a:t>
+              <a:t>08/08/19</a:t>
             </a:fld>
             <a:endParaRPr lang="it-IT"/>
           </a:p>
@@ -325,7 +325,7 @@
           <a:p>
             <a:fld id="{37521F19-B39A-4CF3-8059-E7EF6E631AA0}" type="slidenum">
               <a:rPr lang="it-IT" smtClean="0"/>
-              <a:t>‹N›</a:t>
+              <a:t>‹#›</a:t>
             </a:fld>
             <a:endParaRPr lang="it-IT"/>
           </a:p>
@@ -469,7 +469,7 @@
           <a:p>
             <a:fld id="{8173B6D1-B9A7-4F74-ADCF-EF56F696349F}" type="datetimeFigureOut">
               <a:rPr lang="it-IT" smtClean="0"/>
-              <a:t>08/08/2019</a:t>
+              <a:t>08/08/19</a:t>
             </a:fld>
             <a:endParaRPr lang="it-IT"/>
           </a:p>
@@ -523,7 +523,7 @@
           <a:p>
             <a:fld id="{37521F19-B39A-4CF3-8059-E7EF6E631AA0}" type="slidenum">
               <a:rPr lang="it-IT" smtClean="0"/>
-              <a:t>‹N›</a:t>
+              <a:t>‹#›</a:t>
             </a:fld>
             <a:endParaRPr lang="it-IT"/>
           </a:p>
@@ -677,7 +677,7 @@
           <a:p>
             <a:fld id="{8173B6D1-B9A7-4F74-ADCF-EF56F696349F}" type="datetimeFigureOut">
               <a:rPr lang="it-IT" smtClean="0"/>
-              <a:t>08/08/2019</a:t>
+              <a:t>08/08/19</a:t>
             </a:fld>
             <a:endParaRPr lang="it-IT"/>
           </a:p>
@@ -731,7 +731,7 @@
           <a:p>
             <a:fld id="{37521F19-B39A-4CF3-8059-E7EF6E631AA0}" type="slidenum">
               <a:rPr lang="it-IT" smtClean="0"/>
-              <a:t>‹N›</a:t>
+              <a:t>‹#›</a:t>
             </a:fld>
             <a:endParaRPr lang="it-IT"/>
           </a:p>
@@ -875,7 +875,7 @@
           <a:p>
             <a:fld id="{8173B6D1-B9A7-4F74-ADCF-EF56F696349F}" type="datetimeFigureOut">
               <a:rPr lang="it-IT" smtClean="0"/>
-              <a:t>08/08/2019</a:t>
+              <a:t>08/08/19</a:t>
             </a:fld>
             <a:endParaRPr lang="it-IT"/>
           </a:p>
@@ -929,7 +929,7 @@
           <a:p>
             <a:fld id="{37521F19-B39A-4CF3-8059-E7EF6E631AA0}" type="slidenum">
               <a:rPr lang="it-IT" smtClean="0"/>
-              <a:t>‹N›</a:t>
+              <a:t>‹#›</a:t>
             </a:fld>
             <a:endParaRPr lang="it-IT"/>
           </a:p>
@@ -1150,7 +1150,7 @@
           <a:p>
             <a:fld id="{8173B6D1-B9A7-4F74-ADCF-EF56F696349F}" type="datetimeFigureOut">
               <a:rPr lang="it-IT" smtClean="0"/>
-              <a:t>08/08/2019</a:t>
+              <a:t>08/08/19</a:t>
             </a:fld>
             <a:endParaRPr lang="it-IT"/>
           </a:p>
@@ -1204,7 +1204,7 @@
           <a:p>
             <a:fld id="{37521F19-B39A-4CF3-8059-E7EF6E631AA0}" type="slidenum">
               <a:rPr lang="it-IT" smtClean="0"/>
-              <a:t>‹N›</a:t>
+              <a:t>‹#›</a:t>
             </a:fld>
             <a:endParaRPr lang="it-IT"/>
           </a:p>
@@ -1415,7 +1415,7 @@
           <a:p>
             <a:fld id="{8173B6D1-B9A7-4F74-ADCF-EF56F696349F}" type="datetimeFigureOut">
               <a:rPr lang="it-IT" smtClean="0"/>
-              <a:t>08/08/2019</a:t>
+              <a:t>08/08/19</a:t>
             </a:fld>
             <a:endParaRPr lang="it-IT"/>
           </a:p>
@@ -1469,7 +1469,7 @@
           <a:p>
             <a:fld id="{37521F19-B39A-4CF3-8059-E7EF6E631AA0}" type="slidenum">
               <a:rPr lang="it-IT" smtClean="0"/>
-              <a:t>‹N›</a:t>
+              <a:t>‹#›</a:t>
             </a:fld>
             <a:endParaRPr lang="it-IT"/>
           </a:p>
@@ -1827,7 +1827,7 @@
           <a:p>
             <a:fld id="{8173B6D1-B9A7-4F74-ADCF-EF56F696349F}" type="datetimeFigureOut">
               <a:rPr lang="it-IT" smtClean="0"/>
-              <a:t>08/08/2019</a:t>
+              <a:t>08/08/19</a:t>
             </a:fld>
             <a:endParaRPr lang="it-IT"/>
           </a:p>
@@ -1881,7 +1881,7 @@
           <a:p>
             <a:fld id="{37521F19-B39A-4CF3-8059-E7EF6E631AA0}" type="slidenum">
               <a:rPr lang="it-IT" smtClean="0"/>
-              <a:t>‹N›</a:t>
+              <a:t>‹#›</a:t>
             </a:fld>
             <a:endParaRPr lang="it-IT"/>
           </a:p>
@@ -1968,7 +1968,7 @@
           <a:p>
             <a:fld id="{8173B6D1-B9A7-4F74-ADCF-EF56F696349F}" type="datetimeFigureOut">
               <a:rPr lang="it-IT" smtClean="0"/>
-              <a:t>08/08/2019</a:t>
+              <a:t>08/08/19</a:t>
             </a:fld>
             <a:endParaRPr lang="it-IT"/>
           </a:p>
@@ -2022,7 +2022,7 @@
           <a:p>
             <a:fld id="{37521F19-B39A-4CF3-8059-E7EF6E631AA0}" type="slidenum">
               <a:rPr lang="it-IT" smtClean="0"/>
-              <a:t>‹N›</a:t>
+              <a:t>‹#›</a:t>
             </a:fld>
             <a:endParaRPr lang="it-IT"/>
           </a:p>
@@ -2081,7 +2081,7 @@
           <a:p>
             <a:fld id="{8173B6D1-B9A7-4F74-ADCF-EF56F696349F}" type="datetimeFigureOut">
               <a:rPr lang="it-IT" smtClean="0"/>
-              <a:t>08/08/2019</a:t>
+              <a:t>08/08/19</a:t>
             </a:fld>
             <a:endParaRPr lang="it-IT"/>
           </a:p>
@@ -2135,7 +2135,7 @@
           <a:p>
             <a:fld id="{37521F19-B39A-4CF3-8059-E7EF6E631AA0}" type="slidenum">
               <a:rPr lang="it-IT" smtClean="0"/>
-              <a:t>‹N›</a:t>
+              <a:t>‹#›</a:t>
             </a:fld>
             <a:endParaRPr lang="it-IT"/>
           </a:p>
@@ -2392,7 +2392,7 @@
           <a:p>
             <a:fld id="{8173B6D1-B9A7-4F74-ADCF-EF56F696349F}" type="datetimeFigureOut">
               <a:rPr lang="it-IT" smtClean="0"/>
-              <a:t>08/08/2019</a:t>
+              <a:t>08/08/19</a:t>
             </a:fld>
             <a:endParaRPr lang="it-IT"/>
           </a:p>
@@ -2446,7 +2446,7 @@
           <a:p>
             <a:fld id="{37521F19-B39A-4CF3-8059-E7EF6E631AA0}" type="slidenum">
               <a:rPr lang="it-IT" smtClean="0"/>
-              <a:t>‹N›</a:t>
+              <a:t>‹#›</a:t>
             </a:fld>
             <a:endParaRPr lang="it-IT"/>
           </a:p>
@@ -2680,7 +2680,7 @@
           <a:p>
             <a:fld id="{8173B6D1-B9A7-4F74-ADCF-EF56F696349F}" type="datetimeFigureOut">
               <a:rPr lang="it-IT" smtClean="0"/>
-              <a:t>08/08/2019</a:t>
+              <a:t>08/08/19</a:t>
             </a:fld>
             <a:endParaRPr lang="it-IT"/>
           </a:p>
@@ -2734,7 +2734,7 @@
           <a:p>
             <a:fld id="{37521F19-B39A-4CF3-8059-E7EF6E631AA0}" type="slidenum">
               <a:rPr lang="it-IT" smtClean="0"/>
-              <a:t>‹N›</a:t>
+              <a:t>‹#›</a:t>
             </a:fld>
             <a:endParaRPr lang="it-IT"/>
           </a:p>
@@ -2921,7 +2921,7 @@
           <a:p>
             <a:fld id="{8173B6D1-B9A7-4F74-ADCF-EF56F696349F}" type="datetimeFigureOut">
               <a:rPr lang="it-IT" smtClean="0"/>
-              <a:t>08/08/2019</a:t>
+              <a:t>08/08/19</a:t>
             </a:fld>
             <a:endParaRPr lang="it-IT"/>
           </a:p>
@@ -3011,7 +3011,7 @@
           <a:p>
             <a:fld id="{37521F19-B39A-4CF3-8059-E7EF6E631AA0}" type="slidenum">
               <a:rPr lang="it-IT" smtClean="0"/>
-              <a:t>‹N›</a:t>
+              <a:t>‹#›</a:t>
             </a:fld>
             <a:endParaRPr lang="it-IT"/>
           </a:p>
@@ -4820,6 +4820,43 @@
           <a:chExt cx="0" cy="0"/>
         </a:xfrm>
       </p:grpSpPr>
+      <p:pic>
+        <p:nvPicPr>
+          <p:cNvPr id="14" name="Picture 13">
+            <a:extLst>
+              <a:ext uri="{FF2B5EF4-FFF2-40B4-BE49-F238E27FC236}">
+                <a16:creationId xmlns:a16="http://schemas.microsoft.com/office/drawing/2014/main" id="{EDBA63DC-2BD3-894B-AA56-258568C68045}"/>
+              </a:ext>
+            </a:extLst>
+          </p:cNvPr>
+          <p:cNvPicPr>
+            <a:picLocks noChangeAspect="1"/>
+          </p:cNvPicPr>
+          <p:nvPr/>
+        </p:nvPicPr>
+        <p:blipFill>
+          <a:blip r:embed="rId2">
+            <a:alphaModFix amt="15000"/>
+            <a:extLst>
+              <a:ext uri="{28A0092B-C50C-407E-A947-70E740481C1C}">
+                <a14:useLocalDpi xmlns:a14="http://schemas.microsoft.com/office/drawing/2010/main" val="0"/>
+              </a:ext>
+            </a:extLst>
+          </a:blip>
+          <a:stretch>
+            <a:fillRect/>
+          </a:stretch>
+        </p:blipFill>
+        <p:spPr>
+          <a:xfrm>
+            <a:off x="4414469" y="-135467"/>
+            <a:ext cx="7494796" cy="6858000"/>
+          </a:xfrm>
+          <a:prstGeom prst="rect">
+            <a:avLst/>
+          </a:prstGeom>
+        </p:spPr>
+      </p:pic>
       <p:sp>
         <p:nvSpPr>
           <p:cNvPr id="2" name="Titolo 1">
@@ -4836,12 +4873,24 @@
             <p:ph type="title"/>
           </p:nvPr>
         </p:nvSpPr>
-        <p:spPr/>
+        <p:spPr>
+          <a:xfrm>
+            <a:off x="838200" y="365125"/>
+            <a:ext cx="10515600" cy="1325563"/>
+          </a:xfrm>
+        </p:spPr>
         <p:txBody>
           <a:bodyPr/>
           <a:lstStyle/>
           <a:p>
-            <a:endParaRPr lang="it-IT"/>
+            <a:r>
+              <a:rPr lang="it-IT" dirty="0" err="1"/>
+              <a:t>Experimental</a:t>
+            </a:r>
+            <a:r>
+              <a:rPr lang="it-IT" dirty="0"/>
+              <a:t> Setup</a:t>
+            </a:r>
           </a:p>
         </p:txBody>
       </p:sp>
@@ -4861,15 +4910,181 @@
             <p:ph idx="1"/>
           </p:nvPr>
         </p:nvSpPr>
-        <p:spPr/>
+        <p:spPr>
+          <a:xfrm>
+            <a:off x="838200" y="1825625"/>
+            <a:ext cx="10515600" cy="4351338"/>
+          </a:xfrm>
+        </p:spPr>
         <p:txBody>
           <a:bodyPr/>
           <a:lstStyle/>
           <a:p>
-            <a:endParaRPr lang="it-IT"/>
-          </a:p>
-        </p:txBody>
-      </p:sp>
+            <a:r>
+              <a:rPr lang="it-IT" dirty="0"/>
+              <a:t>RNG </a:t>
+            </a:r>
+            <a:r>
+              <a:rPr lang="it-IT" dirty="0" err="1"/>
+              <a:t>seed</a:t>
+            </a:r>
+            <a:r>
+              <a:rPr lang="it-IT" dirty="0"/>
+              <a:t> </a:t>
+            </a:r>
+            <a:r>
+              <a:rPr lang="it-IT" dirty="0" err="1"/>
+              <a:t>fixed</a:t>
+            </a:r>
+            <a:r>
+              <a:rPr lang="it-IT" dirty="0"/>
+              <a:t> </a:t>
+            </a:r>
+            <a:r>
+              <a:rPr lang="it-IT" dirty="0" err="1"/>
+              <a:t>at</a:t>
+            </a:r>
+            <a:r>
+              <a:rPr lang="it-IT" dirty="0"/>
+              <a:t> 420 for </a:t>
+            </a:r>
+            <a:r>
+              <a:rPr lang="it-IT" dirty="0" err="1"/>
+              <a:t>all</a:t>
+            </a:r>
+            <a:r>
+              <a:rPr lang="it-IT" dirty="0"/>
+              <a:t> </a:t>
+            </a:r>
+            <a:r>
+              <a:rPr lang="it-IT" dirty="0" err="1"/>
+              <a:t>runs</a:t>
+            </a:r>
+            <a:r>
+              <a:rPr lang="it-IT" dirty="0"/>
+              <a:t> </a:t>
+            </a:r>
+          </a:p>
+          <a:p>
+            <a:r>
+              <a:rPr lang="it-IT" dirty="0" err="1"/>
+              <a:t>Size</a:t>
+            </a:r>
+            <a:r>
+              <a:rPr lang="it-IT" dirty="0"/>
+              <a:t> of </a:t>
+            </a:r>
+            <a:r>
+              <a:rPr lang="it-IT" dirty="0" err="1"/>
+              <a:t>bandit</a:t>
+            </a:r>
+            <a:r>
+              <a:rPr lang="it-IT" dirty="0"/>
+              <a:t> </a:t>
+            </a:r>
+            <a:r>
+              <a:rPr lang="it-IT" dirty="0" err="1"/>
+              <a:t>reward</a:t>
+            </a:r>
+            <a:r>
+              <a:rPr lang="it-IT" dirty="0"/>
+              <a:t> </a:t>
+            </a:r>
+            <a:r>
+              <a:rPr lang="it-IT" dirty="0" err="1"/>
+              <a:t>interval</a:t>
+            </a:r>
+            <a:r>
+              <a:rPr lang="it-IT" dirty="0"/>
+              <a:t> </a:t>
+            </a:r>
+            <a:r>
+              <a:rPr lang="it-IT" dirty="0" err="1"/>
+              <a:t>fixed</a:t>
+            </a:r>
+            <a:r>
+              <a:rPr lang="it-IT" dirty="0"/>
+              <a:t> </a:t>
+            </a:r>
+            <a:r>
+              <a:rPr lang="it-IT" dirty="0" err="1"/>
+              <a:t>at</a:t>
+            </a:r>
+            <a:r>
+              <a:rPr lang="it-IT" dirty="0"/>
+              <a:t> 8</a:t>
+            </a:r>
+          </a:p>
+          <a:p>
+            <a:r>
+              <a:rPr lang="it-IT" dirty="0" err="1"/>
+              <a:t>Interval</a:t>
+            </a:r>
+            <a:r>
+              <a:rPr lang="it-IT" dirty="0"/>
+              <a:t> </a:t>
+            </a:r>
+            <a:r>
+              <a:rPr lang="it-IT" dirty="0" err="1"/>
+              <a:t>mean</a:t>
+            </a:r>
+            <a:r>
+              <a:rPr lang="it-IT" dirty="0"/>
+              <a:t> </a:t>
+            </a:r>
+            <a:r>
+              <a:rPr lang="it-IT" dirty="0" err="1"/>
+              <a:t>ranging</a:t>
+            </a:r>
+            <a:r>
+              <a:rPr lang="it-IT" dirty="0"/>
+              <a:t> from 0-5</a:t>
+            </a:r>
+          </a:p>
+          <a:p>
+            <a:endParaRPr lang="it-IT" dirty="0"/>
+          </a:p>
+          <a:p>
+            <a:endParaRPr lang="it-IT" dirty="0"/>
+          </a:p>
+        </p:txBody>
+      </p:sp>
+      <p:pic>
+        <p:nvPicPr>
+          <p:cNvPr id="16" name="Picture 15">
+            <a:extLst>
+              <a:ext uri="{FF2B5EF4-FFF2-40B4-BE49-F238E27FC236}">
+                <a16:creationId xmlns:a16="http://schemas.microsoft.com/office/drawing/2014/main" id="{CCEA52C2-5484-6642-B690-D16A97733E7C}"/>
+              </a:ext>
+            </a:extLst>
+          </p:cNvPr>
+          <p:cNvPicPr>
+            <a:picLocks noChangeAspect="1"/>
+          </p:cNvPicPr>
+          <p:nvPr/>
+        </p:nvPicPr>
+        <p:blipFill>
+          <a:blip r:embed="rId3">
+            <a:extLst>
+              <a:ext uri="{28A0092B-C50C-407E-A947-70E740481C1C}">
+                <a14:useLocalDpi xmlns:a14="http://schemas.microsoft.com/office/drawing/2010/main" val="0"/>
+              </a:ext>
+            </a:extLst>
+          </a:blip>
+          <a:stretch>
+            <a:fillRect/>
+          </a:stretch>
+        </p:blipFill>
+        <p:spPr>
+          <a:xfrm>
+            <a:off x="7945155" y="1690688"/>
+            <a:ext cx="647700" cy="682351"/>
+          </a:xfrm>
+          <a:prstGeom prst="rect">
+            <a:avLst/>
+          </a:prstGeom>
+        </p:spPr>
+      </p:pic>
     </p:spTree>
     <p:extLst>
       <p:ext uri="{BB962C8B-B14F-4D97-AF65-F5344CB8AC3E}">
@@ -6226,8 +6441,8 @@
           </a:p>
         </p:txBody>
       </p:sp>
-      <mc:AlternateContent xmlns:mc="http://schemas.openxmlformats.org/markup-compatibility/2006">
-        <mc:Choice xmlns:a14="http://schemas.microsoft.com/office/drawing/2010/main" Requires="a14">
+      <mc:AlternateContent xmlns:mc="http://schemas.openxmlformats.org/markup-compatibility/2006" xmlns:a14="http://schemas.microsoft.com/office/drawing/2010/main">
+        <mc:Choice Requires="a14">
           <p:sp>
             <p:nvSpPr>
               <p:cNvPr id="45" name="CasellaDiTesto 44">
@@ -6294,7 +6509,7 @@
             </p:txBody>
           </p:sp>
         </mc:Choice>
-        <mc:Fallback>
+        <mc:Fallback xmlns="">
           <p:sp>
             <p:nvSpPr>
               <p:cNvPr id="45" name="CasellaDiTesto 44">

</xml_diff>

<commit_message>
Add some stuffs to presentation and to perceptron algorithm
</commit_message>
<xml_diff>
--- a/Presentation/SDU_SummerSchool_Presentation.pptx
+++ b/Presentation/SDU_SummerSchool_Presentation.pptx
@@ -9,15 +9,16 @@
     <p:sldId id="257" r:id="rId3"/>
     <p:sldId id="259" r:id="rId4"/>
     <p:sldId id="258" r:id="rId5"/>
-    <p:sldId id="261" r:id="rId6"/>
-    <p:sldId id="260" r:id="rId7"/>
-    <p:sldId id="262" r:id="rId8"/>
-    <p:sldId id="263" r:id="rId9"/>
-    <p:sldId id="264" r:id="rId10"/>
-    <p:sldId id="265" r:id="rId11"/>
-    <p:sldId id="266" r:id="rId12"/>
-    <p:sldId id="268" r:id="rId13"/>
-    <p:sldId id="267" r:id="rId14"/>
+    <p:sldId id="260" r:id="rId6"/>
+    <p:sldId id="262" r:id="rId7"/>
+    <p:sldId id="263" r:id="rId8"/>
+    <p:sldId id="264" r:id="rId9"/>
+    <p:sldId id="265" r:id="rId10"/>
+    <p:sldId id="266" r:id="rId11"/>
+    <p:sldId id="268" r:id="rId12"/>
+    <p:sldId id="269" r:id="rId13"/>
+    <p:sldId id="270" r:id="rId14"/>
+    <p:sldId id="267" r:id="rId15"/>
   </p:sldIdLst>
   <p:sldSz cx="12192000" cy="6858000"/>
   <p:notesSz cx="6858000" cy="9144000"/>
@@ -271,7 +272,7 @@
           <a:p>
             <a:fld id="{8173B6D1-B9A7-4F74-ADCF-EF56F696349F}" type="datetimeFigureOut">
               <a:rPr lang="it-IT" smtClean="0"/>
-              <a:t>08/08/19</a:t>
+              <a:t>09/08/2019</a:t>
             </a:fld>
             <a:endParaRPr lang="it-IT"/>
           </a:p>
@@ -325,7 +326,7 @@
           <a:p>
             <a:fld id="{37521F19-B39A-4CF3-8059-E7EF6E631AA0}" type="slidenum">
               <a:rPr lang="it-IT" smtClean="0"/>
-              <a:t>‹#›</a:t>
+              <a:t>‹N›</a:t>
             </a:fld>
             <a:endParaRPr lang="it-IT"/>
           </a:p>
@@ -469,7 +470,7 @@
           <a:p>
             <a:fld id="{8173B6D1-B9A7-4F74-ADCF-EF56F696349F}" type="datetimeFigureOut">
               <a:rPr lang="it-IT" smtClean="0"/>
-              <a:t>08/08/19</a:t>
+              <a:t>09/08/2019</a:t>
             </a:fld>
             <a:endParaRPr lang="it-IT"/>
           </a:p>
@@ -523,7 +524,7 @@
           <a:p>
             <a:fld id="{37521F19-B39A-4CF3-8059-E7EF6E631AA0}" type="slidenum">
               <a:rPr lang="it-IT" smtClean="0"/>
-              <a:t>‹#›</a:t>
+              <a:t>‹N›</a:t>
             </a:fld>
             <a:endParaRPr lang="it-IT"/>
           </a:p>
@@ -677,7 +678,7 @@
           <a:p>
             <a:fld id="{8173B6D1-B9A7-4F74-ADCF-EF56F696349F}" type="datetimeFigureOut">
               <a:rPr lang="it-IT" smtClean="0"/>
-              <a:t>08/08/19</a:t>
+              <a:t>09/08/2019</a:t>
             </a:fld>
             <a:endParaRPr lang="it-IT"/>
           </a:p>
@@ -731,7 +732,7 @@
           <a:p>
             <a:fld id="{37521F19-B39A-4CF3-8059-E7EF6E631AA0}" type="slidenum">
               <a:rPr lang="it-IT" smtClean="0"/>
-              <a:t>‹#›</a:t>
+              <a:t>‹N›</a:t>
             </a:fld>
             <a:endParaRPr lang="it-IT"/>
           </a:p>
@@ -875,7 +876,7 @@
           <a:p>
             <a:fld id="{8173B6D1-B9A7-4F74-ADCF-EF56F696349F}" type="datetimeFigureOut">
               <a:rPr lang="it-IT" smtClean="0"/>
-              <a:t>08/08/19</a:t>
+              <a:t>09/08/2019</a:t>
             </a:fld>
             <a:endParaRPr lang="it-IT"/>
           </a:p>
@@ -929,7 +930,7 @@
           <a:p>
             <a:fld id="{37521F19-B39A-4CF3-8059-E7EF6E631AA0}" type="slidenum">
               <a:rPr lang="it-IT" smtClean="0"/>
-              <a:t>‹#›</a:t>
+              <a:t>‹N›</a:t>
             </a:fld>
             <a:endParaRPr lang="it-IT"/>
           </a:p>
@@ -1150,7 +1151,7 @@
           <a:p>
             <a:fld id="{8173B6D1-B9A7-4F74-ADCF-EF56F696349F}" type="datetimeFigureOut">
               <a:rPr lang="it-IT" smtClean="0"/>
-              <a:t>08/08/19</a:t>
+              <a:t>09/08/2019</a:t>
             </a:fld>
             <a:endParaRPr lang="it-IT"/>
           </a:p>
@@ -1204,7 +1205,7 @@
           <a:p>
             <a:fld id="{37521F19-B39A-4CF3-8059-E7EF6E631AA0}" type="slidenum">
               <a:rPr lang="it-IT" smtClean="0"/>
-              <a:t>‹#›</a:t>
+              <a:t>‹N›</a:t>
             </a:fld>
             <a:endParaRPr lang="it-IT"/>
           </a:p>
@@ -1415,7 +1416,7 @@
           <a:p>
             <a:fld id="{8173B6D1-B9A7-4F74-ADCF-EF56F696349F}" type="datetimeFigureOut">
               <a:rPr lang="it-IT" smtClean="0"/>
-              <a:t>08/08/19</a:t>
+              <a:t>09/08/2019</a:t>
             </a:fld>
             <a:endParaRPr lang="it-IT"/>
           </a:p>
@@ -1469,7 +1470,7 @@
           <a:p>
             <a:fld id="{37521F19-B39A-4CF3-8059-E7EF6E631AA0}" type="slidenum">
               <a:rPr lang="it-IT" smtClean="0"/>
-              <a:t>‹#›</a:t>
+              <a:t>‹N›</a:t>
             </a:fld>
             <a:endParaRPr lang="it-IT"/>
           </a:p>
@@ -1827,7 +1828,7 @@
           <a:p>
             <a:fld id="{8173B6D1-B9A7-4F74-ADCF-EF56F696349F}" type="datetimeFigureOut">
               <a:rPr lang="it-IT" smtClean="0"/>
-              <a:t>08/08/19</a:t>
+              <a:t>09/08/2019</a:t>
             </a:fld>
             <a:endParaRPr lang="it-IT"/>
           </a:p>
@@ -1881,7 +1882,7 @@
           <a:p>
             <a:fld id="{37521F19-B39A-4CF3-8059-E7EF6E631AA0}" type="slidenum">
               <a:rPr lang="it-IT" smtClean="0"/>
-              <a:t>‹#›</a:t>
+              <a:t>‹N›</a:t>
             </a:fld>
             <a:endParaRPr lang="it-IT"/>
           </a:p>
@@ -1968,7 +1969,7 @@
           <a:p>
             <a:fld id="{8173B6D1-B9A7-4F74-ADCF-EF56F696349F}" type="datetimeFigureOut">
               <a:rPr lang="it-IT" smtClean="0"/>
-              <a:t>08/08/19</a:t>
+              <a:t>09/08/2019</a:t>
             </a:fld>
             <a:endParaRPr lang="it-IT"/>
           </a:p>
@@ -2022,7 +2023,7 @@
           <a:p>
             <a:fld id="{37521F19-B39A-4CF3-8059-E7EF6E631AA0}" type="slidenum">
               <a:rPr lang="it-IT" smtClean="0"/>
-              <a:t>‹#›</a:t>
+              <a:t>‹N›</a:t>
             </a:fld>
             <a:endParaRPr lang="it-IT"/>
           </a:p>
@@ -2081,7 +2082,7 @@
           <a:p>
             <a:fld id="{8173B6D1-B9A7-4F74-ADCF-EF56F696349F}" type="datetimeFigureOut">
               <a:rPr lang="it-IT" smtClean="0"/>
-              <a:t>08/08/19</a:t>
+              <a:t>09/08/2019</a:t>
             </a:fld>
             <a:endParaRPr lang="it-IT"/>
           </a:p>
@@ -2135,7 +2136,7 @@
           <a:p>
             <a:fld id="{37521F19-B39A-4CF3-8059-E7EF6E631AA0}" type="slidenum">
               <a:rPr lang="it-IT" smtClean="0"/>
-              <a:t>‹#›</a:t>
+              <a:t>‹N›</a:t>
             </a:fld>
             <a:endParaRPr lang="it-IT"/>
           </a:p>
@@ -2392,7 +2393,7 @@
           <a:p>
             <a:fld id="{8173B6D1-B9A7-4F74-ADCF-EF56F696349F}" type="datetimeFigureOut">
               <a:rPr lang="it-IT" smtClean="0"/>
-              <a:t>08/08/19</a:t>
+              <a:t>09/08/2019</a:t>
             </a:fld>
             <a:endParaRPr lang="it-IT"/>
           </a:p>
@@ -2446,7 +2447,7 @@
           <a:p>
             <a:fld id="{37521F19-B39A-4CF3-8059-E7EF6E631AA0}" type="slidenum">
               <a:rPr lang="it-IT" smtClean="0"/>
-              <a:t>‹#›</a:t>
+              <a:t>‹N›</a:t>
             </a:fld>
             <a:endParaRPr lang="it-IT"/>
           </a:p>
@@ -2680,7 +2681,7 @@
           <a:p>
             <a:fld id="{8173B6D1-B9A7-4F74-ADCF-EF56F696349F}" type="datetimeFigureOut">
               <a:rPr lang="it-IT" smtClean="0"/>
-              <a:t>08/08/19</a:t>
+              <a:t>09/08/2019</a:t>
             </a:fld>
             <a:endParaRPr lang="it-IT"/>
           </a:p>
@@ -2734,7 +2735,7 @@
           <a:p>
             <a:fld id="{37521F19-B39A-4CF3-8059-E7EF6E631AA0}" type="slidenum">
               <a:rPr lang="it-IT" smtClean="0"/>
-              <a:t>‹#›</a:t>
+              <a:t>‹N›</a:t>
             </a:fld>
             <a:endParaRPr lang="it-IT"/>
           </a:p>
@@ -2921,7 +2922,7 @@
           <a:p>
             <a:fld id="{8173B6D1-B9A7-4F74-ADCF-EF56F696349F}" type="datetimeFigureOut">
               <a:rPr lang="it-IT" smtClean="0"/>
-              <a:t>08/08/19</a:t>
+              <a:t>09/08/2019</a:t>
             </a:fld>
             <a:endParaRPr lang="it-IT"/>
           </a:p>
@@ -3011,7 +3012,7 @@
           <a:p>
             <a:fld id="{37521F19-B39A-4CF3-8059-E7EF6E631AA0}" type="slidenum">
               <a:rPr lang="it-IT" smtClean="0"/>
-              <a:t>‹#›</a:t>
+              <a:t>‹N›</a:t>
             </a:fld>
             <a:endParaRPr lang="it-IT"/>
           </a:p>
@@ -3437,279 +3438,6 @@
           <p:cNvPr id="3" name="Segnaposto contenuto 2">
             <a:extLst>
               <a:ext uri="{FF2B5EF4-FFF2-40B4-BE49-F238E27FC236}">
-                <a16:creationId xmlns:a16="http://schemas.microsoft.com/office/drawing/2014/main" id="{1D362BC4-1F3D-48EC-B054-A15887D4BAD7}"/>
-              </a:ext>
-            </a:extLst>
-          </p:cNvPr>
-          <p:cNvSpPr>
-            <a:spLocks noGrp="1"/>
-          </p:cNvSpPr>
-          <p:nvPr>
-            <p:ph idx="1"/>
-          </p:nvPr>
-        </p:nvSpPr>
-        <p:spPr>
-          <a:xfrm>
-            <a:off x="838200" y="478302"/>
-            <a:ext cx="10515600" cy="5698661"/>
-          </a:xfrm>
-        </p:spPr>
-        <p:txBody>
-          <a:bodyPr/>
-          <a:lstStyle/>
-          <a:p>
-            <a:r>
-              <a:rPr lang="it-IT" dirty="0" err="1"/>
-              <a:t>Complex</a:t>
-            </a:r>
-            <a:r>
-              <a:rPr lang="it-IT" dirty="0"/>
-              <a:t> </a:t>
-            </a:r>
-            <a:r>
-              <a:rPr lang="it-IT" dirty="0" err="1"/>
-              <a:t>environment</a:t>
-            </a:r>
-            <a:endParaRPr lang="it-IT" dirty="0"/>
-          </a:p>
-          <a:p>
-            <a:endParaRPr lang="it-IT" dirty="0"/>
-          </a:p>
-          <a:p>
-            <a:endParaRPr lang="it-IT" dirty="0"/>
-          </a:p>
-          <a:p>
-            <a:endParaRPr lang="it-IT" dirty="0"/>
-          </a:p>
-          <a:p>
-            <a:pPr marL="0" indent="0">
-              <a:buNone/>
-            </a:pPr>
-            <a:endParaRPr lang="it-IT" dirty="0"/>
-          </a:p>
-          <a:p>
-            <a:pPr lvl="1"/>
-            <a:r>
-              <a:rPr lang="it-IT" dirty="0" err="1"/>
-              <a:t>Also</a:t>
-            </a:r>
-            <a:r>
-              <a:rPr lang="it-IT" dirty="0"/>
-              <a:t> in </a:t>
-            </a:r>
-            <a:r>
-              <a:rPr lang="it-IT" dirty="0" err="1"/>
-              <a:t>this</a:t>
-            </a:r>
-            <a:r>
-              <a:rPr lang="it-IT" dirty="0"/>
-              <a:t> case, for the first </a:t>
-            </a:r>
-            <a:r>
-              <a:rPr lang="it-IT" dirty="0" err="1"/>
-              <a:t>episode</a:t>
-            </a:r>
-            <a:r>
-              <a:rPr lang="it-IT" dirty="0"/>
-              <a:t>, agent </a:t>
-            </a:r>
-            <a:r>
-              <a:rPr lang="it-IT" dirty="0" err="1"/>
-              <a:t>bumps</a:t>
-            </a:r>
-            <a:endParaRPr lang="it-IT" dirty="0"/>
-          </a:p>
-          <a:p>
-            <a:pPr marL="457200" lvl="1" indent="0">
-              <a:buNone/>
-            </a:pPr>
-            <a:r>
-              <a:rPr lang="it-IT" dirty="0"/>
-              <a:t>   </a:t>
-            </a:r>
-            <a:r>
-              <a:rPr lang="it-IT" dirty="0" err="1"/>
-              <a:t>many</a:t>
-            </a:r>
-            <a:r>
-              <a:rPr lang="it-IT" dirty="0"/>
-              <a:t> times </a:t>
-            </a:r>
-            <a:r>
-              <a:rPr lang="it-IT" dirty="0" err="1"/>
-              <a:t>against</a:t>
-            </a:r>
-            <a:r>
-              <a:rPr lang="it-IT" dirty="0"/>
-              <a:t> a </a:t>
-            </a:r>
-            <a:r>
-              <a:rPr lang="it-IT" dirty="0" err="1"/>
-              <a:t>wall</a:t>
-            </a:r>
-            <a:r>
-              <a:rPr lang="it-IT" dirty="0"/>
-              <a:t>, </a:t>
-            </a:r>
-            <a:r>
-              <a:rPr lang="it-IT" dirty="0" err="1"/>
-              <a:t>obtaining</a:t>
-            </a:r>
-            <a:r>
-              <a:rPr lang="it-IT" dirty="0"/>
-              <a:t> at the end </a:t>
-            </a:r>
-            <a:r>
-              <a:rPr lang="it-IT" dirty="0" err="1"/>
-              <a:t>this</a:t>
-            </a:r>
-            <a:r>
-              <a:rPr lang="it-IT" dirty="0"/>
-              <a:t> </a:t>
-            </a:r>
-          </a:p>
-          <a:p>
-            <a:pPr marL="457200" lvl="1" indent="0">
-              <a:buNone/>
-            </a:pPr>
-            <a:r>
-              <a:rPr lang="it-IT" dirty="0"/>
-              <a:t>   Q-matrix</a:t>
-            </a:r>
-          </a:p>
-          <a:p>
-            <a:pPr marL="457200" lvl="1" indent="0">
-              <a:buNone/>
-            </a:pPr>
-            <a:endParaRPr lang="it-IT" dirty="0"/>
-          </a:p>
-          <a:p>
-            <a:pPr marL="457200" lvl="1" indent="0">
-              <a:buNone/>
-            </a:pPr>
-            <a:endParaRPr lang="it-IT" dirty="0"/>
-          </a:p>
-          <a:p>
-            <a:pPr marL="457200" lvl="1" indent="0">
-              <a:buNone/>
-            </a:pPr>
-            <a:endParaRPr lang="it-IT" dirty="0"/>
-          </a:p>
-          <a:p>
-            <a:pPr marL="457200" lvl="1" indent="0">
-              <a:buNone/>
-            </a:pPr>
-            <a:endParaRPr lang="it-IT" dirty="0"/>
-          </a:p>
-          <a:p>
-            <a:pPr marL="457200" lvl="1" indent="0">
-              <a:buNone/>
-            </a:pPr>
-            <a:endParaRPr lang="it-IT" dirty="0"/>
-          </a:p>
-          <a:p>
-            <a:pPr marL="457200" lvl="1" indent="0">
-              <a:buNone/>
-            </a:pPr>
-            <a:endParaRPr lang="it-IT" dirty="0"/>
-          </a:p>
-        </p:txBody>
-      </p:sp>
-      <p:pic>
-        <p:nvPicPr>
-          <p:cNvPr id="4" name="Immagine 3">
-            <a:extLst>
-              <a:ext uri="{FF2B5EF4-FFF2-40B4-BE49-F238E27FC236}">
-                <a16:creationId xmlns:a16="http://schemas.microsoft.com/office/drawing/2014/main" id="{CA8D9D73-0B0B-4233-8F6B-EFFCE3DBA5FE}"/>
-              </a:ext>
-            </a:extLst>
-          </p:cNvPr>
-          <p:cNvPicPr>
-            <a:picLocks noChangeAspect="1"/>
-          </p:cNvPicPr>
-          <p:nvPr/>
-        </p:nvPicPr>
-        <p:blipFill>
-          <a:blip r:embed="rId2"/>
-          <a:stretch>
-            <a:fillRect/>
-          </a:stretch>
-        </p:blipFill>
-        <p:spPr>
-          <a:xfrm>
-            <a:off x="9033436" y="681037"/>
-            <a:ext cx="2127080" cy="2948428"/>
-          </a:xfrm>
-          <a:prstGeom prst="rect">
-            <a:avLst/>
-          </a:prstGeom>
-        </p:spPr>
-      </p:pic>
-      <p:pic>
-        <p:nvPicPr>
-          <p:cNvPr id="5" name="Immagine 4">
-            <a:extLst>
-              <a:ext uri="{FF2B5EF4-FFF2-40B4-BE49-F238E27FC236}">
-                <a16:creationId xmlns:a16="http://schemas.microsoft.com/office/drawing/2014/main" id="{91D0C4D2-0374-4A8B-9114-AC9F57C6FD05}"/>
-              </a:ext>
-            </a:extLst>
-          </p:cNvPr>
-          <p:cNvPicPr>
-            <a:picLocks noChangeAspect="1"/>
-          </p:cNvPicPr>
-          <p:nvPr/>
-        </p:nvPicPr>
-        <p:blipFill>
-          <a:blip r:embed="rId3"/>
-          <a:stretch>
-            <a:fillRect/>
-          </a:stretch>
-        </p:blipFill>
-        <p:spPr>
-          <a:xfrm>
-            <a:off x="2924579" y="4028488"/>
-            <a:ext cx="8210080" cy="1725198"/>
-          </a:xfrm>
-          <a:prstGeom prst="rect">
-            <a:avLst/>
-          </a:prstGeom>
-        </p:spPr>
-      </p:pic>
-    </p:spTree>
-    <p:extLst>
-      <p:ext uri="{BB962C8B-B14F-4D97-AF65-F5344CB8AC3E}">
-        <p14:creationId xmlns:p14="http://schemas.microsoft.com/office/powerpoint/2010/main" val="942120346"/>
-      </p:ext>
-    </p:extLst>
-  </p:cSld>
-  <p:clrMapOvr>
-    <a:masterClrMapping/>
-  </p:clrMapOvr>
-</p:sld>
-</file>
-
-<file path=ppt/slides/slide11.xml><?xml version="1.0" encoding="utf-8"?>
-<p:sld xmlns:a="http://schemas.openxmlformats.org/drawingml/2006/main" xmlns:r="http://schemas.openxmlformats.org/officeDocument/2006/relationships" xmlns:p="http://schemas.openxmlformats.org/presentationml/2006/main">
-  <p:cSld>
-    <p:spTree>
-      <p:nvGrpSpPr>
-        <p:cNvPr id="1" name=""/>
-        <p:cNvGrpSpPr/>
-        <p:nvPr/>
-      </p:nvGrpSpPr>
-      <p:grpSpPr>
-        <a:xfrm>
-          <a:off x="0" y="0"/>
-          <a:ext cx="0" cy="0"/>
-          <a:chOff x="0" y="0"/>
-          <a:chExt cx="0" cy="0"/>
-        </a:xfrm>
-      </p:grpSpPr>
-      <p:sp>
-        <p:nvSpPr>
-          <p:cNvPr id="3" name="Segnaposto contenuto 2">
-            <a:extLst>
-              <a:ext uri="{FF2B5EF4-FFF2-40B4-BE49-F238E27FC236}">
                 <a16:creationId xmlns:a16="http://schemas.microsoft.com/office/drawing/2014/main" id="{F196954C-AC2A-4076-A82A-BAF5C6F71CF7}"/>
               </a:ext>
             </a:extLst>
@@ -3840,7 +3568,7 @@
 </p:sld>
 </file>
 
-<file path=ppt/slides/slide12.xml><?xml version="1.0" encoding="utf-8"?>
+<file path=ppt/slides/slide11.xml><?xml version="1.0" encoding="utf-8"?>
 <p:sld xmlns:a="http://schemas.openxmlformats.org/drawingml/2006/main" xmlns:r="http://schemas.openxmlformats.org/officeDocument/2006/relationships" xmlns:p="http://schemas.openxmlformats.org/presentationml/2006/main">
   <p:cSld>
     <p:spTree>
@@ -3857,32 +3585,534 @@
           <a:chExt cx="0" cy="0"/>
         </a:xfrm>
       </p:grpSpPr>
-      <p:sp>
-        <p:nvSpPr>
-          <p:cNvPr id="3" name="Segnaposto contenuto 2">
-            <a:extLst>
-              <a:ext uri="{FF2B5EF4-FFF2-40B4-BE49-F238E27FC236}">
-                <a16:creationId xmlns:a16="http://schemas.microsoft.com/office/drawing/2014/main" id="{5391224F-9AAE-4AA6-956F-14FA24BCDAE9}"/>
-              </a:ext>
-            </a:extLst>
-          </p:cNvPr>
-          <p:cNvSpPr>
-            <a:spLocks noGrp="1"/>
-          </p:cNvSpPr>
-          <p:nvPr>
-            <p:ph idx="1"/>
-          </p:nvPr>
-        </p:nvSpPr>
+      <mc:AlternateContent xmlns:mc="http://schemas.openxmlformats.org/markup-compatibility/2006">
+        <mc:Choice xmlns:a14="http://schemas.microsoft.com/office/drawing/2010/main" Requires="a14">
+          <p:sp>
+            <p:nvSpPr>
+              <p:cNvPr id="3" name="Segnaposto contenuto 2">
+                <a:extLst>
+                  <a:ext uri="{FF2B5EF4-FFF2-40B4-BE49-F238E27FC236}">
+                    <a16:creationId xmlns:a16="http://schemas.microsoft.com/office/drawing/2014/main" id="{5391224F-9AAE-4AA6-956F-14FA24BCDAE9}"/>
+                  </a:ext>
+                </a:extLst>
+              </p:cNvPr>
+              <p:cNvSpPr>
+                <a:spLocks noGrp="1"/>
+              </p:cNvSpPr>
+              <p:nvPr>
+                <p:ph idx="1"/>
+              </p:nvPr>
+            </p:nvSpPr>
+            <p:spPr>
+              <a:xfrm>
+                <a:off x="838200" y="548640"/>
+                <a:ext cx="10515600" cy="5628323"/>
+              </a:xfrm>
+            </p:spPr>
+            <p:txBody>
+              <a:bodyPr>
+                <a:normAutofit/>
+              </a:bodyPr>
+              <a:lstStyle/>
+              <a:p>
+                <a:r>
+                  <a:rPr lang="it-IT" dirty="0"/>
+                  <a:t>We </a:t>
+                </a:r>
+                <a:r>
+                  <a:rPr lang="it-IT" dirty="0" err="1"/>
+                  <a:t>also</a:t>
+                </a:r>
+                <a:r>
+                  <a:rPr lang="it-IT" dirty="0"/>
+                  <a:t> </a:t>
+                </a:r>
+                <a:r>
+                  <a:rPr lang="it-IT" dirty="0" err="1"/>
+                  <a:t>try</a:t>
+                </a:r>
+                <a:r>
+                  <a:rPr lang="it-IT" dirty="0"/>
+                  <a:t> to compare, with a simple plot, the sum of the </a:t>
+                </a:r>
+                <a:r>
+                  <a:rPr lang="it-IT" dirty="0" err="1"/>
+                  <a:t>reward</a:t>
+                </a:r>
+                <a:r>
+                  <a:rPr lang="it-IT" dirty="0"/>
+                  <a:t> </a:t>
+                </a:r>
+                <a:r>
+                  <a:rPr lang="it-IT" dirty="0" err="1"/>
+                  <a:t>obtained</a:t>
+                </a:r>
+                <a:r>
+                  <a:rPr lang="it-IT" dirty="0"/>
+                  <a:t> with </a:t>
+                </a:r>
+                <a:r>
+                  <a:rPr lang="it-IT" dirty="0" err="1"/>
+                  <a:t>different</a:t>
+                </a:r>
+                <a:r>
+                  <a:rPr lang="it-IT" dirty="0"/>
+                  <a:t> </a:t>
+                </a:r>
+                <a:r>
+                  <a:rPr lang="it-IT" dirty="0" err="1"/>
+                  <a:t>kind</a:t>
+                </a:r>
+                <a:r>
+                  <a:rPr lang="it-IT" dirty="0"/>
+                  <a:t> of setup (small or big </a:t>
+                </a:r>
+                <a:r>
+                  <a:rPr lang="it-IT" dirty="0" err="1"/>
+                  <a:t>environment</a:t>
+                </a:r>
+                <a:r>
+                  <a:rPr lang="it-IT" dirty="0"/>
+                  <a:t>, </a:t>
+                </a:r>
+                <a14:m>
+                  <m:oMath xmlns:m="http://schemas.openxmlformats.org/officeDocument/2006/math">
+                    <m:r>
+                      <a:rPr lang="it-IT" b="0" i="1" smtClean="0">
+                        <a:latin typeface="Cambria Math" panose="02040503050406030204" pitchFamily="18" charset="0"/>
+                      </a:rPr>
+                      <m:t>𝛼</m:t>
+                    </m:r>
+                    <m:r>
+                      <a:rPr lang="it-IT" b="0" i="1" smtClean="0">
+                        <a:latin typeface="Cambria Math" panose="02040503050406030204" pitchFamily="18" charset="0"/>
+                      </a:rPr>
+                      <m:t>,</m:t>
+                    </m:r>
+                    <m:r>
+                      <a:rPr lang="it-IT" b="0" i="1" smtClean="0">
+                        <a:latin typeface="Cambria Math" panose="02040503050406030204" pitchFamily="18" charset="0"/>
+                      </a:rPr>
+                      <m:t>𝛾</m:t>
+                    </m:r>
+                    <m:r>
+                      <a:rPr lang="it-IT" b="0" i="1" smtClean="0">
+                        <a:latin typeface="Cambria Math" panose="02040503050406030204" pitchFamily="18" charset="0"/>
+                      </a:rPr>
+                      <m:t>,</m:t>
+                    </m:r>
+                    <m:r>
+                      <a:rPr lang="it-IT" b="0" i="1" smtClean="0">
+                        <a:latin typeface="Cambria Math" panose="02040503050406030204" pitchFamily="18" charset="0"/>
+                      </a:rPr>
+                      <m:t>𝜖</m:t>
+                    </m:r>
+                  </m:oMath>
+                </a14:m>
+                <a:r>
+                  <a:rPr lang="it-IT" dirty="0"/>
+                  <a:t>)</a:t>
+                </a:r>
+              </a:p>
+              <a:p>
+                <a:endParaRPr lang="it-IT" dirty="0"/>
+              </a:p>
+              <a:p>
+                <a:endParaRPr lang="it-IT" dirty="0"/>
+              </a:p>
+              <a:p>
+                <a:endParaRPr lang="it-IT" dirty="0"/>
+              </a:p>
+              <a:p>
+                <a:endParaRPr lang="it-IT" dirty="0"/>
+              </a:p>
+              <a:p>
+                <a:endParaRPr lang="it-IT" dirty="0"/>
+              </a:p>
+              <a:p>
+                <a:endParaRPr lang="it-IT" dirty="0"/>
+              </a:p>
+              <a:p>
+                <a:endParaRPr lang="it-IT" dirty="0"/>
+              </a:p>
+              <a:p>
+                <a:endParaRPr lang="it-IT" dirty="0"/>
+              </a:p>
+              <a:p>
+                <a:pPr marL="0" indent="0">
+                  <a:buNone/>
+                </a:pPr>
+                <a:endParaRPr lang="it-IT" dirty="0"/>
+              </a:p>
+              <a:p>
+                <a:pPr marL="0" indent="0">
+                  <a:buNone/>
+                </a:pPr>
+                <a:endParaRPr lang="it-IT" dirty="0"/>
+              </a:p>
+              <a:p>
+                <a:pPr marL="0" indent="0">
+                  <a:buNone/>
+                </a:pPr>
+                <a:endParaRPr lang="it-IT" dirty="0"/>
+              </a:p>
+            </p:txBody>
+          </p:sp>
+        </mc:Choice>
+        <mc:Fallback>
+          <p:sp>
+            <p:nvSpPr>
+              <p:cNvPr id="3" name="Segnaposto contenuto 2">
+                <a:extLst>
+                  <a:ext uri="{FF2B5EF4-FFF2-40B4-BE49-F238E27FC236}">
+                    <a16:creationId xmlns:a16="http://schemas.microsoft.com/office/drawing/2014/main" id="{5391224F-9AAE-4AA6-956F-14FA24BCDAE9}"/>
+                  </a:ext>
+                </a:extLst>
+              </p:cNvPr>
+              <p:cNvSpPr>
+                <a:spLocks noGrp="1" noRot="1" noChangeAspect="1" noMove="1" noResize="1" noEditPoints="1" noAdjustHandles="1" noChangeArrowheads="1" noChangeShapeType="1" noTextEdit="1"/>
+              </p:cNvSpPr>
+              <p:nvPr>
+                <p:ph idx="1"/>
+              </p:nvPr>
+            </p:nvSpPr>
+            <p:spPr>
+              <a:xfrm>
+                <a:off x="838200" y="548640"/>
+                <a:ext cx="10515600" cy="5628323"/>
+              </a:xfrm>
+              <a:blipFill>
+                <a:blip r:embed="rId2"/>
+                <a:stretch>
+                  <a:fillRect l="-1043" t="-1733"/>
+                </a:stretch>
+              </a:blipFill>
+            </p:spPr>
+            <p:txBody>
+              <a:bodyPr/>
+              <a:lstStyle/>
+              <a:p>
+                <a:r>
+                  <a:rPr lang="it-IT">
+                    <a:noFill/>
+                  </a:rPr>
+                  <a:t> </a:t>
+                </a:r>
+              </a:p>
+            </p:txBody>
+          </p:sp>
+        </mc:Fallback>
+      </mc:AlternateContent>
+      <p:pic>
+        <p:nvPicPr>
+          <p:cNvPr id="2" name="Immagine 1">
+            <a:extLst>
+              <a:ext uri="{FF2B5EF4-FFF2-40B4-BE49-F238E27FC236}">
+                <a16:creationId xmlns:a16="http://schemas.microsoft.com/office/drawing/2014/main" id="{05763AD2-E8B0-46FD-B4A1-FB2B077536F9}"/>
+              </a:ext>
+            </a:extLst>
+          </p:cNvPr>
+          <p:cNvPicPr>
+            <a:picLocks noChangeAspect="1"/>
+          </p:cNvPicPr>
+          <p:nvPr/>
+        </p:nvPicPr>
+        <p:blipFill>
+          <a:blip r:embed="rId3"/>
+          <a:stretch>
+            <a:fillRect/>
+          </a:stretch>
+        </p:blipFill>
         <p:spPr>
           <a:xfrm>
-            <a:off x="838200" y="548640"/>
-            <a:ext cx="10515600" cy="5628323"/>
+            <a:off x="838200" y="2098582"/>
+            <a:ext cx="4428691" cy="3349430"/>
           </a:xfrm>
+          <a:prstGeom prst="rect">
+            <a:avLst/>
+          </a:prstGeom>
         </p:spPr>
-        <p:txBody>
-          <a:bodyPr/>
+      </p:pic>
+      <p:sp>
+        <p:nvSpPr>
+          <p:cNvPr id="4" name="CasellaDiTesto 3">
+            <a:extLst>
+              <a:ext uri="{FF2B5EF4-FFF2-40B4-BE49-F238E27FC236}">
+                <a16:creationId xmlns:a16="http://schemas.microsoft.com/office/drawing/2014/main" id="{19BF8861-2EBB-4162-9B8F-5C50AA103FB0}"/>
+              </a:ext>
+            </a:extLst>
+          </p:cNvPr>
+          <p:cNvSpPr txBox="1"/>
+          <p:nvPr/>
+        </p:nvSpPr>
+        <p:spPr>
+          <a:xfrm>
+            <a:off x="2076989" y="5656700"/>
+            <a:ext cx="1951112" cy="369332"/>
+          </a:xfrm>
+          <a:prstGeom prst="rect">
+            <a:avLst/>
+          </a:prstGeom>
+          <a:noFill/>
+        </p:spPr>
+        <p:txBody>
+          <a:bodyPr wrap="none" rtlCol="0">
+            <a:spAutoFit/>
+          </a:bodyPr>
           <a:lstStyle/>
           <a:p>
+            <a:r>
+              <a:rPr lang="it-IT" dirty="0"/>
+              <a:t>Small </a:t>
+            </a:r>
+            <a:r>
+              <a:rPr lang="it-IT" dirty="0" err="1"/>
+              <a:t>environment</a:t>
+            </a:r>
+            <a:endParaRPr lang="it-IT" dirty="0"/>
+          </a:p>
+        </p:txBody>
+      </p:sp>
+      <p:pic>
+        <p:nvPicPr>
+          <p:cNvPr id="5" name="Immagine 4">
+            <a:extLst>
+              <a:ext uri="{FF2B5EF4-FFF2-40B4-BE49-F238E27FC236}">
+                <a16:creationId xmlns:a16="http://schemas.microsoft.com/office/drawing/2014/main" id="{6EFDB1B7-6DD6-43AE-8966-B37F4D913EAC}"/>
+              </a:ext>
+            </a:extLst>
+          </p:cNvPr>
+          <p:cNvPicPr>
+            <a:picLocks noChangeAspect="1"/>
+          </p:cNvPicPr>
+          <p:nvPr/>
+        </p:nvPicPr>
+        <p:blipFill>
+          <a:blip r:embed="rId4"/>
+          <a:stretch>
+            <a:fillRect/>
+          </a:stretch>
+        </p:blipFill>
+        <p:spPr>
+          <a:xfrm>
+            <a:off x="6420296" y="2098582"/>
+            <a:ext cx="4299286" cy="3349430"/>
+          </a:xfrm>
+          <a:prstGeom prst="rect">
+            <a:avLst/>
+          </a:prstGeom>
+        </p:spPr>
+      </p:pic>
+      <p:sp>
+        <p:nvSpPr>
+          <p:cNvPr id="6" name="CasellaDiTesto 5">
+            <a:extLst>
+              <a:ext uri="{FF2B5EF4-FFF2-40B4-BE49-F238E27FC236}">
+                <a16:creationId xmlns:a16="http://schemas.microsoft.com/office/drawing/2014/main" id="{EA55F1B8-DBBA-4DEE-B757-EF2E7752059B}"/>
+              </a:ext>
+            </a:extLst>
+          </p:cNvPr>
+          <p:cNvSpPr txBox="1"/>
+          <p:nvPr/>
+        </p:nvSpPr>
+        <p:spPr>
+          <a:xfrm>
+            <a:off x="7704189" y="5655212"/>
+            <a:ext cx="1731500" cy="369332"/>
+          </a:xfrm>
+          <a:prstGeom prst="rect">
+            <a:avLst/>
+          </a:prstGeom>
+          <a:noFill/>
+        </p:spPr>
+        <p:txBody>
+          <a:bodyPr wrap="none" rtlCol="0">
+            <a:spAutoFit/>
+          </a:bodyPr>
+          <a:lstStyle/>
+          <a:p>
+            <a:r>
+              <a:rPr lang="it-IT" dirty="0"/>
+              <a:t>Big </a:t>
+            </a:r>
+            <a:r>
+              <a:rPr lang="it-IT" dirty="0" err="1"/>
+              <a:t>environment</a:t>
+            </a:r>
+            <a:endParaRPr lang="it-IT" dirty="0"/>
+          </a:p>
+        </p:txBody>
+      </p:sp>
+      <p:sp>
+        <p:nvSpPr>
+          <p:cNvPr id="7" name="CasellaDiTesto 6">
+            <a:extLst>
+              <a:ext uri="{FF2B5EF4-FFF2-40B4-BE49-F238E27FC236}">
+                <a16:creationId xmlns:a16="http://schemas.microsoft.com/office/drawing/2014/main" id="{5AB4A33C-83CB-4267-AF99-D186B84D2108}"/>
+              </a:ext>
+            </a:extLst>
+          </p:cNvPr>
+          <p:cNvSpPr txBox="1"/>
+          <p:nvPr/>
+        </p:nvSpPr>
+        <p:spPr>
+          <a:xfrm>
+            <a:off x="838200" y="6110423"/>
+            <a:ext cx="9597114" cy="646331"/>
+          </a:xfrm>
+          <a:prstGeom prst="rect">
+            <a:avLst/>
+          </a:prstGeom>
+          <a:noFill/>
+        </p:spPr>
+        <p:txBody>
+          <a:bodyPr wrap="none" rtlCol="0">
+            <a:spAutoFit/>
+          </a:bodyPr>
+          <a:lstStyle/>
+          <a:p>
+            <a:r>
+              <a:rPr lang="it-IT" dirty="0" err="1"/>
+              <a:t>We</a:t>
+            </a:r>
+            <a:r>
+              <a:rPr lang="it-IT" dirty="0"/>
+              <a:t> can </a:t>
+            </a:r>
+            <a:r>
+              <a:rPr lang="it-IT" dirty="0" err="1"/>
+              <a:t>notice</a:t>
+            </a:r>
+            <a:r>
+              <a:rPr lang="it-IT" dirty="0"/>
+              <a:t> </a:t>
+            </a:r>
+            <a:r>
+              <a:rPr lang="it-IT" dirty="0" err="1"/>
+              <a:t>how</a:t>
+            </a:r>
+            <a:r>
+              <a:rPr lang="it-IT" dirty="0"/>
+              <a:t>, for the </a:t>
+            </a:r>
+            <a:r>
+              <a:rPr lang="it-IT" dirty="0" err="1"/>
+              <a:t>complex</a:t>
+            </a:r>
+            <a:r>
+              <a:rPr lang="it-IT" dirty="0"/>
+              <a:t> </a:t>
+            </a:r>
+            <a:r>
+              <a:rPr lang="it-IT" dirty="0" err="1"/>
+              <a:t>environment</a:t>
+            </a:r>
+            <a:r>
+              <a:rPr lang="it-IT" dirty="0"/>
+              <a:t>, </a:t>
+            </a:r>
+            <a:r>
+              <a:rPr lang="it-IT" dirty="0" err="1"/>
+              <a:t>at</a:t>
+            </a:r>
+            <a:r>
+              <a:rPr lang="it-IT" dirty="0"/>
+              <a:t> the start of the </a:t>
+            </a:r>
+            <a:r>
+              <a:rPr lang="it-IT" dirty="0" err="1"/>
+              <a:t>algorithm</a:t>
+            </a:r>
+            <a:r>
+              <a:rPr lang="it-IT" dirty="0"/>
+              <a:t>, </a:t>
+            </a:r>
+            <a:r>
+              <a:rPr lang="it-IT" dirty="0" err="1"/>
+              <a:t>it</a:t>
+            </a:r>
+            <a:r>
+              <a:rPr lang="it-IT" dirty="0"/>
+              <a:t> takes a </a:t>
+            </a:r>
+            <a:r>
+              <a:rPr lang="it-IT" dirty="0" err="1"/>
+              <a:t>lot</a:t>
+            </a:r>
+            <a:r>
+              <a:rPr lang="it-IT" dirty="0"/>
+              <a:t> of </a:t>
+            </a:r>
+            <a:r>
+              <a:rPr lang="it-IT" dirty="0" err="1"/>
+              <a:t>error</a:t>
+            </a:r>
+            <a:r>
+              <a:rPr lang="it-IT" dirty="0"/>
+              <a:t> </a:t>
+            </a:r>
+          </a:p>
+          <a:p>
+            <a:r>
+              <a:rPr lang="it-IT" dirty="0" err="1"/>
+              <a:t>before</a:t>
+            </a:r>
+            <a:r>
+              <a:rPr lang="it-IT" dirty="0"/>
+              <a:t> </a:t>
+            </a:r>
+            <a:r>
+              <a:rPr lang="it-IT" dirty="0" err="1"/>
+              <a:t>getting</a:t>
+            </a:r>
+            <a:r>
+              <a:rPr lang="it-IT" dirty="0"/>
+              <a:t> </a:t>
+            </a:r>
+            <a:r>
+              <a:rPr lang="it-IT" dirty="0" err="1"/>
+              <a:t>convergence</a:t>
+            </a:r>
+            <a:r>
+              <a:rPr lang="it-IT" dirty="0"/>
+              <a:t>  </a:t>
+            </a:r>
+            <a:r>
+              <a:rPr lang="it-IT" dirty="0" err="1"/>
+              <a:t>without</a:t>
+            </a:r>
+            <a:r>
+              <a:rPr lang="it-IT" dirty="0"/>
+              <a:t> </a:t>
+            </a:r>
+            <a:r>
+              <a:rPr lang="it-IT" dirty="0" err="1"/>
+              <a:t>any</a:t>
+            </a:r>
+            <a:r>
+              <a:rPr lang="it-IT" dirty="0"/>
+              <a:t> </a:t>
+            </a:r>
+            <a:r>
+              <a:rPr lang="it-IT" dirty="0" err="1"/>
+              <a:t>errors</a:t>
+            </a:r>
+            <a:r>
+              <a:rPr lang="it-IT" dirty="0"/>
+              <a:t> </a:t>
+            </a:r>
+            <a:r>
+              <a:rPr lang="it-IT" dirty="0" err="1"/>
+              <a:t>during</a:t>
+            </a:r>
+            <a:r>
+              <a:rPr lang="it-IT" dirty="0"/>
+              <a:t> the </a:t>
+            </a:r>
+            <a:r>
+              <a:rPr lang="it-IT" dirty="0" err="1"/>
+              <a:t>path</a:t>
+            </a:r>
             <a:endParaRPr lang="it-IT" dirty="0"/>
           </a:p>
         </p:txBody>
@@ -3891,6 +4121,349 @@
     <p:extLst>
       <p:ext uri="{BB962C8B-B14F-4D97-AF65-F5344CB8AC3E}">
         <p14:creationId xmlns:p14="http://schemas.microsoft.com/office/powerpoint/2010/main" val="2952948052"/>
+      </p:ext>
+    </p:extLst>
+  </p:cSld>
+  <p:clrMapOvr>
+    <a:masterClrMapping/>
+  </p:clrMapOvr>
+</p:sld>
+</file>
+
+<file path=ppt/slides/slide12.xml><?xml version="1.0" encoding="utf-8"?>
+<p:sld xmlns:a="http://schemas.openxmlformats.org/drawingml/2006/main" xmlns:r="http://schemas.openxmlformats.org/officeDocument/2006/relationships" xmlns:p="http://schemas.openxmlformats.org/presentationml/2006/main">
+  <p:cSld>
+    <p:bg>
+      <p:bgPr>
+        <a:solidFill>
+          <a:schemeClr val="bg1"/>
+        </a:solidFill>
+        <a:effectLst/>
+      </p:bgPr>
+    </p:bg>
+    <p:spTree>
+      <p:nvGrpSpPr>
+        <p:cNvPr id="1" name=""/>
+        <p:cNvGrpSpPr/>
+        <p:nvPr/>
+      </p:nvGrpSpPr>
+      <p:grpSpPr>
+        <a:xfrm>
+          <a:off x="0" y="0"/>
+          <a:ext cx="0" cy="0"/>
+          <a:chOff x="0" y="0"/>
+          <a:chExt cx="0" cy="0"/>
+        </a:xfrm>
+      </p:grpSpPr>
+      <p:cxnSp>
+        <p:nvCxnSpPr>
+          <p:cNvPr id="21" name="Straight Connector 20">
+            <a:extLst>
+              <a:ext uri="{FF2B5EF4-FFF2-40B4-BE49-F238E27FC236}">
+                <a16:creationId xmlns:a16="http://schemas.microsoft.com/office/drawing/2014/main" id="{DB146403-F3D6-484B-B2ED-97F9565D0370}"/>
+              </a:ext>
+              <a:ext uri="{C183D7F6-B498-43B3-948B-1728B52AA6E4}">
+                <adec:decorative xmlns:adec="http://schemas.microsoft.com/office/drawing/2017/decorative" val="1"/>
+              </a:ext>
+            </a:extLst>
+          </p:cNvPr>
+          <p:cNvCxnSpPr>
+            <a:cxnSpLocks noGrp="1" noRot="1" noChangeAspect="1" noMove="1" noResize="1" noEditPoints="1" noAdjustHandles="1" noChangeArrowheads="1" noChangeShapeType="1"/>
+          </p:cNvCxnSpPr>
+          <p:nvPr>
+            <p:extLst>
+              <p:ext uri="{386F3935-93C4-4BCD-93E2-E3B085C9AB24}">
+                <p16:designElem xmlns:p16="http://schemas.microsoft.com/office/powerpoint/2015/main" val="1"/>
+              </p:ext>
+            </p:extLst>
+          </p:nvPr>
+        </p:nvCxnSpPr>
+        <p:spPr>
+          <a:xfrm>
+            <a:off x="6096000" y="477749"/>
+            <a:ext cx="0" cy="3657600"/>
+          </a:xfrm>
+          <a:prstGeom prst="line">
+            <a:avLst/>
+          </a:prstGeom>
+          <a:ln w="101600" cmpd="dbl">
+            <a:solidFill>
+              <a:srgbClr val="595959"/>
+            </a:solidFill>
+          </a:ln>
+        </p:spPr>
+        <p:style>
+          <a:lnRef idx="1">
+            <a:schemeClr val="accent1"/>
+          </a:lnRef>
+          <a:fillRef idx="0">
+            <a:schemeClr val="accent1"/>
+          </a:fillRef>
+          <a:effectRef idx="0">
+            <a:schemeClr val="accent1"/>
+          </a:effectRef>
+          <a:fontRef idx="minor">
+            <a:schemeClr val="tx1"/>
+          </a:fontRef>
+        </p:style>
+      </p:cxnSp>
+      <p:sp>
+        <p:nvSpPr>
+          <p:cNvPr id="23" name="Rectangle 22">
+            <a:extLst>
+              <a:ext uri="{FF2B5EF4-FFF2-40B4-BE49-F238E27FC236}">
+                <a16:creationId xmlns:a16="http://schemas.microsoft.com/office/drawing/2014/main" id="{823AC064-BC96-4F32-8AE1-B2FD38754823}"/>
+              </a:ext>
+              <a:ext uri="{C183D7F6-B498-43B3-948B-1728B52AA6E4}">
+                <adec:decorative xmlns:adec="http://schemas.microsoft.com/office/drawing/2017/decorative" val="1"/>
+              </a:ext>
+            </a:extLst>
+          </p:cNvPr>
+          <p:cNvSpPr>
+            <a:spLocks noGrp="1" noRot="1" noChangeAspect="1" noMove="1" noResize="1" noEditPoints="1" noAdjustHandles="1" noChangeArrowheads="1" noChangeShapeType="1" noTextEdit="1"/>
+          </p:cNvSpPr>
+          <p:nvPr>
+            <p:extLst>
+              <p:ext uri="{386F3935-93C4-4BCD-93E2-E3B085C9AB24}">
+                <p16:designElem xmlns:p16="http://schemas.microsoft.com/office/powerpoint/2015/main" val="1"/>
+              </p:ext>
+            </p:extLst>
+          </p:nvPr>
+        </p:nvSpPr>
+        <p:spPr bwMode="ltGray">
+          <a:xfrm>
+            <a:off x="378068" y="4633546"/>
+            <a:ext cx="11438793" cy="1844256"/>
+          </a:xfrm>
+          <a:prstGeom prst="rect">
+            <a:avLst/>
+          </a:prstGeom>
+          <a:solidFill>
+            <a:srgbClr val="404040"/>
+          </a:solidFill>
+          <a:ln w="127000" cap="sq" cmpd="thinThick">
+            <a:solidFill>
+              <a:srgbClr val="404040"/>
+            </a:solidFill>
+          </a:ln>
+        </p:spPr>
+        <p:style>
+          <a:lnRef idx="2">
+            <a:schemeClr val="accent1">
+              <a:shade val="50000"/>
+            </a:schemeClr>
+          </a:lnRef>
+          <a:fillRef idx="1">
+            <a:schemeClr val="accent1"/>
+          </a:fillRef>
+          <a:effectRef idx="0">
+            <a:schemeClr val="accent1"/>
+          </a:effectRef>
+          <a:fontRef idx="minor">
+            <a:schemeClr val="lt1"/>
+          </a:fontRef>
+        </p:style>
+        <p:txBody>
+          <a:bodyPr rtlCol="0" anchor="ctr"/>
+          <a:lstStyle/>
+          <a:p>
+            <a:pPr algn="ctr"/>
+            <a:endParaRPr lang="en-US"/>
+          </a:p>
+        </p:txBody>
+      </p:sp>
+      <p:sp>
+        <p:nvSpPr>
+          <p:cNvPr id="5" name="CasellaDiTesto 4">
+            <a:extLst>
+              <a:ext uri="{FF2B5EF4-FFF2-40B4-BE49-F238E27FC236}">
+                <a16:creationId xmlns:a16="http://schemas.microsoft.com/office/drawing/2014/main" id="{E8E11B47-AF0B-4BB8-A4DF-8E2E389A382F}"/>
+              </a:ext>
+            </a:extLst>
+          </p:cNvPr>
+          <p:cNvSpPr txBox="1"/>
+          <p:nvPr/>
+        </p:nvSpPr>
+        <p:spPr>
+          <a:xfrm>
+            <a:off x="527538" y="4756638"/>
+            <a:ext cx="11139854" cy="930447"/>
+          </a:xfrm>
+          <a:prstGeom prst="rect">
+            <a:avLst/>
+          </a:prstGeom>
+        </p:spPr>
+        <p:txBody>
+          <a:bodyPr vert="horz" lIns="91440" tIns="45720" rIns="91440" bIns="45720" rtlCol="0" anchor="b">
+            <a:normAutofit/>
+          </a:bodyPr>
+          <a:lstStyle/>
+          <a:p>
+            <a:pPr algn="ctr">
+              <a:lnSpc>
+                <a:spcPct val="90000"/>
+              </a:lnSpc>
+              <a:spcBef>
+                <a:spcPct val="0"/>
+              </a:spcBef>
+              <a:spcAft>
+                <a:spcPts val="600"/>
+              </a:spcAft>
+            </a:pPr>
+            <a:r>
+              <a:rPr lang="en-US" sz="2600">
+                <a:solidFill>
+                  <a:srgbClr val="FFFFFF"/>
+                </a:solidFill>
+                <a:latin typeface="+mj-lt"/>
+                <a:ea typeface="+mj-ea"/>
+                <a:cs typeface="+mj-cs"/>
+              </a:rPr>
+              <a:t>In this case we have a complete randomization </a:t>
+            </a:r>
+          </a:p>
+          <a:p>
+            <a:pPr algn="ctr">
+              <a:lnSpc>
+                <a:spcPct val="90000"/>
+              </a:lnSpc>
+              <a:spcBef>
+                <a:spcPct val="0"/>
+              </a:spcBef>
+              <a:spcAft>
+                <a:spcPts val="600"/>
+              </a:spcAft>
+            </a:pPr>
+            <a:r>
+              <a:rPr lang="en-US" sz="2600">
+                <a:solidFill>
+                  <a:srgbClr val="FFFFFF"/>
+                </a:solidFill>
+                <a:latin typeface="+mj-lt"/>
+                <a:ea typeface="+mj-ea"/>
+                <a:cs typeface="+mj-cs"/>
+              </a:rPr>
+              <a:t>of the action choice.</a:t>
+            </a:r>
+          </a:p>
+        </p:txBody>
+      </p:sp>
+      <p:pic>
+        <p:nvPicPr>
+          <p:cNvPr id="9" name="Segnaposto contenuto 3">
+            <a:extLst>
+              <a:ext uri="{FF2B5EF4-FFF2-40B4-BE49-F238E27FC236}">
+                <a16:creationId xmlns:a16="http://schemas.microsoft.com/office/drawing/2014/main" id="{714901DA-9E86-49EF-BC2A-75AB66A08364}"/>
+              </a:ext>
+            </a:extLst>
+          </p:cNvPr>
+          <p:cNvPicPr>
+            <a:picLocks noChangeAspect="1"/>
+          </p:cNvPicPr>
+          <p:nvPr/>
+        </p:nvPicPr>
+        <p:blipFill>
+          <a:blip r:embed="rId2"/>
+          <a:stretch>
+            <a:fillRect/>
+          </a:stretch>
+        </p:blipFill>
+        <p:spPr>
+          <a:xfrm>
+            <a:off x="443674" y="307731"/>
+            <a:ext cx="5208648" cy="3997637"/>
+          </a:xfrm>
+          <a:prstGeom prst="rect">
+            <a:avLst/>
+          </a:prstGeom>
+        </p:spPr>
+      </p:pic>
+      <p:pic>
+        <p:nvPicPr>
+          <p:cNvPr id="6" name="Immagine 5">
+            <a:extLst>
+              <a:ext uri="{FF2B5EF4-FFF2-40B4-BE49-F238E27FC236}">
+                <a16:creationId xmlns:a16="http://schemas.microsoft.com/office/drawing/2014/main" id="{E0906B8B-38E9-474C-B39B-8D6247F1EA62}"/>
+              </a:ext>
+            </a:extLst>
+          </p:cNvPr>
+          <p:cNvPicPr>
+            <a:picLocks noChangeAspect="1"/>
+          </p:cNvPicPr>
+          <p:nvPr/>
+        </p:nvPicPr>
+        <p:blipFill>
+          <a:blip r:embed="rId3"/>
+          <a:stretch>
+            <a:fillRect/>
+          </a:stretch>
+        </p:blipFill>
+        <p:spPr>
+          <a:xfrm>
+            <a:off x="6513977" y="307731"/>
+            <a:ext cx="5260049" cy="3997637"/>
+          </a:xfrm>
+          <a:prstGeom prst="rect">
+            <a:avLst/>
+          </a:prstGeom>
+        </p:spPr>
+      </p:pic>
+      <p:cxnSp>
+        <p:nvCxnSpPr>
+          <p:cNvPr id="25" name="Straight Connector 24">
+            <a:extLst>
+              <a:ext uri="{FF2B5EF4-FFF2-40B4-BE49-F238E27FC236}">
+                <a16:creationId xmlns:a16="http://schemas.microsoft.com/office/drawing/2014/main" id="{7E7C77BC-7138-40B1-A15B-20F57A494629}"/>
+              </a:ext>
+              <a:ext uri="{C183D7F6-B498-43B3-948B-1728B52AA6E4}">
+                <adec:decorative xmlns:adec="http://schemas.microsoft.com/office/drawing/2017/decorative" val="1"/>
+              </a:ext>
+            </a:extLst>
+          </p:cNvPr>
+          <p:cNvCxnSpPr>
+            <a:cxnSpLocks noGrp="1" noRot="1" noChangeAspect="1" noMove="1" noResize="1" noEditPoints="1" noAdjustHandles="1" noChangeArrowheads="1" noChangeShapeType="1"/>
+          </p:cNvCxnSpPr>
+          <p:nvPr>
+            <p:extLst>
+              <p:ext uri="{386F3935-93C4-4BCD-93E2-E3B085C9AB24}">
+                <p16:designElem xmlns:p16="http://schemas.microsoft.com/office/powerpoint/2015/main" val="1"/>
+              </p:ext>
+            </p:extLst>
+          </p:nvPr>
+        </p:nvCxnSpPr>
+        <p:spPr>
+          <a:xfrm>
+            <a:off x="2209800" y="5738691"/>
+            <a:ext cx="7772400" cy="0"/>
+          </a:xfrm>
+          <a:prstGeom prst="line">
+            <a:avLst/>
+          </a:prstGeom>
+          <a:ln w="22225">
+            <a:solidFill>
+              <a:srgbClr val="D9D9D9"/>
+            </a:solidFill>
+          </a:ln>
+        </p:spPr>
+        <p:style>
+          <a:lnRef idx="1">
+            <a:schemeClr val="accent1"/>
+          </a:lnRef>
+          <a:fillRef idx="0">
+            <a:schemeClr val="accent1"/>
+          </a:fillRef>
+          <a:effectRef idx="0">
+            <a:schemeClr val="accent1"/>
+          </a:effectRef>
+          <a:fontRef idx="minor">
+            <a:schemeClr val="tx1"/>
+          </a:fontRef>
+        </p:style>
+      </p:cxnSp>
+    </p:spTree>
+    <p:extLst>
+      <p:ext uri="{BB962C8B-B14F-4D97-AF65-F5344CB8AC3E}">
+        <p14:creationId xmlns:p14="http://schemas.microsoft.com/office/powerpoint/2010/main" val="269996310"/>
       </p:ext>
     </p:extLst>
   </p:cSld>
@@ -3919,6 +4492,86 @@
       </p:grpSpPr>
       <p:sp>
         <p:nvSpPr>
+          <p:cNvPr id="2" name="Titolo 1">
+            <a:extLst>
+              <a:ext uri="{FF2B5EF4-FFF2-40B4-BE49-F238E27FC236}">
+                <a16:creationId xmlns:a16="http://schemas.microsoft.com/office/drawing/2014/main" id="{C59D1E69-C05D-43A4-A17F-B3E7398F5F82}"/>
+              </a:ext>
+            </a:extLst>
+          </p:cNvPr>
+          <p:cNvSpPr>
+            <a:spLocks noGrp="1"/>
+          </p:cNvSpPr>
+          <p:nvPr>
+            <p:ph type="title"/>
+          </p:nvPr>
+        </p:nvSpPr>
+        <p:spPr/>
+        <p:txBody>
+          <a:bodyPr/>
+          <a:lstStyle/>
+          <a:p>
+            <a:endParaRPr lang="it-IT"/>
+          </a:p>
+        </p:txBody>
+      </p:sp>
+      <p:sp>
+        <p:nvSpPr>
+          <p:cNvPr id="3" name="Segnaposto contenuto 2">
+            <a:extLst>
+              <a:ext uri="{FF2B5EF4-FFF2-40B4-BE49-F238E27FC236}">
+                <a16:creationId xmlns:a16="http://schemas.microsoft.com/office/drawing/2014/main" id="{DA604C76-DDD1-41EF-BAFC-81AF23D37F34}"/>
+              </a:ext>
+            </a:extLst>
+          </p:cNvPr>
+          <p:cNvSpPr>
+            <a:spLocks noGrp="1"/>
+          </p:cNvSpPr>
+          <p:nvPr>
+            <p:ph idx="1"/>
+          </p:nvPr>
+        </p:nvSpPr>
+        <p:spPr/>
+        <p:txBody>
+          <a:bodyPr/>
+          <a:lstStyle/>
+          <a:p>
+            <a:endParaRPr lang="it-IT"/>
+          </a:p>
+        </p:txBody>
+      </p:sp>
+    </p:spTree>
+    <p:extLst>
+      <p:ext uri="{BB962C8B-B14F-4D97-AF65-F5344CB8AC3E}">
+        <p14:creationId xmlns:p14="http://schemas.microsoft.com/office/powerpoint/2010/main" val="3197737932"/>
+      </p:ext>
+    </p:extLst>
+  </p:cSld>
+  <p:clrMapOvr>
+    <a:masterClrMapping/>
+  </p:clrMapOvr>
+</p:sld>
+</file>
+
+<file path=ppt/slides/slide14.xml><?xml version="1.0" encoding="utf-8"?>
+<p:sld xmlns:a="http://schemas.openxmlformats.org/drawingml/2006/main" xmlns:r="http://schemas.openxmlformats.org/officeDocument/2006/relationships" xmlns:p="http://schemas.openxmlformats.org/presentationml/2006/main">
+  <p:cSld>
+    <p:spTree>
+      <p:nvGrpSpPr>
+        <p:cNvPr id="1" name=""/>
+        <p:cNvGrpSpPr/>
+        <p:nvPr/>
+      </p:nvGrpSpPr>
+      <p:grpSpPr>
+        <a:xfrm>
+          <a:off x="0" y="0"/>
+          <a:ext cx="0" cy="0"/>
+          <a:chOff x="0" y="0"/>
+          <a:chExt cx="0" cy="0"/>
+        </a:xfrm>
+      </p:grpSpPr>
+      <p:sp>
+        <p:nvSpPr>
           <p:cNvPr id="3" name="Segnaposto contenuto 2">
             <a:extLst>
               <a:ext uri="{FF2B5EF4-FFF2-40B4-BE49-F238E27FC236}">
@@ -4350,8 +5003,8 @@
         </p:blipFill>
         <p:spPr>
           <a:xfrm>
-            <a:off x="3080824" y="1269097"/>
-            <a:ext cx="5711483" cy="2559462"/>
+            <a:off x="2930769" y="1184691"/>
+            <a:ext cx="6330462" cy="2836842"/>
           </a:xfrm>
           <a:prstGeom prst="rect">
             <a:avLst/>
@@ -5576,133 +6229,6 @@
           <p:cNvPr id="2" name="Titolo 1">
             <a:extLst>
               <a:ext uri="{FF2B5EF4-FFF2-40B4-BE49-F238E27FC236}">
-                <a16:creationId xmlns:a16="http://schemas.microsoft.com/office/drawing/2014/main" id="{E497D036-A27E-4993-8A24-90D62EBB91C5}"/>
-              </a:ext>
-            </a:extLst>
-          </p:cNvPr>
-          <p:cNvSpPr>
-            <a:spLocks noGrp="1"/>
-          </p:cNvSpPr>
-          <p:nvPr>
-            <p:ph type="title"/>
-          </p:nvPr>
-        </p:nvSpPr>
-        <p:spPr/>
-        <p:txBody>
-          <a:bodyPr/>
-          <a:lstStyle/>
-          <a:p>
-            <a:r>
-              <a:rPr lang="it-IT" dirty="0"/>
-              <a:t>Notes</a:t>
-            </a:r>
-          </a:p>
-        </p:txBody>
-      </p:sp>
-      <p:sp>
-        <p:nvSpPr>
-          <p:cNvPr id="3" name="Segnaposto contenuto 2">
-            <a:extLst>
-              <a:ext uri="{FF2B5EF4-FFF2-40B4-BE49-F238E27FC236}">
-                <a16:creationId xmlns:a16="http://schemas.microsoft.com/office/drawing/2014/main" id="{250137BD-A468-47F9-B2CC-78061BBFF9BF}"/>
-              </a:ext>
-            </a:extLst>
-          </p:cNvPr>
-          <p:cNvSpPr>
-            <a:spLocks noGrp="1"/>
-          </p:cNvSpPr>
-          <p:nvPr>
-            <p:ph idx="1"/>
-          </p:nvPr>
-        </p:nvSpPr>
-        <p:spPr/>
-        <p:txBody>
-          <a:bodyPr/>
-          <a:lstStyle/>
-          <a:p>
-            <a:r>
-              <a:rPr lang="it-IT" dirty="0"/>
-              <a:t>Q </a:t>
-            </a:r>
-            <a:r>
-              <a:rPr lang="it-IT" dirty="0" err="1"/>
-              <a:t>table</a:t>
-            </a:r>
-            <a:r>
-              <a:rPr lang="it-IT" dirty="0"/>
-              <a:t> and q </a:t>
-            </a:r>
-            <a:r>
-              <a:rPr lang="it-IT" dirty="0" err="1"/>
-              <a:t>value</a:t>
-            </a:r>
-            <a:endParaRPr lang="it-IT" dirty="0"/>
-          </a:p>
-          <a:p>
-            <a:r>
-              <a:rPr lang="it-IT" dirty="0"/>
-              <a:t>Policy epsilon</a:t>
-            </a:r>
-          </a:p>
-          <a:p>
-            <a:r>
-              <a:rPr lang="it-IT" dirty="0"/>
-              <a:t>Compare </a:t>
-            </a:r>
-            <a:r>
-              <a:rPr lang="it-IT" dirty="0" err="1"/>
-              <a:t>value</a:t>
-            </a:r>
-            <a:endParaRPr lang="it-IT" dirty="0"/>
-          </a:p>
-          <a:p>
-            <a:r>
-              <a:rPr lang="it-IT" dirty="0"/>
-              <a:t>Little cake on </a:t>
-            </a:r>
-            <a:r>
-              <a:rPr lang="it-IT" dirty="0" err="1"/>
-              <a:t>path</a:t>
-            </a:r>
-            <a:endParaRPr lang="it-IT" dirty="0"/>
-          </a:p>
-        </p:txBody>
-      </p:sp>
-    </p:spTree>
-    <p:extLst>
-      <p:ext uri="{BB962C8B-B14F-4D97-AF65-F5344CB8AC3E}">
-        <p14:creationId xmlns:p14="http://schemas.microsoft.com/office/powerpoint/2010/main" val="3177810981"/>
-      </p:ext>
-    </p:extLst>
-  </p:cSld>
-  <p:clrMapOvr>
-    <a:masterClrMapping/>
-  </p:clrMapOvr>
-</p:sld>
-</file>
-
-<file path=ppt/slides/slide6.xml><?xml version="1.0" encoding="utf-8"?>
-<p:sld xmlns:a="http://schemas.openxmlformats.org/drawingml/2006/main" xmlns:r="http://schemas.openxmlformats.org/officeDocument/2006/relationships" xmlns:p="http://schemas.openxmlformats.org/presentationml/2006/main">
-  <p:cSld>
-    <p:spTree>
-      <p:nvGrpSpPr>
-        <p:cNvPr id="1" name=""/>
-        <p:cNvGrpSpPr/>
-        <p:nvPr/>
-      </p:nvGrpSpPr>
-      <p:grpSpPr>
-        <a:xfrm>
-          <a:off x="0" y="0"/>
-          <a:ext cx="0" cy="0"/>
-          <a:chOff x="0" y="0"/>
-          <a:chExt cx="0" cy="0"/>
-        </a:xfrm>
-      </p:grpSpPr>
-      <p:sp>
-        <p:nvSpPr>
-          <p:cNvPr id="2" name="Titolo 1">
-            <a:extLst>
-              <a:ext uri="{FF2B5EF4-FFF2-40B4-BE49-F238E27FC236}">
                 <a16:creationId xmlns:a16="http://schemas.microsoft.com/office/drawing/2014/main" id="{ED572C7A-CB0D-4BFD-B630-164C31D1669D}"/>
               </a:ext>
             </a:extLst>
@@ -6567,7 +7093,7 @@
 </p:sld>
 </file>
 
-<file path=ppt/slides/slide7.xml><?xml version="1.0" encoding="utf-8"?>
+<file path=ppt/slides/slide6.xml><?xml version="1.0" encoding="utf-8"?>
 <p:sld xmlns:a="http://schemas.openxmlformats.org/drawingml/2006/main" xmlns:r="http://schemas.openxmlformats.org/officeDocument/2006/relationships" xmlns:p="http://schemas.openxmlformats.org/presentationml/2006/main">
   <p:cSld>
     <p:spTree>
@@ -6912,7 +7438,7 @@
 </p:sld>
 </file>
 
-<file path=ppt/slides/slide8.xml><?xml version="1.0" encoding="utf-8"?>
+<file path=ppt/slides/slide7.xml><?xml version="1.0" encoding="utf-8"?>
 <p:sld xmlns:a="http://schemas.openxmlformats.org/drawingml/2006/main" xmlns:r="http://schemas.openxmlformats.org/officeDocument/2006/relationships" xmlns:p="http://schemas.openxmlformats.org/presentationml/2006/main">
   <p:cSld>
     <p:spTree>
@@ -7402,7 +7928,7 @@
 </p:sld>
 </file>
 
-<file path=ppt/slides/slide9.xml><?xml version="1.0" encoding="utf-8"?>
+<file path=ppt/slides/slide8.xml><?xml version="1.0" encoding="utf-8"?>
 <p:sld xmlns:a="http://schemas.openxmlformats.org/drawingml/2006/main" xmlns:r="http://schemas.openxmlformats.org/officeDocument/2006/relationships" xmlns:p="http://schemas.openxmlformats.org/presentationml/2006/main">
   <p:cSld>
     <p:spTree>
@@ -7631,6 +8157,279 @@
     <p:extLst>
       <p:ext uri="{BB962C8B-B14F-4D97-AF65-F5344CB8AC3E}">
         <p14:creationId xmlns:p14="http://schemas.microsoft.com/office/powerpoint/2010/main" val="321259936"/>
+      </p:ext>
+    </p:extLst>
+  </p:cSld>
+  <p:clrMapOvr>
+    <a:masterClrMapping/>
+  </p:clrMapOvr>
+</p:sld>
+</file>
+
+<file path=ppt/slides/slide9.xml><?xml version="1.0" encoding="utf-8"?>
+<p:sld xmlns:a="http://schemas.openxmlformats.org/drawingml/2006/main" xmlns:r="http://schemas.openxmlformats.org/officeDocument/2006/relationships" xmlns:p="http://schemas.openxmlformats.org/presentationml/2006/main">
+  <p:cSld>
+    <p:spTree>
+      <p:nvGrpSpPr>
+        <p:cNvPr id="1" name=""/>
+        <p:cNvGrpSpPr/>
+        <p:nvPr/>
+      </p:nvGrpSpPr>
+      <p:grpSpPr>
+        <a:xfrm>
+          <a:off x="0" y="0"/>
+          <a:ext cx="0" cy="0"/>
+          <a:chOff x="0" y="0"/>
+          <a:chExt cx="0" cy="0"/>
+        </a:xfrm>
+      </p:grpSpPr>
+      <p:sp>
+        <p:nvSpPr>
+          <p:cNvPr id="3" name="Segnaposto contenuto 2">
+            <a:extLst>
+              <a:ext uri="{FF2B5EF4-FFF2-40B4-BE49-F238E27FC236}">
+                <a16:creationId xmlns:a16="http://schemas.microsoft.com/office/drawing/2014/main" id="{1D362BC4-1F3D-48EC-B054-A15887D4BAD7}"/>
+              </a:ext>
+            </a:extLst>
+          </p:cNvPr>
+          <p:cNvSpPr>
+            <a:spLocks noGrp="1"/>
+          </p:cNvSpPr>
+          <p:nvPr>
+            <p:ph idx="1"/>
+          </p:nvPr>
+        </p:nvSpPr>
+        <p:spPr>
+          <a:xfrm>
+            <a:off x="838200" y="478302"/>
+            <a:ext cx="10515600" cy="5698661"/>
+          </a:xfrm>
+        </p:spPr>
+        <p:txBody>
+          <a:bodyPr/>
+          <a:lstStyle/>
+          <a:p>
+            <a:r>
+              <a:rPr lang="it-IT" dirty="0" err="1"/>
+              <a:t>Complex</a:t>
+            </a:r>
+            <a:r>
+              <a:rPr lang="it-IT" dirty="0"/>
+              <a:t> </a:t>
+            </a:r>
+            <a:r>
+              <a:rPr lang="it-IT" dirty="0" err="1"/>
+              <a:t>environment</a:t>
+            </a:r>
+            <a:endParaRPr lang="it-IT" dirty="0"/>
+          </a:p>
+          <a:p>
+            <a:endParaRPr lang="it-IT" dirty="0"/>
+          </a:p>
+          <a:p>
+            <a:endParaRPr lang="it-IT" dirty="0"/>
+          </a:p>
+          <a:p>
+            <a:endParaRPr lang="it-IT" dirty="0"/>
+          </a:p>
+          <a:p>
+            <a:pPr marL="0" indent="0">
+              <a:buNone/>
+            </a:pPr>
+            <a:endParaRPr lang="it-IT" dirty="0"/>
+          </a:p>
+          <a:p>
+            <a:pPr lvl="1"/>
+            <a:r>
+              <a:rPr lang="it-IT" dirty="0" err="1"/>
+              <a:t>Also</a:t>
+            </a:r>
+            <a:r>
+              <a:rPr lang="it-IT" dirty="0"/>
+              <a:t> in </a:t>
+            </a:r>
+            <a:r>
+              <a:rPr lang="it-IT" dirty="0" err="1"/>
+              <a:t>this</a:t>
+            </a:r>
+            <a:r>
+              <a:rPr lang="it-IT" dirty="0"/>
+              <a:t> case, for the first </a:t>
+            </a:r>
+            <a:r>
+              <a:rPr lang="it-IT" dirty="0" err="1"/>
+              <a:t>episode</a:t>
+            </a:r>
+            <a:r>
+              <a:rPr lang="it-IT" dirty="0"/>
+              <a:t>, agent </a:t>
+            </a:r>
+            <a:r>
+              <a:rPr lang="it-IT" dirty="0" err="1"/>
+              <a:t>bumps</a:t>
+            </a:r>
+            <a:endParaRPr lang="it-IT" dirty="0"/>
+          </a:p>
+          <a:p>
+            <a:pPr marL="457200" lvl="1" indent="0">
+              <a:buNone/>
+            </a:pPr>
+            <a:r>
+              <a:rPr lang="it-IT" dirty="0"/>
+              <a:t>   </a:t>
+            </a:r>
+            <a:r>
+              <a:rPr lang="it-IT" dirty="0" err="1"/>
+              <a:t>many</a:t>
+            </a:r>
+            <a:r>
+              <a:rPr lang="it-IT" dirty="0"/>
+              <a:t> times </a:t>
+            </a:r>
+            <a:r>
+              <a:rPr lang="it-IT" dirty="0" err="1"/>
+              <a:t>against</a:t>
+            </a:r>
+            <a:r>
+              <a:rPr lang="it-IT" dirty="0"/>
+              <a:t> a </a:t>
+            </a:r>
+            <a:r>
+              <a:rPr lang="it-IT" dirty="0" err="1"/>
+              <a:t>wall</a:t>
+            </a:r>
+            <a:r>
+              <a:rPr lang="it-IT" dirty="0"/>
+              <a:t>, </a:t>
+            </a:r>
+            <a:r>
+              <a:rPr lang="it-IT" dirty="0" err="1"/>
+              <a:t>obtaining</a:t>
+            </a:r>
+            <a:r>
+              <a:rPr lang="it-IT" dirty="0"/>
+              <a:t> at the end </a:t>
+            </a:r>
+            <a:r>
+              <a:rPr lang="it-IT" dirty="0" err="1"/>
+              <a:t>this</a:t>
+            </a:r>
+            <a:r>
+              <a:rPr lang="it-IT" dirty="0"/>
+              <a:t> </a:t>
+            </a:r>
+          </a:p>
+          <a:p>
+            <a:pPr marL="457200" lvl="1" indent="0">
+              <a:buNone/>
+            </a:pPr>
+            <a:r>
+              <a:rPr lang="it-IT" dirty="0"/>
+              <a:t>   Q-matrix</a:t>
+            </a:r>
+          </a:p>
+          <a:p>
+            <a:pPr marL="457200" lvl="1" indent="0">
+              <a:buNone/>
+            </a:pPr>
+            <a:endParaRPr lang="it-IT" dirty="0"/>
+          </a:p>
+          <a:p>
+            <a:pPr marL="457200" lvl="1" indent="0">
+              <a:buNone/>
+            </a:pPr>
+            <a:endParaRPr lang="it-IT" dirty="0"/>
+          </a:p>
+          <a:p>
+            <a:pPr marL="457200" lvl="1" indent="0">
+              <a:buNone/>
+            </a:pPr>
+            <a:endParaRPr lang="it-IT" dirty="0"/>
+          </a:p>
+          <a:p>
+            <a:pPr marL="457200" lvl="1" indent="0">
+              <a:buNone/>
+            </a:pPr>
+            <a:endParaRPr lang="it-IT" dirty="0"/>
+          </a:p>
+          <a:p>
+            <a:pPr marL="457200" lvl="1" indent="0">
+              <a:buNone/>
+            </a:pPr>
+            <a:endParaRPr lang="it-IT" dirty="0"/>
+          </a:p>
+          <a:p>
+            <a:pPr marL="457200" lvl="1" indent="0">
+              <a:buNone/>
+            </a:pPr>
+            <a:endParaRPr lang="it-IT" dirty="0"/>
+          </a:p>
+        </p:txBody>
+      </p:sp>
+      <p:pic>
+        <p:nvPicPr>
+          <p:cNvPr id="4" name="Immagine 3">
+            <a:extLst>
+              <a:ext uri="{FF2B5EF4-FFF2-40B4-BE49-F238E27FC236}">
+                <a16:creationId xmlns:a16="http://schemas.microsoft.com/office/drawing/2014/main" id="{CA8D9D73-0B0B-4233-8F6B-EFFCE3DBA5FE}"/>
+              </a:ext>
+            </a:extLst>
+          </p:cNvPr>
+          <p:cNvPicPr>
+            <a:picLocks noChangeAspect="1"/>
+          </p:cNvPicPr>
+          <p:nvPr/>
+        </p:nvPicPr>
+        <p:blipFill>
+          <a:blip r:embed="rId2"/>
+          <a:stretch>
+            <a:fillRect/>
+          </a:stretch>
+        </p:blipFill>
+        <p:spPr>
+          <a:xfrm>
+            <a:off x="9033436" y="681037"/>
+            <a:ext cx="2127080" cy="2948428"/>
+          </a:xfrm>
+          <a:prstGeom prst="rect">
+            <a:avLst/>
+          </a:prstGeom>
+        </p:spPr>
+      </p:pic>
+      <p:pic>
+        <p:nvPicPr>
+          <p:cNvPr id="5" name="Immagine 4">
+            <a:extLst>
+              <a:ext uri="{FF2B5EF4-FFF2-40B4-BE49-F238E27FC236}">
+                <a16:creationId xmlns:a16="http://schemas.microsoft.com/office/drawing/2014/main" id="{91D0C4D2-0374-4A8B-9114-AC9F57C6FD05}"/>
+              </a:ext>
+            </a:extLst>
+          </p:cNvPr>
+          <p:cNvPicPr>
+            <a:picLocks noChangeAspect="1"/>
+          </p:cNvPicPr>
+          <p:nvPr/>
+        </p:nvPicPr>
+        <p:blipFill>
+          <a:blip r:embed="rId3"/>
+          <a:stretch>
+            <a:fillRect/>
+          </a:stretch>
+        </p:blipFill>
+        <p:spPr>
+          <a:xfrm>
+            <a:off x="2924579" y="4028488"/>
+            <a:ext cx="8210080" cy="1725198"/>
+          </a:xfrm>
+          <a:prstGeom prst="rect">
+            <a:avLst/>
+          </a:prstGeom>
+        </p:spPr>
+      </p:pic>
+    </p:spTree>
+    <p:extLst>
+      <p:ext uri="{BB962C8B-B14F-4D97-AF65-F5344CB8AC3E}">
+        <p14:creationId xmlns:p14="http://schemas.microsoft.com/office/powerpoint/2010/main" val="942120346"/>
       </p:ext>
     </p:extLst>
   </p:cSld>

</xml_diff>

<commit_message>
Add exercise 3 to presentation
</commit_message>
<xml_diff>
--- a/Presentation/SDU_SummerSchool_Presentation.pptx
+++ b/Presentation/SDU_SummerSchool_Presentation.pptx
@@ -19,8 +19,8 @@
     <p:sldId id="266" r:id="rId13"/>
     <p:sldId id="268" r:id="rId14"/>
     <p:sldId id="269" r:id="rId15"/>
-    <p:sldId id="270" r:id="rId16"/>
-    <p:sldId id="267" r:id="rId17"/>
+    <p:sldId id="267" r:id="rId16"/>
+    <p:sldId id="274" r:id="rId17"/>
   </p:sldIdLst>
   <p:sldSz cx="12192000" cy="6858000"/>
   <p:notesSz cx="6858000" cy="9144000"/>
@@ -274,7 +274,7 @@
           <a:p>
             <a:fld id="{8173B6D1-B9A7-4F74-ADCF-EF56F696349F}" type="datetimeFigureOut">
               <a:rPr lang="it-IT" smtClean="0"/>
-              <a:t>12/08/19</a:t>
+              <a:t>12/08/2019</a:t>
             </a:fld>
             <a:endParaRPr lang="it-IT"/>
           </a:p>
@@ -328,7 +328,7 @@
           <a:p>
             <a:fld id="{37521F19-B39A-4CF3-8059-E7EF6E631AA0}" type="slidenum">
               <a:rPr lang="it-IT" smtClean="0"/>
-              <a:t>‹#›</a:t>
+              <a:t>‹N›</a:t>
             </a:fld>
             <a:endParaRPr lang="it-IT"/>
           </a:p>
@@ -472,7 +472,7 @@
           <a:p>
             <a:fld id="{8173B6D1-B9A7-4F74-ADCF-EF56F696349F}" type="datetimeFigureOut">
               <a:rPr lang="it-IT" smtClean="0"/>
-              <a:t>12/08/19</a:t>
+              <a:t>12/08/2019</a:t>
             </a:fld>
             <a:endParaRPr lang="it-IT"/>
           </a:p>
@@ -526,7 +526,7 @@
           <a:p>
             <a:fld id="{37521F19-B39A-4CF3-8059-E7EF6E631AA0}" type="slidenum">
               <a:rPr lang="it-IT" smtClean="0"/>
-              <a:t>‹#›</a:t>
+              <a:t>‹N›</a:t>
             </a:fld>
             <a:endParaRPr lang="it-IT"/>
           </a:p>
@@ -680,7 +680,7 @@
           <a:p>
             <a:fld id="{8173B6D1-B9A7-4F74-ADCF-EF56F696349F}" type="datetimeFigureOut">
               <a:rPr lang="it-IT" smtClean="0"/>
-              <a:t>12/08/19</a:t>
+              <a:t>12/08/2019</a:t>
             </a:fld>
             <a:endParaRPr lang="it-IT"/>
           </a:p>
@@ -734,7 +734,7 @@
           <a:p>
             <a:fld id="{37521F19-B39A-4CF3-8059-E7EF6E631AA0}" type="slidenum">
               <a:rPr lang="it-IT" smtClean="0"/>
-              <a:t>‹#›</a:t>
+              <a:t>‹N›</a:t>
             </a:fld>
             <a:endParaRPr lang="it-IT"/>
           </a:p>
@@ -878,7 +878,7 @@
           <a:p>
             <a:fld id="{8173B6D1-B9A7-4F74-ADCF-EF56F696349F}" type="datetimeFigureOut">
               <a:rPr lang="it-IT" smtClean="0"/>
-              <a:t>12/08/19</a:t>
+              <a:t>12/08/2019</a:t>
             </a:fld>
             <a:endParaRPr lang="it-IT"/>
           </a:p>
@@ -932,7 +932,7 @@
           <a:p>
             <a:fld id="{37521F19-B39A-4CF3-8059-E7EF6E631AA0}" type="slidenum">
               <a:rPr lang="it-IT" smtClean="0"/>
-              <a:t>‹#›</a:t>
+              <a:t>‹N›</a:t>
             </a:fld>
             <a:endParaRPr lang="it-IT"/>
           </a:p>
@@ -1153,7 +1153,7 @@
           <a:p>
             <a:fld id="{8173B6D1-B9A7-4F74-ADCF-EF56F696349F}" type="datetimeFigureOut">
               <a:rPr lang="it-IT" smtClean="0"/>
-              <a:t>12/08/19</a:t>
+              <a:t>12/08/2019</a:t>
             </a:fld>
             <a:endParaRPr lang="it-IT"/>
           </a:p>
@@ -1207,7 +1207,7 @@
           <a:p>
             <a:fld id="{37521F19-B39A-4CF3-8059-E7EF6E631AA0}" type="slidenum">
               <a:rPr lang="it-IT" smtClean="0"/>
-              <a:t>‹#›</a:t>
+              <a:t>‹N›</a:t>
             </a:fld>
             <a:endParaRPr lang="it-IT"/>
           </a:p>
@@ -1418,7 +1418,7 @@
           <a:p>
             <a:fld id="{8173B6D1-B9A7-4F74-ADCF-EF56F696349F}" type="datetimeFigureOut">
               <a:rPr lang="it-IT" smtClean="0"/>
-              <a:t>12/08/19</a:t>
+              <a:t>12/08/2019</a:t>
             </a:fld>
             <a:endParaRPr lang="it-IT"/>
           </a:p>
@@ -1472,7 +1472,7 @@
           <a:p>
             <a:fld id="{37521F19-B39A-4CF3-8059-E7EF6E631AA0}" type="slidenum">
               <a:rPr lang="it-IT" smtClean="0"/>
-              <a:t>‹#›</a:t>
+              <a:t>‹N›</a:t>
             </a:fld>
             <a:endParaRPr lang="it-IT"/>
           </a:p>
@@ -1830,7 +1830,7 @@
           <a:p>
             <a:fld id="{8173B6D1-B9A7-4F74-ADCF-EF56F696349F}" type="datetimeFigureOut">
               <a:rPr lang="it-IT" smtClean="0"/>
-              <a:t>12/08/19</a:t>
+              <a:t>12/08/2019</a:t>
             </a:fld>
             <a:endParaRPr lang="it-IT"/>
           </a:p>
@@ -1884,7 +1884,7 @@
           <a:p>
             <a:fld id="{37521F19-B39A-4CF3-8059-E7EF6E631AA0}" type="slidenum">
               <a:rPr lang="it-IT" smtClean="0"/>
-              <a:t>‹#›</a:t>
+              <a:t>‹N›</a:t>
             </a:fld>
             <a:endParaRPr lang="it-IT"/>
           </a:p>
@@ -1971,7 +1971,7 @@
           <a:p>
             <a:fld id="{8173B6D1-B9A7-4F74-ADCF-EF56F696349F}" type="datetimeFigureOut">
               <a:rPr lang="it-IT" smtClean="0"/>
-              <a:t>12/08/19</a:t>
+              <a:t>12/08/2019</a:t>
             </a:fld>
             <a:endParaRPr lang="it-IT"/>
           </a:p>
@@ -2025,7 +2025,7 @@
           <a:p>
             <a:fld id="{37521F19-B39A-4CF3-8059-E7EF6E631AA0}" type="slidenum">
               <a:rPr lang="it-IT" smtClean="0"/>
-              <a:t>‹#›</a:t>
+              <a:t>‹N›</a:t>
             </a:fld>
             <a:endParaRPr lang="it-IT"/>
           </a:p>
@@ -2084,7 +2084,7 @@
           <a:p>
             <a:fld id="{8173B6D1-B9A7-4F74-ADCF-EF56F696349F}" type="datetimeFigureOut">
               <a:rPr lang="it-IT" smtClean="0"/>
-              <a:t>12/08/19</a:t>
+              <a:t>12/08/2019</a:t>
             </a:fld>
             <a:endParaRPr lang="it-IT"/>
           </a:p>
@@ -2138,7 +2138,7 @@
           <a:p>
             <a:fld id="{37521F19-B39A-4CF3-8059-E7EF6E631AA0}" type="slidenum">
               <a:rPr lang="it-IT" smtClean="0"/>
-              <a:t>‹#›</a:t>
+              <a:t>‹N›</a:t>
             </a:fld>
             <a:endParaRPr lang="it-IT"/>
           </a:p>
@@ -2395,7 +2395,7 @@
           <a:p>
             <a:fld id="{8173B6D1-B9A7-4F74-ADCF-EF56F696349F}" type="datetimeFigureOut">
               <a:rPr lang="it-IT" smtClean="0"/>
-              <a:t>12/08/19</a:t>
+              <a:t>12/08/2019</a:t>
             </a:fld>
             <a:endParaRPr lang="it-IT"/>
           </a:p>
@@ -2449,7 +2449,7 @@
           <a:p>
             <a:fld id="{37521F19-B39A-4CF3-8059-E7EF6E631AA0}" type="slidenum">
               <a:rPr lang="it-IT" smtClean="0"/>
-              <a:t>‹#›</a:t>
+              <a:t>‹N›</a:t>
             </a:fld>
             <a:endParaRPr lang="it-IT"/>
           </a:p>
@@ -2683,7 +2683,7 @@
           <a:p>
             <a:fld id="{8173B6D1-B9A7-4F74-ADCF-EF56F696349F}" type="datetimeFigureOut">
               <a:rPr lang="it-IT" smtClean="0"/>
-              <a:t>12/08/19</a:t>
+              <a:t>12/08/2019</a:t>
             </a:fld>
             <a:endParaRPr lang="it-IT"/>
           </a:p>
@@ -2737,7 +2737,7 @@
           <a:p>
             <a:fld id="{37521F19-B39A-4CF3-8059-E7EF6E631AA0}" type="slidenum">
               <a:rPr lang="it-IT" smtClean="0"/>
-              <a:t>‹#›</a:t>
+              <a:t>‹N›</a:t>
             </a:fld>
             <a:endParaRPr lang="it-IT"/>
           </a:p>
@@ -2924,7 +2924,7 @@
           <a:p>
             <a:fld id="{8173B6D1-B9A7-4F74-ADCF-EF56F696349F}" type="datetimeFigureOut">
               <a:rPr lang="it-IT" smtClean="0"/>
-              <a:t>12/08/19</a:t>
+              <a:t>12/08/2019</a:t>
             </a:fld>
             <a:endParaRPr lang="it-IT"/>
           </a:p>
@@ -3014,7 +3014,7 @@
           <a:p>
             <a:fld id="{37521F19-B39A-4CF3-8059-E7EF6E631AA0}" type="slidenum">
               <a:rPr lang="it-IT" smtClean="0"/>
-              <a:t>‹#›</a:t>
+              <a:t>‹N›</a:t>
             </a:fld>
             <a:endParaRPr lang="it-IT"/>
           </a:p>
@@ -5005,86 +5005,6 @@
       </p:grpSpPr>
       <p:sp>
         <p:nvSpPr>
-          <p:cNvPr id="2" name="Titolo 1">
-            <a:extLst>
-              <a:ext uri="{FF2B5EF4-FFF2-40B4-BE49-F238E27FC236}">
-                <a16:creationId xmlns:a16="http://schemas.microsoft.com/office/drawing/2014/main" id="{C59D1E69-C05D-43A4-A17F-B3E7398F5F82}"/>
-              </a:ext>
-            </a:extLst>
-          </p:cNvPr>
-          <p:cNvSpPr>
-            <a:spLocks noGrp="1"/>
-          </p:cNvSpPr>
-          <p:nvPr>
-            <p:ph type="title"/>
-          </p:nvPr>
-        </p:nvSpPr>
-        <p:spPr/>
-        <p:txBody>
-          <a:bodyPr/>
-          <a:lstStyle/>
-          <a:p>
-            <a:endParaRPr lang="it-IT"/>
-          </a:p>
-        </p:txBody>
-      </p:sp>
-      <p:sp>
-        <p:nvSpPr>
-          <p:cNvPr id="3" name="Segnaposto contenuto 2">
-            <a:extLst>
-              <a:ext uri="{FF2B5EF4-FFF2-40B4-BE49-F238E27FC236}">
-                <a16:creationId xmlns:a16="http://schemas.microsoft.com/office/drawing/2014/main" id="{DA604C76-DDD1-41EF-BAFC-81AF23D37F34}"/>
-              </a:ext>
-            </a:extLst>
-          </p:cNvPr>
-          <p:cNvSpPr>
-            <a:spLocks noGrp="1"/>
-          </p:cNvSpPr>
-          <p:nvPr>
-            <p:ph idx="1"/>
-          </p:nvPr>
-        </p:nvSpPr>
-        <p:spPr/>
-        <p:txBody>
-          <a:bodyPr/>
-          <a:lstStyle/>
-          <a:p>
-            <a:endParaRPr lang="it-IT"/>
-          </a:p>
-        </p:txBody>
-      </p:sp>
-    </p:spTree>
-    <p:extLst>
-      <p:ext uri="{BB962C8B-B14F-4D97-AF65-F5344CB8AC3E}">
-        <p14:creationId xmlns:p14="http://schemas.microsoft.com/office/powerpoint/2010/main" val="3197737932"/>
-      </p:ext>
-    </p:extLst>
-  </p:cSld>
-  <p:clrMapOvr>
-    <a:masterClrMapping/>
-  </p:clrMapOvr>
-</p:sld>
-</file>
-
-<file path=ppt/slides/slide16.xml><?xml version="1.0" encoding="utf-8"?>
-<p:sld xmlns:a="http://schemas.openxmlformats.org/drawingml/2006/main" xmlns:r="http://schemas.openxmlformats.org/officeDocument/2006/relationships" xmlns:p="http://schemas.openxmlformats.org/presentationml/2006/main">
-  <p:cSld>
-    <p:spTree>
-      <p:nvGrpSpPr>
-        <p:cNvPr id="1" name=""/>
-        <p:cNvGrpSpPr/>
-        <p:nvPr/>
-      </p:nvGrpSpPr>
-      <p:grpSpPr>
-        <a:xfrm>
-          <a:off x="0" y="0"/>
-          <a:ext cx="0" cy="0"/>
-          <a:chOff x="0" y="0"/>
-          <a:chExt cx="0" cy="0"/>
-        </a:xfrm>
-      </p:grpSpPr>
-      <p:sp>
-        <p:nvSpPr>
           <p:cNvPr id="3" name="Segnaposto contenuto 2">
             <a:extLst>
               <a:ext uri="{FF2B5EF4-FFF2-40B4-BE49-F238E27FC236}">
@@ -5528,6 +5448,544 @@
     <p:extLst>
       <p:ext uri="{BB962C8B-B14F-4D97-AF65-F5344CB8AC3E}">
         <p14:creationId xmlns:p14="http://schemas.microsoft.com/office/powerpoint/2010/main" val="3131718867"/>
+      </p:ext>
+    </p:extLst>
+  </p:cSld>
+  <p:clrMapOvr>
+    <a:masterClrMapping/>
+  </p:clrMapOvr>
+</p:sld>
+</file>
+
+<file path=ppt/slides/slide16.xml><?xml version="1.0" encoding="utf-8"?>
+<p:sld xmlns:a="http://schemas.openxmlformats.org/drawingml/2006/main" xmlns:r="http://schemas.openxmlformats.org/officeDocument/2006/relationships" xmlns:p="http://schemas.openxmlformats.org/presentationml/2006/main">
+  <p:cSld>
+    <p:bg>
+      <p:bgPr>
+        <a:solidFill>
+          <a:schemeClr val="bg1"/>
+        </a:solidFill>
+        <a:effectLst/>
+      </p:bgPr>
+    </p:bg>
+    <p:spTree>
+      <p:nvGrpSpPr>
+        <p:cNvPr id="1" name=""/>
+        <p:cNvGrpSpPr/>
+        <p:nvPr/>
+      </p:nvGrpSpPr>
+      <p:grpSpPr>
+        <a:xfrm>
+          <a:off x="0" y="0"/>
+          <a:ext cx="0" cy="0"/>
+          <a:chOff x="0" y="0"/>
+          <a:chExt cx="0" cy="0"/>
+        </a:xfrm>
+      </p:grpSpPr>
+      <p:sp>
+        <p:nvSpPr>
+          <p:cNvPr id="1028" name="Rectangle 70">
+            <a:extLst>
+              <a:ext uri="{FF2B5EF4-FFF2-40B4-BE49-F238E27FC236}">
+                <a16:creationId xmlns:a16="http://schemas.microsoft.com/office/drawing/2014/main" id="{867D4867-5BA7-4462-B2F6-A23F4A622AA7}"/>
+              </a:ext>
+              <a:ext uri="{C183D7F6-B498-43B3-948B-1728B52AA6E4}">
+                <adec:decorative xmlns:adec="http://schemas.microsoft.com/office/drawing/2017/decorative" val="1"/>
+              </a:ext>
+            </a:extLst>
+          </p:cNvPr>
+          <p:cNvSpPr>
+            <a:spLocks noGrp="1" noRot="1" noChangeAspect="1" noMove="1" noResize="1" noEditPoints="1" noAdjustHandles="1" noChangeArrowheads="1" noChangeShapeType="1" noTextEdit="1"/>
+          </p:cNvSpPr>
+          <p:nvPr>
+            <p:extLst>
+              <p:ext uri="{386F3935-93C4-4BCD-93E2-E3B085C9AB24}">
+                <p16:designElem xmlns:p16="http://schemas.microsoft.com/office/powerpoint/2015/main" val="1"/>
+              </p:ext>
+            </p:extLst>
+          </p:nvPr>
+        </p:nvSpPr>
+        <p:spPr>
+          <a:xfrm>
+            <a:off x="0" y="0"/>
+            <a:ext cx="4654296" cy="6858000"/>
+          </a:xfrm>
+          <a:prstGeom prst="rect">
+            <a:avLst/>
+          </a:prstGeom>
+          <a:solidFill>
+            <a:schemeClr val="tx1">
+              <a:lumMod val="75000"/>
+              <a:lumOff val="25000"/>
+            </a:schemeClr>
+          </a:solidFill>
+          <a:ln>
+            <a:noFill/>
+          </a:ln>
+        </p:spPr>
+        <p:style>
+          <a:lnRef idx="0">
+            <a:scrgbClr r="0" g="0" b="0"/>
+          </a:lnRef>
+          <a:fillRef idx="0">
+            <a:scrgbClr r="0" g="0" b="0"/>
+          </a:fillRef>
+          <a:effectRef idx="0">
+            <a:scrgbClr r="0" g="0" b="0"/>
+          </a:effectRef>
+          <a:fontRef idx="minor">
+            <a:schemeClr val="lt1"/>
+          </a:fontRef>
+        </p:style>
+        <p:txBody>
+          <a:bodyPr rtlCol="0" anchor="ctr"/>
+          <a:lstStyle/>
+          <a:p>
+            <a:pPr algn="ctr"/>
+            <a:endParaRPr lang="en-US"/>
+          </a:p>
+        </p:txBody>
+      </p:sp>
+      <p:sp>
+        <p:nvSpPr>
+          <p:cNvPr id="2" name="Titolo 1">
+            <a:extLst>
+              <a:ext uri="{FF2B5EF4-FFF2-40B4-BE49-F238E27FC236}">
+                <a16:creationId xmlns:a16="http://schemas.microsoft.com/office/drawing/2014/main" id="{1149EC29-349C-4442-9C49-A4F0B810A158}"/>
+              </a:ext>
+            </a:extLst>
+          </p:cNvPr>
+          <p:cNvSpPr>
+            <a:spLocks noGrp="1"/>
+          </p:cNvSpPr>
+          <p:nvPr>
+            <p:ph type="title"/>
+          </p:nvPr>
+        </p:nvSpPr>
+        <p:spPr>
+          <a:xfrm>
+            <a:off x="643467" y="643467"/>
+            <a:ext cx="3363974" cy="1597315"/>
+          </a:xfrm>
+          <a:noFill/>
+          <a:ln w="19050">
+            <a:solidFill>
+              <a:schemeClr val="bg1"/>
+            </a:solidFill>
+          </a:ln>
+        </p:spPr>
+        <p:txBody>
+          <a:bodyPr wrap="square">
+            <a:normAutofit/>
+          </a:bodyPr>
+          <a:lstStyle/>
+          <a:p>
+            <a:pPr algn="ctr"/>
+            <a:r>
+              <a:rPr lang="it-IT" sz="2800" dirty="0" err="1">
+                <a:solidFill>
+                  <a:schemeClr val="bg1"/>
+                </a:solidFill>
+              </a:rPr>
+              <a:t>Exercise</a:t>
+            </a:r>
+            <a:r>
+              <a:rPr lang="it-IT" sz="2800" dirty="0">
+                <a:solidFill>
+                  <a:schemeClr val="bg1"/>
+                </a:solidFill>
+              </a:rPr>
+              <a:t> 3 – </a:t>
+            </a:r>
+            <a:r>
+              <a:rPr lang="it-IT" sz="2800" dirty="0" err="1">
+                <a:solidFill>
+                  <a:schemeClr val="bg1"/>
+                </a:solidFill>
+              </a:rPr>
+              <a:t>BackPropagation</a:t>
+            </a:r>
+            <a:r>
+              <a:rPr lang="it-IT" sz="2800" dirty="0">
+                <a:solidFill>
+                  <a:schemeClr val="bg1"/>
+                </a:solidFill>
+              </a:rPr>
+              <a:t> XOR problem</a:t>
+            </a:r>
+          </a:p>
+        </p:txBody>
+      </p:sp>
+      <mc:AlternateContent xmlns:mc="http://schemas.openxmlformats.org/markup-compatibility/2006">
+        <mc:Choice xmlns:a14="http://schemas.microsoft.com/office/drawing/2010/main" Requires="a14">
+          <p:sp>
+            <p:nvSpPr>
+              <p:cNvPr id="3" name="Segnaposto contenuto 2">
+                <a:extLst>
+                  <a:ext uri="{FF2B5EF4-FFF2-40B4-BE49-F238E27FC236}">
+                    <a16:creationId xmlns:a16="http://schemas.microsoft.com/office/drawing/2014/main" id="{87749C20-3E74-425D-A4F4-173C6F20A4BC}"/>
+                  </a:ext>
+                </a:extLst>
+              </p:cNvPr>
+              <p:cNvSpPr>
+                <a:spLocks noGrp="1"/>
+              </p:cNvSpPr>
+              <p:nvPr>
+                <p:ph idx="1"/>
+              </p:nvPr>
+            </p:nvSpPr>
+            <p:spPr>
+              <a:xfrm>
+                <a:off x="643468" y="2638044"/>
+                <a:ext cx="3363974" cy="3415622"/>
+              </a:xfrm>
+            </p:spPr>
+            <p:txBody>
+              <a:bodyPr>
+                <a:normAutofit fontScale="92500"/>
+              </a:bodyPr>
+              <a:lstStyle/>
+              <a:p>
+                <a14:m>
+                  <m:oMath xmlns:m="http://schemas.openxmlformats.org/officeDocument/2006/math">
+                    <m:r>
+                      <a:rPr lang="it-IT" sz="2000" b="0" i="1" smtClean="0">
+                        <a:solidFill>
+                          <a:schemeClr val="bg1"/>
+                        </a:solidFill>
+                        <a:latin typeface="Cambria Math" panose="02040503050406030204" pitchFamily="18" charset="0"/>
+                      </a:rPr>
+                      <m:t>𝑆𝑖𝑛𝑔𝑙𝑒</m:t>
+                    </m:r>
+                    <m:r>
+                      <a:rPr lang="it-IT" sz="2000" b="0" i="1" smtClean="0">
+                        <a:solidFill>
+                          <a:schemeClr val="bg1"/>
+                        </a:solidFill>
+                        <a:latin typeface="Cambria Math" panose="02040503050406030204" pitchFamily="18" charset="0"/>
+                      </a:rPr>
+                      <m:t> </m:t>
+                    </m:r>
+                    <m:r>
+                      <a:rPr lang="it-IT" sz="2000" b="0" i="1" smtClean="0">
+                        <a:solidFill>
+                          <a:schemeClr val="bg1"/>
+                        </a:solidFill>
+                        <a:latin typeface="Cambria Math" panose="02040503050406030204" pitchFamily="18" charset="0"/>
+                      </a:rPr>
+                      <m:t>𝑝𝑒𝑟𝑐𝑒𝑝𝑡𝑟𝑜𝑛</m:t>
+                    </m:r>
+                    <m:r>
+                      <a:rPr lang="it-IT" sz="2000" b="0" i="1" smtClean="0">
+                        <a:solidFill>
+                          <a:schemeClr val="bg1"/>
+                        </a:solidFill>
+                        <a:latin typeface="Cambria Math" panose="02040503050406030204" pitchFamily="18" charset="0"/>
+                      </a:rPr>
+                      <m:t> </m:t>
+                    </m:r>
+                    <m:r>
+                      <a:rPr lang="it-IT" sz="2000" b="0" i="1" smtClean="0">
+                        <a:solidFill>
+                          <a:schemeClr val="bg1"/>
+                        </a:solidFill>
+                        <a:latin typeface="Cambria Math" panose="02040503050406030204" pitchFamily="18" charset="0"/>
+                      </a:rPr>
+                      <m:t>h𝑖𝑔h𝑙𝑖𝑔h𝑡𝑠</m:t>
+                    </m:r>
+                    <m:r>
+                      <a:rPr lang="it-IT" sz="2000" i="1" smtClean="0">
+                        <a:solidFill>
+                          <a:schemeClr val="bg1"/>
+                        </a:solidFill>
+                        <a:latin typeface="Cambria Math" panose="02040503050406030204" pitchFamily="18" charset="0"/>
+                      </a:rPr>
+                      <m:t> </m:t>
+                    </m:r>
+                  </m:oMath>
+                </a14:m>
+                <a:endParaRPr lang="it-IT" sz="2000" i="1" dirty="0">
+                  <a:solidFill>
+                    <a:schemeClr val="bg1"/>
+                  </a:solidFill>
+                  <a:latin typeface="Cambria Math" panose="02040503050406030204" pitchFamily="18" charset="0"/>
+                </a:endParaRPr>
+              </a:p>
+              <a:p>
+                <a14:m>
+                  <m:oMath xmlns:m="http://schemas.openxmlformats.org/officeDocument/2006/math">
+                    <m:r>
+                      <a:rPr lang="it-IT" sz="2000" b="0" i="1" smtClean="0">
+                        <a:solidFill>
+                          <a:schemeClr val="bg1"/>
+                        </a:solidFill>
+                        <a:latin typeface="Cambria Math" panose="02040503050406030204" pitchFamily="18" charset="0"/>
+                      </a:rPr>
+                      <m:t>𝐾𝑒𝑦</m:t>
+                    </m:r>
+                    <m:r>
+                      <a:rPr lang="it-IT" sz="2000" b="0" i="1" smtClean="0">
+                        <a:solidFill>
+                          <a:schemeClr val="bg1"/>
+                        </a:solidFill>
+                        <a:latin typeface="Cambria Math" panose="02040503050406030204" pitchFamily="18" charset="0"/>
+                      </a:rPr>
+                      <m:t> </m:t>
+                    </m:r>
+                    <m:r>
+                      <a:rPr lang="it-IT" sz="2000" b="0" i="1" smtClean="0">
+                        <a:solidFill>
+                          <a:schemeClr val="bg1"/>
+                        </a:solidFill>
+                        <a:latin typeface="Cambria Math" panose="02040503050406030204" pitchFamily="18" charset="0"/>
+                      </a:rPr>
+                      <m:t>𝑝𝑎𝑟𝑡</m:t>
+                    </m:r>
+                  </m:oMath>
+                </a14:m>
+                <a:endParaRPr lang="it-IT" sz="2000" b="0" i="1" dirty="0">
+                  <a:solidFill>
+                    <a:schemeClr val="bg1"/>
+                  </a:solidFill>
+                  <a:latin typeface="Cambria Math" panose="02040503050406030204" pitchFamily="18" charset="0"/>
+                </a:endParaRPr>
+              </a:p>
+              <a:p>
+                <a14:m>
+                  <m:oMath xmlns:m="http://schemas.openxmlformats.org/officeDocument/2006/math">
+                    <m:r>
+                      <a:rPr lang="it-IT" sz="2000" b="0" i="1" smtClean="0">
+                        <a:solidFill>
+                          <a:schemeClr val="bg1"/>
+                        </a:solidFill>
+                        <a:latin typeface="Cambria Math" panose="02040503050406030204" pitchFamily="18" charset="0"/>
+                      </a:rPr>
+                      <m:t>𝐸𝑥𝑝𝑒𝑟𝑖𝑚𝑒𝑛𝑡𝑎𝑙</m:t>
+                    </m:r>
+                    <m:r>
+                      <a:rPr lang="it-IT" sz="2000" b="0" i="1" smtClean="0">
+                        <a:solidFill>
+                          <a:schemeClr val="bg1"/>
+                        </a:solidFill>
+                        <a:latin typeface="Cambria Math" panose="02040503050406030204" pitchFamily="18" charset="0"/>
+                      </a:rPr>
+                      <m:t> </m:t>
+                    </m:r>
+                    <m:r>
+                      <a:rPr lang="it-IT" sz="2000" b="0" i="1" smtClean="0">
+                        <a:solidFill>
+                          <a:schemeClr val="bg1"/>
+                        </a:solidFill>
+                        <a:latin typeface="Cambria Math" panose="02040503050406030204" pitchFamily="18" charset="0"/>
+                      </a:rPr>
+                      <m:t>𝑠𝑒𝑡𝑢𝑝</m:t>
+                    </m:r>
+                  </m:oMath>
+                </a14:m>
+                <a:endParaRPr lang="it-IT" sz="2000" b="0" dirty="0">
+                  <a:solidFill>
+                    <a:schemeClr val="bg1"/>
+                  </a:solidFill>
+                </a:endParaRPr>
+              </a:p>
+              <a:p>
+                <a14:m>
+                  <m:oMath xmlns:m="http://schemas.openxmlformats.org/officeDocument/2006/math">
+                    <m:r>
+                      <a:rPr lang="it-IT" sz="2000" b="0" i="1" smtClean="0">
+                        <a:solidFill>
+                          <a:schemeClr val="bg1"/>
+                        </a:solidFill>
+                        <a:latin typeface="Cambria Math" panose="02040503050406030204" pitchFamily="18" charset="0"/>
+                      </a:rPr>
+                      <m:t>𝑅𝑒𝑠𝑢𝑙𝑡</m:t>
+                    </m:r>
+                  </m:oMath>
+                </a14:m>
+                <a:endParaRPr lang="it-IT" sz="2000" b="0" dirty="0">
+                  <a:solidFill>
+                    <a:schemeClr val="bg1"/>
+                  </a:solidFill>
+                </a:endParaRPr>
+              </a:p>
+              <a:p>
+                <a14:m>
+                  <m:oMath xmlns:m="http://schemas.openxmlformats.org/officeDocument/2006/math">
+                    <m:r>
+                      <a:rPr lang="it-IT" sz="2000" b="0" i="1" smtClean="0">
+                        <a:solidFill>
+                          <a:schemeClr val="bg1"/>
+                        </a:solidFill>
+                        <a:latin typeface="Cambria Math" panose="02040503050406030204" pitchFamily="18" charset="0"/>
+                      </a:rPr>
+                      <m:t>𝐶𝑜𝑛𝑐𝑙𝑢𝑠𝑖𝑜𝑛</m:t>
+                    </m:r>
+                  </m:oMath>
+                </a14:m>
+                <a:endParaRPr lang="it-IT" sz="2000" b="0" dirty="0">
+                  <a:solidFill>
+                    <a:schemeClr val="bg1"/>
+                  </a:solidFill>
+                </a:endParaRPr>
+              </a:p>
+              <a:p>
+                <a:pPr marL="0" indent="0">
+                  <a:buNone/>
+                </a:pPr>
+                <a:endParaRPr lang="it-IT" sz="2000" b="0" dirty="0">
+                  <a:solidFill>
+                    <a:schemeClr val="bg1"/>
+                  </a:solidFill>
+                </a:endParaRPr>
+              </a:p>
+              <a:p>
+                <a:pPr marL="0" indent="0">
+                  <a:buNone/>
+                </a:pPr>
+                <a:endParaRPr lang="it-IT" sz="2000" b="0" dirty="0">
+                  <a:solidFill>
+                    <a:schemeClr val="bg1"/>
+                  </a:solidFill>
+                </a:endParaRPr>
+              </a:p>
+              <a:p>
+                <a:pPr marL="0" indent="0">
+                  <a:buNone/>
+                </a:pPr>
+                <a:endParaRPr lang="it-IT" sz="2000" b="0" dirty="0">
+                  <a:solidFill>
+                    <a:schemeClr val="bg1"/>
+                  </a:solidFill>
+                </a:endParaRPr>
+              </a:p>
+              <a:p>
+                <a:pPr marL="0" indent="0">
+                  <a:buNone/>
+                </a:pPr>
+                <a:endParaRPr lang="it-IT" sz="2000" dirty="0">
+                  <a:solidFill>
+                    <a:schemeClr val="bg1"/>
+                  </a:solidFill>
+                </a:endParaRPr>
+              </a:p>
+              <a:p>
+                <a:pPr marL="0" indent="0">
+                  <a:buNone/>
+                </a:pPr>
+                <a:endParaRPr lang="it-IT" sz="2000" dirty="0">
+                  <a:solidFill>
+                    <a:schemeClr val="bg1"/>
+                  </a:solidFill>
+                </a:endParaRPr>
+              </a:p>
+              <a:p>
+                <a:pPr marL="0" indent="0">
+                  <a:buNone/>
+                </a:pPr>
+                <a:endParaRPr lang="it-IT" sz="2000" dirty="0">
+                  <a:solidFill>
+                    <a:schemeClr val="bg1"/>
+                  </a:solidFill>
+                </a:endParaRPr>
+              </a:p>
+            </p:txBody>
+          </p:sp>
+        </mc:Choice>
+        <mc:Fallback>
+          <p:sp>
+            <p:nvSpPr>
+              <p:cNvPr id="3" name="Segnaposto contenuto 2">
+                <a:extLst>
+                  <a:ext uri="{FF2B5EF4-FFF2-40B4-BE49-F238E27FC236}">
+                    <a16:creationId xmlns:a16="http://schemas.microsoft.com/office/drawing/2014/main" id="{87749C20-3E74-425D-A4F4-173C6F20A4BC}"/>
+                  </a:ext>
+                </a:extLst>
+              </p:cNvPr>
+              <p:cNvSpPr>
+                <a:spLocks noGrp="1" noRot="1" noChangeAspect="1" noMove="1" noResize="1" noEditPoints="1" noAdjustHandles="1" noChangeArrowheads="1" noChangeShapeType="1" noTextEdit="1"/>
+              </p:cNvSpPr>
+              <p:nvPr>
+                <p:ph idx="1"/>
+              </p:nvPr>
+            </p:nvSpPr>
+            <p:spPr>
+              <a:xfrm>
+                <a:off x="643468" y="2638044"/>
+                <a:ext cx="3363974" cy="3415622"/>
+              </a:xfrm>
+              <a:blipFill>
+                <a:blip r:embed="rId2"/>
+                <a:stretch>
+                  <a:fillRect l="-1452" t="-1071" r="-6352"/>
+                </a:stretch>
+              </a:blipFill>
+            </p:spPr>
+            <p:txBody>
+              <a:bodyPr/>
+              <a:lstStyle/>
+              <a:p>
+                <a:r>
+                  <a:rPr lang="it-IT">
+                    <a:noFill/>
+                  </a:rPr>
+                  <a:t> </a:t>
+                </a:r>
+              </a:p>
+            </p:txBody>
+          </p:sp>
+        </mc:Fallback>
+      </mc:AlternateContent>
+      <p:pic>
+        <p:nvPicPr>
+          <p:cNvPr id="4" name="Picture 4" descr="Risultati immagini per meme neural network">
+            <a:extLst>
+              <a:ext uri="{FF2B5EF4-FFF2-40B4-BE49-F238E27FC236}">
+                <a16:creationId xmlns:a16="http://schemas.microsoft.com/office/drawing/2014/main" id="{A5C93303-5282-45E8-8445-C79E0DB11F46}"/>
+              </a:ext>
+            </a:extLst>
+          </p:cNvPr>
+          <p:cNvPicPr>
+            <a:picLocks noChangeAspect="1" noChangeArrowheads="1"/>
+          </p:cNvPicPr>
+          <p:nvPr/>
+        </p:nvPicPr>
+        <p:blipFill>
+          <a:blip r:embed="rId3">
+            <a:extLst>
+              <a:ext uri="{28A0092B-C50C-407E-A947-70E740481C1C}">
+                <a14:useLocalDpi xmlns:a14="http://schemas.microsoft.com/office/drawing/2010/main" val="0"/>
+              </a:ext>
+            </a:extLst>
+          </a:blip>
+          <a:srcRect/>
+          <a:stretch>
+            <a:fillRect/>
+          </a:stretch>
+        </p:blipFill>
+        <p:spPr bwMode="auto">
+          <a:xfrm>
+            <a:off x="6020505" y="1460289"/>
+            <a:ext cx="5162843" cy="3937422"/>
+          </a:xfrm>
+          <a:prstGeom prst="rect">
+            <a:avLst/>
+          </a:prstGeom>
+          <a:noFill/>
+          <a:extLst>
+            <a:ext uri="{909E8E84-426E-40DD-AFC4-6F175D3DCCD1}">
+              <a14:hiddenFill xmlns:a14="http://schemas.microsoft.com/office/drawing/2010/main">
+                <a:solidFill>
+                  <a:srgbClr val="FFFFFF"/>
+                </a:solidFill>
+              </a14:hiddenFill>
+            </a:ext>
+          </a:extLst>
+        </p:spPr>
+      </p:pic>
+    </p:spTree>
+    <p:extLst>
+      <p:ext uri="{BB962C8B-B14F-4D97-AF65-F5344CB8AC3E}">
+        <p14:creationId xmlns:p14="http://schemas.microsoft.com/office/powerpoint/2010/main" val="1681538123"/>
       </p:ext>
     </p:extLst>
   </p:cSld>

</xml_diff>

<commit_message>
Add some images Change seed Minor changes
</commit_message>
<xml_diff>
--- a/Presentation/SDU_SummerSchool_Presentation.pptx
+++ b/Presentation/SDU_SummerSchool_Presentation.pptx
@@ -30,8 +30,12 @@
     <p:sldId id="269" r:id="rId24"/>
     <p:sldId id="267" r:id="rId25"/>
     <p:sldId id="274" r:id="rId26"/>
-    <p:sldId id="277" r:id="rId27"/>
-    <p:sldId id="276" r:id="rId28"/>
+    <p:sldId id="288" r:id="rId27"/>
+    <p:sldId id="277" r:id="rId28"/>
+    <p:sldId id="287" r:id="rId29"/>
+    <p:sldId id="289" r:id="rId30"/>
+    <p:sldId id="290" r:id="rId31"/>
+    <p:sldId id="276" r:id="rId32"/>
   </p:sldIdLst>
   <p:sldSz cx="12192000" cy="6858000"/>
   <p:notesSz cx="6858000" cy="9144000"/>
@@ -138,6 +142,18 @@
 </p:presentation>
 </file>
 
+<file path=ppt/commentAuthors.xml><?xml version="1.0" encoding="utf-8"?>
+<p:cmAuthorLst xmlns:a="http://schemas.openxmlformats.org/drawingml/2006/main" xmlns:r="http://schemas.openxmlformats.org/officeDocument/2006/relationships" xmlns:p="http://schemas.openxmlformats.org/presentationml/2006/main">
+  <p:cmAuthor id="1" name="Michele Piffari" initials="MP" lastIdx="1" clrIdx="0">
+    <p:extLst>
+      <p:ext uri="{19B8F6BF-5375-455C-9EA6-DF929625EA0E}">
+        <p15:presenceInfo xmlns:p15="http://schemas.microsoft.com/office/powerpoint/2012/main" userId="b6d0602a24d3415c" providerId="Windows Live"/>
+      </p:ext>
+    </p:extLst>
+  </p:cmAuthor>
+</p:cmAuthorLst>
+</file>
+
 <file path=ppt/slideLayouts/slideLayout1.xml><?xml version="1.0" encoding="utf-8"?>
 <p:sldLayout xmlns:a="http://schemas.openxmlformats.org/drawingml/2006/main" xmlns:r="http://schemas.openxmlformats.org/officeDocument/2006/relationships" xmlns:p="http://schemas.openxmlformats.org/presentationml/2006/main" type="title" preserve="1">
   <p:cSld name="Diapositiva titolo">
@@ -285,7 +301,7 @@
           <a:p>
             <a:fld id="{8173B6D1-B9A7-4F74-ADCF-EF56F696349F}" type="datetimeFigureOut">
               <a:rPr lang="it-IT" smtClean="0"/>
-              <a:t>14/08/19</a:t>
+              <a:t>14/08/2019</a:t>
             </a:fld>
             <a:endParaRPr lang="it-IT"/>
           </a:p>
@@ -339,7 +355,7 @@
           <a:p>
             <a:fld id="{37521F19-B39A-4CF3-8059-E7EF6E631AA0}" type="slidenum">
               <a:rPr lang="it-IT" smtClean="0"/>
-              <a:t>‹#›</a:t>
+              <a:t>‹N›</a:t>
             </a:fld>
             <a:endParaRPr lang="it-IT"/>
           </a:p>
@@ -483,7 +499,7 @@
           <a:p>
             <a:fld id="{8173B6D1-B9A7-4F74-ADCF-EF56F696349F}" type="datetimeFigureOut">
               <a:rPr lang="it-IT" smtClean="0"/>
-              <a:t>14/08/19</a:t>
+              <a:t>14/08/2019</a:t>
             </a:fld>
             <a:endParaRPr lang="it-IT"/>
           </a:p>
@@ -537,7 +553,7 @@
           <a:p>
             <a:fld id="{37521F19-B39A-4CF3-8059-E7EF6E631AA0}" type="slidenum">
               <a:rPr lang="it-IT" smtClean="0"/>
-              <a:t>‹#›</a:t>
+              <a:t>‹N›</a:t>
             </a:fld>
             <a:endParaRPr lang="it-IT"/>
           </a:p>
@@ -691,7 +707,7 @@
           <a:p>
             <a:fld id="{8173B6D1-B9A7-4F74-ADCF-EF56F696349F}" type="datetimeFigureOut">
               <a:rPr lang="it-IT" smtClean="0"/>
-              <a:t>14/08/19</a:t>
+              <a:t>14/08/2019</a:t>
             </a:fld>
             <a:endParaRPr lang="it-IT"/>
           </a:p>
@@ -745,7 +761,7 @@
           <a:p>
             <a:fld id="{37521F19-B39A-4CF3-8059-E7EF6E631AA0}" type="slidenum">
               <a:rPr lang="it-IT" smtClean="0"/>
-              <a:t>‹#›</a:t>
+              <a:t>‹N›</a:t>
             </a:fld>
             <a:endParaRPr lang="it-IT"/>
           </a:p>
@@ -889,7 +905,7 @@
           <a:p>
             <a:fld id="{8173B6D1-B9A7-4F74-ADCF-EF56F696349F}" type="datetimeFigureOut">
               <a:rPr lang="it-IT" smtClean="0"/>
-              <a:t>14/08/19</a:t>
+              <a:t>14/08/2019</a:t>
             </a:fld>
             <a:endParaRPr lang="it-IT"/>
           </a:p>
@@ -943,7 +959,7 @@
           <a:p>
             <a:fld id="{37521F19-B39A-4CF3-8059-E7EF6E631AA0}" type="slidenum">
               <a:rPr lang="it-IT" smtClean="0"/>
-              <a:t>‹#›</a:t>
+              <a:t>‹N›</a:t>
             </a:fld>
             <a:endParaRPr lang="it-IT"/>
           </a:p>
@@ -1164,7 +1180,7 @@
           <a:p>
             <a:fld id="{8173B6D1-B9A7-4F74-ADCF-EF56F696349F}" type="datetimeFigureOut">
               <a:rPr lang="it-IT" smtClean="0"/>
-              <a:t>14/08/19</a:t>
+              <a:t>14/08/2019</a:t>
             </a:fld>
             <a:endParaRPr lang="it-IT"/>
           </a:p>
@@ -1218,7 +1234,7 @@
           <a:p>
             <a:fld id="{37521F19-B39A-4CF3-8059-E7EF6E631AA0}" type="slidenum">
               <a:rPr lang="it-IT" smtClean="0"/>
-              <a:t>‹#›</a:t>
+              <a:t>‹N›</a:t>
             </a:fld>
             <a:endParaRPr lang="it-IT"/>
           </a:p>
@@ -1429,7 +1445,7 @@
           <a:p>
             <a:fld id="{8173B6D1-B9A7-4F74-ADCF-EF56F696349F}" type="datetimeFigureOut">
               <a:rPr lang="it-IT" smtClean="0"/>
-              <a:t>14/08/19</a:t>
+              <a:t>14/08/2019</a:t>
             </a:fld>
             <a:endParaRPr lang="it-IT"/>
           </a:p>
@@ -1483,7 +1499,7 @@
           <a:p>
             <a:fld id="{37521F19-B39A-4CF3-8059-E7EF6E631AA0}" type="slidenum">
               <a:rPr lang="it-IT" smtClean="0"/>
-              <a:t>‹#›</a:t>
+              <a:t>‹N›</a:t>
             </a:fld>
             <a:endParaRPr lang="it-IT"/>
           </a:p>
@@ -1841,7 +1857,7 @@
           <a:p>
             <a:fld id="{8173B6D1-B9A7-4F74-ADCF-EF56F696349F}" type="datetimeFigureOut">
               <a:rPr lang="it-IT" smtClean="0"/>
-              <a:t>14/08/19</a:t>
+              <a:t>14/08/2019</a:t>
             </a:fld>
             <a:endParaRPr lang="it-IT"/>
           </a:p>
@@ -1895,7 +1911,7 @@
           <a:p>
             <a:fld id="{37521F19-B39A-4CF3-8059-E7EF6E631AA0}" type="slidenum">
               <a:rPr lang="it-IT" smtClean="0"/>
-              <a:t>‹#›</a:t>
+              <a:t>‹N›</a:t>
             </a:fld>
             <a:endParaRPr lang="it-IT"/>
           </a:p>
@@ -1982,7 +1998,7 @@
           <a:p>
             <a:fld id="{8173B6D1-B9A7-4F74-ADCF-EF56F696349F}" type="datetimeFigureOut">
               <a:rPr lang="it-IT" smtClean="0"/>
-              <a:t>14/08/19</a:t>
+              <a:t>14/08/2019</a:t>
             </a:fld>
             <a:endParaRPr lang="it-IT"/>
           </a:p>
@@ -2036,7 +2052,7 @@
           <a:p>
             <a:fld id="{37521F19-B39A-4CF3-8059-E7EF6E631AA0}" type="slidenum">
               <a:rPr lang="it-IT" smtClean="0"/>
-              <a:t>‹#›</a:t>
+              <a:t>‹N›</a:t>
             </a:fld>
             <a:endParaRPr lang="it-IT"/>
           </a:p>
@@ -2095,7 +2111,7 @@
           <a:p>
             <a:fld id="{8173B6D1-B9A7-4F74-ADCF-EF56F696349F}" type="datetimeFigureOut">
               <a:rPr lang="it-IT" smtClean="0"/>
-              <a:t>14/08/19</a:t>
+              <a:t>14/08/2019</a:t>
             </a:fld>
             <a:endParaRPr lang="it-IT"/>
           </a:p>
@@ -2149,7 +2165,7 @@
           <a:p>
             <a:fld id="{37521F19-B39A-4CF3-8059-E7EF6E631AA0}" type="slidenum">
               <a:rPr lang="it-IT" smtClean="0"/>
-              <a:t>‹#›</a:t>
+              <a:t>‹N›</a:t>
             </a:fld>
             <a:endParaRPr lang="it-IT"/>
           </a:p>
@@ -2406,7 +2422,7 @@
           <a:p>
             <a:fld id="{8173B6D1-B9A7-4F74-ADCF-EF56F696349F}" type="datetimeFigureOut">
               <a:rPr lang="it-IT" smtClean="0"/>
-              <a:t>14/08/19</a:t>
+              <a:t>14/08/2019</a:t>
             </a:fld>
             <a:endParaRPr lang="it-IT"/>
           </a:p>
@@ -2460,7 +2476,7 @@
           <a:p>
             <a:fld id="{37521F19-B39A-4CF3-8059-E7EF6E631AA0}" type="slidenum">
               <a:rPr lang="it-IT" smtClean="0"/>
-              <a:t>‹#›</a:t>
+              <a:t>‹N›</a:t>
             </a:fld>
             <a:endParaRPr lang="it-IT"/>
           </a:p>
@@ -2694,7 +2710,7 @@
           <a:p>
             <a:fld id="{8173B6D1-B9A7-4F74-ADCF-EF56F696349F}" type="datetimeFigureOut">
               <a:rPr lang="it-IT" smtClean="0"/>
-              <a:t>14/08/19</a:t>
+              <a:t>14/08/2019</a:t>
             </a:fld>
             <a:endParaRPr lang="it-IT"/>
           </a:p>
@@ -2748,7 +2764,7 @@
           <a:p>
             <a:fld id="{37521F19-B39A-4CF3-8059-E7EF6E631AA0}" type="slidenum">
               <a:rPr lang="it-IT" smtClean="0"/>
-              <a:t>‹#›</a:t>
+              <a:t>‹N›</a:t>
             </a:fld>
             <a:endParaRPr lang="it-IT"/>
           </a:p>
@@ -2935,7 +2951,7 @@
           <a:p>
             <a:fld id="{8173B6D1-B9A7-4F74-ADCF-EF56F696349F}" type="datetimeFigureOut">
               <a:rPr lang="it-IT" smtClean="0"/>
-              <a:t>14/08/19</a:t>
+              <a:t>14/08/2019</a:t>
             </a:fld>
             <a:endParaRPr lang="it-IT"/>
           </a:p>
@@ -3025,7 +3041,7 @@
           <a:p>
             <a:fld id="{37521F19-B39A-4CF3-8059-E7EF6E631AA0}" type="slidenum">
               <a:rPr lang="it-IT" smtClean="0"/>
-              <a:t>‹#›</a:t>
+              <a:t>‹N›</a:t>
             </a:fld>
             <a:endParaRPr lang="it-IT"/>
           </a:p>
@@ -9705,7 +9721,7 @@
           <p:cNvPr id="2" name="Titolo 1">
             <a:extLst>
               <a:ext uri="{FF2B5EF4-FFF2-40B4-BE49-F238E27FC236}">
-                <a16:creationId xmlns:a16="http://schemas.microsoft.com/office/drawing/2014/main" id="{AAE69284-7676-4D36-94CC-AC9F98B25151}"/>
+                <a16:creationId xmlns:a16="http://schemas.microsoft.com/office/drawing/2014/main" id="{AC92B383-7279-4902-A527-C849D93426B9}"/>
               </a:ext>
             </a:extLst>
           </p:cNvPr>
@@ -9722,23 +9738,287 @@
           <a:lstStyle/>
           <a:p>
             <a:r>
-              <a:rPr lang="it-IT" dirty="0"/>
-              <a:t>Single perceptron with </a:t>
-            </a:r>
-            <a:r>
-              <a:rPr lang="it-IT" dirty="0" err="1"/>
-              <a:t>irisDataset</a:t>
+              <a:rPr lang="it-IT" dirty="0">
+                <a:latin typeface="Cambria Math" panose="02040503050406030204" pitchFamily="18" charset="0"/>
+              </a:rPr>
+              <a:t>Single perceptron highlights</a:t>
+            </a:r>
+            <a:br>
+              <a:rPr lang="it-IT" i="1" dirty="0">
+                <a:solidFill>
+                  <a:schemeClr val="bg1"/>
+                </a:solidFill>
+                <a:latin typeface="Cambria Math" panose="02040503050406030204" pitchFamily="18" charset="0"/>
+              </a:rPr>
+            </a:br>
+            <a:r>
+              <a:rPr lang="it-IT" sz="3600" dirty="0" err="1"/>
+              <a:t>Try</a:t>
+            </a:r>
+            <a:r>
+              <a:rPr lang="it-IT" sz="3600" dirty="0"/>
+              <a:t> simple first: &amp;&amp; and ||</a:t>
             </a:r>
             <a:endParaRPr lang="it-IT" dirty="0"/>
           </a:p>
         </p:txBody>
       </p:sp>
-      <p:sp>
-        <p:nvSpPr>
-          <p:cNvPr id="3" name="Segnaposto contenuto 2">
-            <a:extLst>
-              <a:ext uri="{FF2B5EF4-FFF2-40B4-BE49-F238E27FC236}">
-                <a16:creationId xmlns:a16="http://schemas.microsoft.com/office/drawing/2014/main" id="{CD62F3CC-8E4C-4ADB-9CCA-2AED5B217F16}"/>
+      <p:pic>
+        <p:nvPicPr>
+          <p:cNvPr id="5" name="Segnaposto contenuto 4" descr="Immagine che contiene mappa, testo&#10;&#10;Descrizione generata automaticamente">
+            <a:extLst>
+              <a:ext uri="{FF2B5EF4-FFF2-40B4-BE49-F238E27FC236}">
+                <a16:creationId xmlns:a16="http://schemas.microsoft.com/office/drawing/2014/main" id="{39B4072D-CA9B-4ABC-971B-9C1DE64B0027}"/>
+              </a:ext>
+            </a:extLst>
+          </p:cNvPr>
+          <p:cNvPicPr>
+            <a:picLocks noGrp="1" noChangeAspect="1"/>
+          </p:cNvPicPr>
+          <p:nvPr>
+            <p:ph idx="1"/>
+          </p:nvPr>
+        </p:nvPicPr>
+        <p:blipFill>
+          <a:blip r:embed="rId2">
+            <a:extLst>
+              <a:ext uri="{28A0092B-C50C-407E-A947-70E740481C1C}">
+                <a14:useLocalDpi xmlns:a14="http://schemas.microsoft.com/office/drawing/2010/main" val="0"/>
+              </a:ext>
+            </a:extLst>
+          </a:blip>
+          <a:stretch>
+            <a:fillRect/>
+          </a:stretch>
+        </p:blipFill>
+        <p:spPr>
+          <a:xfrm>
+            <a:off x="838200" y="2039577"/>
+            <a:ext cx="4895850" cy="3895725"/>
+          </a:xfrm>
+        </p:spPr>
+      </p:pic>
+      <p:pic>
+        <p:nvPicPr>
+          <p:cNvPr id="7" name="Immagine 6" descr="Immagine che contiene testo, mappa&#10;&#10;Descrizione generata automaticamente">
+            <a:extLst>
+              <a:ext uri="{FF2B5EF4-FFF2-40B4-BE49-F238E27FC236}">
+                <a16:creationId xmlns:a16="http://schemas.microsoft.com/office/drawing/2014/main" id="{EEF44E48-F66D-4376-856E-D7D73D3606CE}"/>
+              </a:ext>
+            </a:extLst>
+          </p:cNvPr>
+          <p:cNvPicPr>
+            <a:picLocks noChangeAspect="1"/>
+          </p:cNvPicPr>
+          <p:nvPr/>
+        </p:nvPicPr>
+        <p:blipFill>
+          <a:blip r:embed="rId3">
+            <a:extLst>
+              <a:ext uri="{28A0092B-C50C-407E-A947-70E740481C1C}">
+                <a14:useLocalDpi xmlns:a14="http://schemas.microsoft.com/office/drawing/2010/main" val="0"/>
+              </a:ext>
+            </a:extLst>
+          </a:blip>
+          <a:stretch>
+            <a:fillRect/>
+          </a:stretch>
+        </p:blipFill>
+        <p:spPr>
+          <a:xfrm>
+            <a:off x="6457952" y="2001477"/>
+            <a:ext cx="4733925" cy="3933825"/>
+          </a:xfrm>
+          <a:prstGeom prst="rect">
+            <a:avLst/>
+          </a:prstGeom>
+        </p:spPr>
+      </p:pic>
+      <p:sp>
+        <p:nvSpPr>
+          <p:cNvPr id="11" name="CasellaDiTesto 10">
+            <a:extLst>
+              <a:ext uri="{FF2B5EF4-FFF2-40B4-BE49-F238E27FC236}">
+                <a16:creationId xmlns:a16="http://schemas.microsoft.com/office/drawing/2014/main" id="{3EAAD5F3-85C4-49D2-B133-CB58A8E58DDF}"/>
+              </a:ext>
+            </a:extLst>
+          </p:cNvPr>
+          <p:cNvSpPr txBox="1"/>
+          <p:nvPr/>
+        </p:nvSpPr>
+        <p:spPr>
+          <a:xfrm>
+            <a:off x="1828800" y="2967335"/>
+            <a:ext cx="367408" cy="523220"/>
+          </a:xfrm>
+          <a:prstGeom prst="rect">
+            <a:avLst/>
+          </a:prstGeom>
+          <a:noFill/>
+        </p:spPr>
+        <p:txBody>
+          <a:bodyPr wrap="none" rtlCol="0">
+            <a:spAutoFit/>
+          </a:bodyPr>
+          <a:lstStyle/>
+          <a:p>
+            <a:r>
+              <a:rPr lang="it-IT" sz="2800" b="1" dirty="0"/>
+              <a:t>0</a:t>
+            </a:r>
+            <a:endParaRPr lang="it-IT" sz="2000" b="1" dirty="0"/>
+          </a:p>
+        </p:txBody>
+      </p:sp>
+      <p:sp>
+        <p:nvSpPr>
+          <p:cNvPr id="12" name="Rettangolo 11">
+            <a:extLst>
+              <a:ext uri="{FF2B5EF4-FFF2-40B4-BE49-F238E27FC236}">
+                <a16:creationId xmlns:a16="http://schemas.microsoft.com/office/drawing/2014/main" id="{924E95A3-42D3-4EBB-90E1-40827B75E4F3}"/>
+              </a:ext>
+            </a:extLst>
+          </p:cNvPr>
+          <p:cNvSpPr/>
+          <p:nvPr/>
+        </p:nvSpPr>
+        <p:spPr>
+          <a:xfrm>
+            <a:off x="7067375" y="4131025"/>
+            <a:ext cx="367408" cy="523220"/>
+          </a:xfrm>
+          <a:prstGeom prst="rect">
+            <a:avLst/>
+          </a:prstGeom>
+        </p:spPr>
+        <p:txBody>
+          <a:bodyPr wrap="none">
+            <a:spAutoFit/>
+          </a:bodyPr>
+          <a:lstStyle/>
+          <a:p>
+            <a:r>
+              <a:rPr lang="it-IT" sz="2800" b="1" dirty="0"/>
+              <a:t>0</a:t>
+            </a:r>
+            <a:endParaRPr lang="it-IT" sz="2800" dirty="0"/>
+          </a:p>
+        </p:txBody>
+      </p:sp>
+      <p:sp>
+        <p:nvSpPr>
+          <p:cNvPr id="13" name="Rettangolo 12">
+            <a:extLst>
+              <a:ext uri="{FF2B5EF4-FFF2-40B4-BE49-F238E27FC236}">
+                <a16:creationId xmlns:a16="http://schemas.microsoft.com/office/drawing/2014/main" id="{DF7B04BE-93CD-482F-9802-7126C6806777}"/>
+              </a:ext>
+            </a:extLst>
+          </p:cNvPr>
+          <p:cNvSpPr/>
+          <p:nvPr/>
+        </p:nvSpPr>
+        <p:spPr>
+          <a:xfrm>
+            <a:off x="4975339" y="4392635"/>
+            <a:ext cx="367408" cy="523220"/>
+          </a:xfrm>
+          <a:prstGeom prst="rect">
+            <a:avLst/>
+          </a:prstGeom>
+        </p:spPr>
+        <p:txBody>
+          <a:bodyPr wrap="none">
+            <a:spAutoFit/>
+          </a:bodyPr>
+          <a:lstStyle/>
+          <a:p>
+            <a:r>
+              <a:rPr lang="it-IT" sz="2800" b="1" dirty="0"/>
+              <a:t>1</a:t>
+            </a:r>
+            <a:endParaRPr lang="it-IT" sz="1400" b="1" dirty="0"/>
+          </a:p>
+        </p:txBody>
+      </p:sp>
+      <p:sp>
+        <p:nvSpPr>
+          <p:cNvPr id="14" name="Rettangolo 13">
+            <a:extLst>
+              <a:ext uri="{FF2B5EF4-FFF2-40B4-BE49-F238E27FC236}">
+                <a16:creationId xmlns:a16="http://schemas.microsoft.com/office/drawing/2014/main" id="{90C8C51E-B096-4C03-AE20-FCB854D3B943}"/>
+              </a:ext>
+            </a:extLst>
+          </p:cNvPr>
+          <p:cNvSpPr/>
+          <p:nvPr/>
+        </p:nvSpPr>
+        <p:spPr>
+          <a:xfrm>
+            <a:off x="10614139" y="4427271"/>
+            <a:ext cx="393056" cy="584775"/>
+          </a:xfrm>
+          <a:prstGeom prst="rect">
+            <a:avLst/>
+          </a:prstGeom>
+        </p:spPr>
+        <p:txBody>
+          <a:bodyPr wrap="none">
+            <a:spAutoFit/>
+          </a:bodyPr>
+          <a:lstStyle/>
+          <a:p>
+            <a:r>
+              <a:rPr lang="it-IT" sz="3200" b="1" dirty="0"/>
+              <a:t>1</a:t>
+            </a:r>
+            <a:endParaRPr lang="it-IT" dirty="0"/>
+          </a:p>
+        </p:txBody>
+      </p:sp>
+    </p:spTree>
+    <p:extLst>
+      <p:ext uri="{BB962C8B-B14F-4D97-AF65-F5344CB8AC3E}">
+        <p14:creationId xmlns:p14="http://schemas.microsoft.com/office/powerpoint/2010/main" val="1905542170"/>
+      </p:ext>
+    </p:extLst>
+  </p:cSld>
+  <p:clrMapOvr>
+    <a:masterClrMapping/>
+  </p:clrMapOvr>
+</p:sld>
+</file>
+
+<file path=ppt/slides/slide27.xml><?xml version="1.0" encoding="utf-8"?>
+<p:sld xmlns:a="http://schemas.openxmlformats.org/drawingml/2006/main" xmlns:r="http://schemas.openxmlformats.org/officeDocument/2006/relationships" xmlns:p="http://schemas.openxmlformats.org/presentationml/2006/main">
+  <p:cSld>
+    <p:bg>
+      <p:bgPr>
+        <a:solidFill>
+          <a:schemeClr val="bg1"/>
+        </a:solidFill>
+        <a:effectLst/>
+      </p:bgPr>
+    </p:bg>
+    <p:spTree>
+      <p:nvGrpSpPr>
+        <p:cNvPr id="1" name=""/>
+        <p:cNvGrpSpPr/>
+        <p:nvPr/>
+      </p:nvGrpSpPr>
+      <p:grpSpPr>
+        <a:xfrm>
+          <a:off x="0" y="0"/>
+          <a:ext cx="0" cy="0"/>
+          <a:chOff x="0" y="0"/>
+          <a:chExt cx="0" cy="0"/>
+        </a:xfrm>
+      </p:grpSpPr>
+      <p:sp>
+        <p:nvSpPr>
+          <p:cNvPr id="2" name="Titolo 1">
+            <a:extLst>
+              <a:ext uri="{FF2B5EF4-FFF2-40B4-BE49-F238E27FC236}">
+                <a16:creationId xmlns:a16="http://schemas.microsoft.com/office/drawing/2014/main" id="{AAE69284-7676-4D36-94CC-AC9F98B25151}"/>
               </a:ext>
             </a:extLst>
           </p:cNvPr>
@@ -9746,15 +10026,462 @@
             <a:spLocks noGrp="1"/>
           </p:cNvSpPr>
           <p:nvPr>
+            <p:ph type="title"/>
+          </p:nvPr>
+        </p:nvSpPr>
+        <p:spPr>
+          <a:xfrm>
+            <a:off x="1524000" y="5652843"/>
+            <a:ext cx="9144000" cy="1099845"/>
+          </a:xfrm>
+        </p:spPr>
+        <p:txBody>
+          <a:bodyPr vert="horz" lIns="91440" tIns="45720" rIns="91440" bIns="45720" rtlCol="0" anchor="b">
+            <a:normAutofit fontScale="90000"/>
+          </a:bodyPr>
+          <a:lstStyle/>
+          <a:p>
+            <a:pPr algn="ctr"/>
+            <a:br>
+              <a:rPr lang="en-US" sz="5100" dirty="0"/>
+            </a:br>
+            <a:br>
+              <a:rPr lang="en-US" sz="5100" dirty="0"/>
+            </a:br>
+            <a:br>
+              <a:rPr lang="en-US" sz="5100" dirty="0"/>
+            </a:br>
+            <a:br>
+              <a:rPr lang="en-US" sz="5100" dirty="0"/>
+            </a:br>
+            <a:br>
+              <a:rPr lang="en-US" sz="5100" dirty="0"/>
+            </a:br>
+            <a:r>
+              <a:rPr lang="en-US" sz="5100" dirty="0"/>
+              <a:t>Let’s get harder…</a:t>
+            </a:r>
+            <a:br>
+              <a:rPr lang="en-US" sz="5100" dirty="0"/>
+            </a:br>
+            <a:r>
+              <a:rPr lang="en-US" sz="5100" dirty="0"/>
+              <a:t>Single perceptron with </a:t>
+            </a:r>
+            <a:r>
+              <a:rPr lang="en-US" sz="5100" dirty="0" err="1"/>
+              <a:t>irisDataset</a:t>
+            </a:r>
+            <a:endParaRPr lang="en-US" sz="5100" dirty="0"/>
+          </a:p>
+        </p:txBody>
+      </p:sp>
+      <p:sp>
+        <p:nvSpPr>
+          <p:cNvPr id="54" name="Rectangle 20">
+            <a:extLst>
+              <a:ext uri="{FF2B5EF4-FFF2-40B4-BE49-F238E27FC236}">
+                <a16:creationId xmlns:a16="http://schemas.microsoft.com/office/drawing/2014/main" id="{DAE885FA-583E-488C-A3B2-2647B84A8162}"/>
+              </a:ext>
+              <a:ext uri="{C183D7F6-B498-43B3-948B-1728B52AA6E4}">
+                <adec:decorative xmlns:adec="http://schemas.microsoft.com/office/drawing/2017/decorative" val="1"/>
+              </a:ext>
+            </a:extLst>
+          </p:cNvPr>
+          <p:cNvSpPr>
+            <a:spLocks noGrp="1" noRot="1" noChangeAspect="1" noMove="1" noResize="1" noEditPoints="1" noAdjustHandles="1" noChangeArrowheads="1" noChangeShapeType="1" noTextEdit="1"/>
+          </p:cNvSpPr>
+          <p:nvPr>
+            <p:extLst>
+              <p:ext uri="{386F3935-93C4-4BCD-93E2-E3B085C9AB24}">
+                <p16:designElem xmlns:p16="http://schemas.microsoft.com/office/powerpoint/2015/main" val="1"/>
+              </p:ext>
+            </p:extLst>
+          </p:nvPr>
+        </p:nvSpPr>
+        <p:spPr>
+          <a:xfrm>
+            <a:off x="0" y="0"/>
+            <a:ext cx="12192000" cy="4572000"/>
+          </a:xfrm>
+          <a:prstGeom prst="rect">
+            <a:avLst/>
+          </a:prstGeom>
+          <a:solidFill>
+            <a:srgbClr val="7D615C"/>
+          </a:solidFill>
+          <a:ln>
+            <a:noFill/>
+          </a:ln>
+        </p:spPr>
+        <p:style>
+          <a:lnRef idx="2">
+            <a:schemeClr val="accent1">
+              <a:shade val="50000"/>
+            </a:schemeClr>
+          </a:lnRef>
+          <a:fillRef idx="1">
+            <a:schemeClr val="accent1"/>
+          </a:fillRef>
+          <a:effectRef idx="0">
+            <a:schemeClr val="accent1"/>
+          </a:effectRef>
+          <a:fontRef idx="minor">
+            <a:schemeClr val="lt1"/>
+          </a:fontRef>
+        </p:style>
+        <p:txBody>
+          <a:bodyPr rtlCol="0" anchor="ctr"/>
+          <a:lstStyle/>
+          <a:p>
+            <a:pPr algn="ctr"/>
+            <a:endParaRPr lang="en-US"/>
+          </a:p>
+        </p:txBody>
+      </p:sp>
+      <p:sp>
+        <p:nvSpPr>
+          <p:cNvPr id="23" name="Rounded Rectangle 26">
+            <a:extLst>
+              <a:ext uri="{FF2B5EF4-FFF2-40B4-BE49-F238E27FC236}">
+                <a16:creationId xmlns:a16="http://schemas.microsoft.com/office/drawing/2014/main" id="{87B1CEC7-C2CE-4440-A0F7-0BE6B3AADB72}"/>
+              </a:ext>
+              <a:ext uri="{C183D7F6-B498-43B3-948B-1728B52AA6E4}">
+                <adec:decorative xmlns:adec="http://schemas.microsoft.com/office/drawing/2017/decorative" val="1"/>
+              </a:ext>
+            </a:extLst>
+          </p:cNvPr>
+          <p:cNvSpPr>
+            <a:spLocks noGrp="1" noRot="1" noChangeAspect="1" noMove="1" noResize="1" noEditPoints="1" noAdjustHandles="1" noChangeArrowheads="1" noChangeShapeType="1" noTextEdit="1"/>
+          </p:cNvSpPr>
+          <p:nvPr>
+            <p:extLst>
+              <p:ext uri="{386F3935-93C4-4BCD-93E2-E3B085C9AB24}">
+                <p16:designElem xmlns:p16="http://schemas.microsoft.com/office/powerpoint/2015/main" val="1"/>
+              </p:ext>
+            </p:extLst>
+          </p:nvPr>
+        </p:nvSpPr>
+        <p:spPr>
+          <a:xfrm>
+            <a:off x="321564" y="320843"/>
+            <a:ext cx="5613569" cy="3930315"/>
+          </a:xfrm>
+          <a:prstGeom prst="roundRect">
+            <a:avLst>
+              <a:gd name="adj" fmla="val 0"/>
+            </a:avLst>
+          </a:prstGeom>
+          <a:solidFill>
+            <a:srgbClr val="FFFFFF"/>
+          </a:solidFill>
+          <a:ln w="9525">
+            <a:solidFill>
+              <a:srgbClr val="C8CACA"/>
+            </a:solidFill>
+          </a:ln>
+          <a:effectLst>
+            <a:outerShdw blurRad="57150" dist="19050" dir="5400000" algn="t" rotWithShape="0">
+              <a:prstClr val="black">
+                <a:alpha val="63000"/>
+              </a:prstClr>
+            </a:outerShdw>
+          </a:effectLst>
+        </p:spPr>
+        <p:style>
+          <a:lnRef idx="2">
+            <a:schemeClr val="accent1">
+              <a:shade val="50000"/>
+            </a:schemeClr>
+          </a:lnRef>
+          <a:fillRef idx="1">
+            <a:schemeClr val="accent1"/>
+          </a:fillRef>
+          <a:effectRef idx="0">
+            <a:schemeClr val="accent1"/>
+          </a:effectRef>
+          <a:fontRef idx="minor">
+            <a:schemeClr val="lt1"/>
+          </a:fontRef>
+        </p:style>
+        <p:txBody>
+          <a:bodyPr rtlCol="0" anchor="ctr"/>
+          <a:lstStyle/>
+          <a:p>
+            <a:pPr algn="ctr"/>
+            <a:endParaRPr lang="en-US"/>
+          </a:p>
+        </p:txBody>
+      </p:sp>
+      <p:pic>
+        <p:nvPicPr>
+          <p:cNvPr id="55" name="Segnaposto contenuto 4" descr="Immagine che contiene testo, mappa&#10;&#10;Descrizione generata automaticamente">
+            <a:extLst>
+              <a:ext uri="{FF2B5EF4-FFF2-40B4-BE49-F238E27FC236}">
+                <a16:creationId xmlns:a16="http://schemas.microsoft.com/office/drawing/2014/main" id="{1C345535-5CEB-41FA-ADA4-54B89240C42E}"/>
+              </a:ext>
+            </a:extLst>
+          </p:cNvPr>
+          <p:cNvPicPr>
+            <a:picLocks noGrp="1" noChangeAspect="1"/>
+          </p:cNvPicPr>
+          <p:nvPr>
             <p:ph idx="1"/>
           </p:nvPr>
-        </p:nvSpPr>
-        <p:spPr/>
-        <p:txBody>
-          <a:bodyPr/>
+        </p:nvPicPr>
+        <p:blipFill>
+          <a:blip r:embed="rId2">
+            <a:extLst>
+              <a:ext uri="{28A0092B-C50C-407E-A947-70E740481C1C}">
+                <a14:useLocalDpi xmlns:a14="http://schemas.microsoft.com/office/drawing/2010/main" val="0"/>
+              </a:ext>
+            </a:extLst>
+          </a:blip>
+          <a:stretch>
+            <a:fillRect/>
+          </a:stretch>
+        </p:blipFill>
+        <p:spPr>
+          <a:xfrm>
+            <a:off x="1064498" y="640080"/>
+            <a:ext cx="4127699" cy="3291840"/>
+          </a:xfrm>
+          <a:prstGeom prst="rect">
+            <a:avLst/>
+          </a:prstGeom>
+        </p:spPr>
+      </p:pic>
+      <p:sp>
+        <p:nvSpPr>
+          <p:cNvPr id="25" name="Rounded Rectangle 16">
+            <a:extLst>
+              <a:ext uri="{FF2B5EF4-FFF2-40B4-BE49-F238E27FC236}">
+                <a16:creationId xmlns:a16="http://schemas.microsoft.com/office/drawing/2014/main" id="{7B0DBF0B-D7C2-4F15-94AE-315255824591}"/>
+              </a:ext>
+              <a:ext uri="{C183D7F6-B498-43B3-948B-1728B52AA6E4}">
+                <adec:decorative xmlns:adec="http://schemas.microsoft.com/office/drawing/2017/decorative" val="1"/>
+              </a:ext>
+            </a:extLst>
+          </p:cNvPr>
+          <p:cNvSpPr>
+            <a:spLocks noGrp="1" noRot="1" noChangeAspect="1" noMove="1" noResize="1" noEditPoints="1" noAdjustHandles="1" noChangeArrowheads="1" noChangeShapeType="1" noTextEdit="1"/>
+          </p:cNvSpPr>
+          <p:nvPr>
+            <p:extLst>
+              <p:ext uri="{386F3935-93C4-4BCD-93E2-E3B085C9AB24}">
+                <p16:designElem xmlns:p16="http://schemas.microsoft.com/office/powerpoint/2015/main" val="1"/>
+              </p:ext>
+            </p:extLst>
+          </p:nvPr>
+        </p:nvSpPr>
+        <p:spPr>
+          <a:xfrm>
+            <a:off x="6254749" y="320843"/>
+            <a:ext cx="5613569" cy="3930315"/>
+          </a:xfrm>
+          <a:prstGeom prst="roundRect">
+            <a:avLst>
+              <a:gd name="adj" fmla="val 0"/>
+            </a:avLst>
+          </a:prstGeom>
+          <a:solidFill>
+            <a:srgbClr val="FFFFFF"/>
+          </a:solidFill>
+          <a:ln w="9525">
+            <a:solidFill>
+              <a:srgbClr val="C8CACA"/>
+            </a:solidFill>
+          </a:ln>
+          <a:effectLst>
+            <a:outerShdw blurRad="57150" dist="19050" dir="5400000" algn="t" rotWithShape="0">
+              <a:prstClr val="black">
+                <a:alpha val="63000"/>
+              </a:prstClr>
+            </a:outerShdw>
+          </a:effectLst>
+        </p:spPr>
+        <p:style>
+          <a:lnRef idx="2">
+            <a:schemeClr val="accent1">
+              <a:shade val="50000"/>
+            </a:schemeClr>
+          </a:lnRef>
+          <a:fillRef idx="1">
+            <a:schemeClr val="accent1"/>
+          </a:fillRef>
+          <a:effectRef idx="0">
+            <a:schemeClr val="accent1"/>
+          </a:effectRef>
+          <a:fontRef idx="minor">
+            <a:schemeClr val="lt1"/>
+          </a:fontRef>
+        </p:style>
+        <p:txBody>
+          <a:bodyPr rtlCol="0" anchor="ctr"/>
           <a:lstStyle/>
           <a:p>
-            <a:endParaRPr lang="it-IT"/>
+            <a:pPr algn="ctr"/>
+            <a:endParaRPr lang="en-US"/>
+          </a:p>
+        </p:txBody>
+      </p:sp>
+      <p:pic>
+        <p:nvPicPr>
+          <p:cNvPr id="7" name="Immagine 6" descr="Immagine che contiene mappa&#10;&#10;Descrizione generata automaticamente">
+            <a:extLst>
+              <a:ext uri="{FF2B5EF4-FFF2-40B4-BE49-F238E27FC236}">
+                <a16:creationId xmlns:a16="http://schemas.microsoft.com/office/drawing/2014/main" id="{72FD80A2-F1BC-4E96-BF86-DF8C6D03EEEC}"/>
+              </a:ext>
+            </a:extLst>
+          </p:cNvPr>
+          <p:cNvPicPr>
+            <a:picLocks noChangeAspect="1"/>
+          </p:cNvPicPr>
+          <p:nvPr/>
+        </p:nvPicPr>
+        <p:blipFill>
+          <a:blip r:embed="rId3">
+            <a:extLst>
+              <a:ext uri="{28A0092B-C50C-407E-A947-70E740481C1C}">
+                <a14:useLocalDpi xmlns:a14="http://schemas.microsoft.com/office/drawing/2010/main" val="0"/>
+              </a:ext>
+            </a:extLst>
+          </a:blip>
+          <a:stretch>
+            <a:fillRect/>
+          </a:stretch>
+        </p:blipFill>
+        <p:spPr>
+          <a:xfrm>
+            <a:off x="6574365" y="974019"/>
+            <a:ext cx="4974336" cy="2623962"/>
+          </a:xfrm>
+          <a:prstGeom prst="rect">
+            <a:avLst/>
+          </a:prstGeom>
+        </p:spPr>
+      </p:pic>
+      <p:sp>
+        <p:nvSpPr>
+          <p:cNvPr id="8" name="CasellaDiTesto 7">
+            <a:extLst>
+              <a:ext uri="{FF2B5EF4-FFF2-40B4-BE49-F238E27FC236}">
+                <a16:creationId xmlns:a16="http://schemas.microsoft.com/office/drawing/2014/main" id="{5A3394B3-22E1-4398-AE04-7AED32966616}"/>
+              </a:ext>
+            </a:extLst>
+          </p:cNvPr>
+          <p:cNvSpPr txBox="1"/>
+          <p:nvPr/>
+        </p:nvSpPr>
+        <p:spPr>
+          <a:xfrm>
+            <a:off x="1107809" y="4651310"/>
+            <a:ext cx="4084388" cy="646331"/>
+          </a:xfrm>
+          <a:prstGeom prst="rect">
+            <a:avLst/>
+          </a:prstGeom>
+          <a:noFill/>
+        </p:spPr>
+        <p:txBody>
+          <a:bodyPr wrap="none" rtlCol="0">
+            <a:spAutoFit/>
+          </a:bodyPr>
+          <a:lstStyle/>
+          <a:p>
+            <a:pPr algn="ctr"/>
+            <a:r>
+              <a:rPr lang="it-IT" dirty="0"/>
+              <a:t>With 50 </a:t>
+            </a:r>
+            <a:r>
+              <a:rPr lang="it-IT" dirty="0" err="1"/>
+              <a:t>epochs</a:t>
+            </a:r>
+            <a:endParaRPr lang="it-IT" dirty="0"/>
+          </a:p>
+          <a:p>
+            <a:pPr algn="ctr"/>
+            <a:r>
+              <a:rPr lang="it-IT" dirty="0"/>
+              <a:t>One points of the dataset </a:t>
+            </a:r>
+            <a:r>
+              <a:rPr lang="it-IT" dirty="0" err="1"/>
+              <a:t>misclassificated</a:t>
+            </a:r>
+            <a:endParaRPr lang="it-IT" dirty="0"/>
+          </a:p>
+        </p:txBody>
+      </p:sp>
+      <p:sp>
+        <p:nvSpPr>
+          <p:cNvPr id="9" name="CasellaDiTesto 8">
+            <a:extLst>
+              <a:ext uri="{FF2B5EF4-FFF2-40B4-BE49-F238E27FC236}">
+                <a16:creationId xmlns:a16="http://schemas.microsoft.com/office/drawing/2014/main" id="{0FE9C343-8931-43C5-8B0B-C84BD22CABA2}"/>
+              </a:ext>
+            </a:extLst>
+          </p:cNvPr>
+          <p:cNvSpPr txBox="1"/>
+          <p:nvPr/>
+        </p:nvSpPr>
+        <p:spPr>
+          <a:xfrm>
+            <a:off x="6932459" y="4572000"/>
+            <a:ext cx="4258153" cy="923330"/>
+          </a:xfrm>
+          <a:prstGeom prst="rect">
+            <a:avLst/>
+          </a:prstGeom>
+          <a:noFill/>
+        </p:spPr>
+        <p:txBody>
+          <a:bodyPr wrap="none" rtlCol="0">
+            <a:spAutoFit/>
+          </a:bodyPr>
+          <a:lstStyle/>
+          <a:p>
+            <a:pPr algn="ctr"/>
+            <a:r>
+              <a:rPr lang="it-IT" dirty="0"/>
+              <a:t>With 1500 </a:t>
+            </a:r>
+            <a:r>
+              <a:rPr lang="it-IT" dirty="0" err="1"/>
+              <a:t>epochs</a:t>
+            </a:r>
+            <a:endParaRPr lang="it-IT" dirty="0"/>
+          </a:p>
+          <a:p>
+            <a:pPr algn="ctr"/>
+            <a:r>
+              <a:rPr lang="it-IT" dirty="0" err="1"/>
+              <a:t>All</a:t>
+            </a:r>
+            <a:r>
+              <a:rPr lang="it-IT" dirty="0"/>
+              <a:t> the points are </a:t>
+            </a:r>
+            <a:r>
+              <a:rPr lang="it-IT" dirty="0" err="1"/>
+              <a:t>correctly</a:t>
+            </a:r>
+            <a:r>
+              <a:rPr lang="it-IT" dirty="0"/>
+              <a:t> </a:t>
+            </a:r>
+            <a:r>
+              <a:rPr lang="it-IT" dirty="0" err="1"/>
+              <a:t>classified</a:t>
+            </a:r>
+            <a:r>
+              <a:rPr lang="it-IT" dirty="0"/>
+              <a:t> (YEAH)</a:t>
+            </a:r>
+          </a:p>
+          <a:p>
+            <a:endParaRPr lang="it-IT" dirty="0"/>
           </a:p>
         </p:txBody>
       </p:sp>
@@ -9771,7 +10498,852 @@
 </p:sld>
 </file>
 
-<file path=ppt/slides/slide27.xml><?xml version="1.0" encoding="utf-8"?>
+<file path=ppt/slides/slide28.xml><?xml version="1.0" encoding="utf-8"?>
+<p:sld xmlns:a="http://schemas.openxmlformats.org/drawingml/2006/main" xmlns:r="http://schemas.openxmlformats.org/officeDocument/2006/relationships" xmlns:p="http://schemas.openxmlformats.org/presentationml/2006/main">
+  <p:cSld>
+    <p:bg>
+      <p:bgPr>
+        <a:solidFill>
+          <a:schemeClr val="bg1"/>
+        </a:solidFill>
+        <a:effectLst/>
+      </p:bgPr>
+    </p:bg>
+    <p:spTree>
+      <p:nvGrpSpPr>
+        <p:cNvPr id="1" name=""/>
+        <p:cNvGrpSpPr/>
+        <p:nvPr/>
+      </p:nvGrpSpPr>
+      <p:grpSpPr>
+        <a:xfrm>
+          <a:off x="0" y="0"/>
+          <a:ext cx="0" cy="0"/>
+          <a:chOff x="0" y="0"/>
+          <a:chExt cx="0" cy="0"/>
+        </a:xfrm>
+      </p:grpSpPr>
+      <p:cxnSp>
+        <p:nvCxnSpPr>
+          <p:cNvPr id="12" name="Straight Connector 11">
+            <a:extLst>
+              <a:ext uri="{FF2B5EF4-FFF2-40B4-BE49-F238E27FC236}">
+                <a16:creationId xmlns:a16="http://schemas.microsoft.com/office/drawing/2014/main" id="{DB146403-F3D6-484B-B2ED-97F9565D0370}"/>
+              </a:ext>
+              <a:ext uri="{C183D7F6-B498-43B3-948B-1728B52AA6E4}">
+                <adec:decorative xmlns:adec="http://schemas.microsoft.com/office/drawing/2017/decorative" val="1"/>
+              </a:ext>
+            </a:extLst>
+          </p:cNvPr>
+          <p:cNvCxnSpPr>
+            <a:cxnSpLocks noGrp="1" noRot="1" noChangeAspect="1" noMove="1" noResize="1" noEditPoints="1" noAdjustHandles="1" noChangeArrowheads="1" noChangeShapeType="1"/>
+          </p:cNvCxnSpPr>
+          <p:nvPr>
+            <p:extLst>
+              <p:ext uri="{386F3935-93C4-4BCD-93E2-E3B085C9AB24}">
+                <p16:designElem xmlns:p16="http://schemas.microsoft.com/office/powerpoint/2015/main" val="1"/>
+              </p:ext>
+            </p:extLst>
+          </p:nvPr>
+        </p:nvCxnSpPr>
+        <p:spPr>
+          <a:xfrm>
+            <a:off x="6096000" y="477749"/>
+            <a:ext cx="0" cy="3657600"/>
+          </a:xfrm>
+          <a:prstGeom prst="line">
+            <a:avLst/>
+          </a:prstGeom>
+          <a:ln w="101600" cmpd="dbl">
+            <a:solidFill>
+              <a:srgbClr val="595959"/>
+            </a:solidFill>
+          </a:ln>
+        </p:spPr>
+        <p:style>
+          <a:lnRef idx="1">
+            <a:schemeClr val="accent1"/>
+          </a:lnRef>
+          <a:fillRef idx="0">
+            <a:schemeClr val="accent1"/>
+          </a:fillRef>
+          <a:effectRef idx="0">
+            <a:schemeClr val="accent1"/>
+          </a:effectRef>
+          <a:fontRef idx="minor">
+            <a:schemeClr val="tx1"/>
+          </a:fontRef>
+        </p:style>
+      </p:cxnSp>
+      <p:sp>
+        <p:nvSpPr>
+          <p:cNvPr id="14" name="Rectangle 13">
+            <a:extLst>
+              <a:ext uri="{FF2B5EF4-FFF2-40B4-BE49-F238E27FC236}">
+                <a16:creationId xmlns:a16="http://schemas.microsoft.com/office/drawing/2014/main" id="{823AC064-BC96-4F32-8AE1-B2FD38754823}"/>
+              </a:ext>
+              <a:ext uri="{C183D7F6-B498-43B3-948B-1728B52AA6E4}">
+                <adec:decorative xmlns:adec="http://schemas.microsoft.com/office/drawing/2017/decorative" val="1"/>
+              </a:ext>
+            </a:extLst>
+          </p:cNvPr>
+          <p:cNvSpPr>
+            <a:spLocks noGrp="1" noRot="1" noChangeAspect="1" noMove="1" noResize="1" noEditPoints="1" noAdjustHandles="1" noChangeArrowheads="1" noChangeShapeType="1" noTextEdit="1"/>
+          </p:cNvSpPr>
+          <p:nvPr>
+            <p:extLst>
+              <p:ext uri="{386F3935-93C4-4BCD-93E2-E3B085C9AB24}">
+                <p16:designElem xmlns:p16="http://schemas.microsoft.com/office/powerpoint/2015/main" val="1"/>
+              </p:ext>
+            </p:extLst>
+          </p:nvPr>
+        </p:nvSpPr>
+        <p:spPr bwMode="ltGray">
+          <a:xfrm>
+            <a:off x="378068" y="4633546"/>
+            <a:ext cx="11438793" cy="1844256"/>
+          </a:xfrm>
+          <a:prstGeom prst="rect">
+            <a:avLst/>
+          </a:prstGeom>
+          <a:solidFill>
+            <a:srgbClr val="404040"/>
+          </a:solidFill>
+          <a:ln w="127000" cap="sq" cmpd="thinThick">
+            <a:solidFill>
+              <a:srgbClr val="404040"/>
+            </a:solidFill>
+          </a:ln>
+        </p:spPr>
+        <p:style>
+          <a:lnRef idx="2">
+            <a:schemeClr val="accent1">
+              <a:shade val="50000"/>
+            </a:schemeClr>
+          </a:lnRef>
+          <a:fillRef idx="1">
+            <a:schemeClr val="accent1"/>
+          </a:fillRef>
+          <a:effectRef idx="0">
+            <a:schemeClr val="accent1"/>
+          </a:effectRef>
+          <a:fontRef idx="minor">
+            <a:schemeClr val="lt1"/>
+          </a:fontRef>
+        </p:style>
+        <p:txBody>
+          <a:bodyPr rtlCol="0" anchor="ctr"/>
+          <a:lstStyle/>
+          <a:p>
+            <a:pPr algn="ctr"/>
+            <a:endParaRPr lang="en-US"/>
+          </a:p>
+        </p:txBody>
+      </p:sp>
+      <p:sp>
+        <p:nvSpPr>
+          <p:cNvPr id="2" name="Titolo 1">
+            <a:extLst>
+              <a:ext uri="{FF2B5EF4-FFF2-40B4-BE49-F238E27FC236}">
+                <a16:creationId xmlns:a16="http://schemas.microsoft.com/office/drawing/2014/main" id="{581C8E7C-7298-4502-840E-16284F7BCABD}"/>
+              </a:ext>
+            </a:extLst>
+          </p:cNvPr>
+          <p:cNvSpPr>
+            <a:spLocks noGrp="1"/>
+          </p:cNvSpPr>
+          <p:nvPr>
+            <p:ph type="title"/>
+          </p:nvPr>
+        </p:nvSpPr>
+        <p:spPr>
+          <a:xfrm>
+            <a:off x="527538" y="4756638"/>
+            <a:ext cx="11139854" cy="930447"/>
+          </a:xfrm>
+        </p:spPr>
+        <p:txBody>
+          <a:bodyPr vert="horz" lIns="91440" tIns="45720" rIns="91440" bIns="45720" rtlCol="0" anchor="b">
+            <a:normAutofit/>
+          </a:bodyPr>
+          <a:lstStyle/>
+          <a:p>
+            <a:pPr algn="ctr"/>
+            <a:r>
+              <a:rPr lang="en-US" sz="5400">
+                <a:solidFill>
+                  <a:srgbClr val="FFFFFF"/>
+                </a:solidFill>
+              </a:rPr>
+              <a:t>Let get more harder… XOR port!!!</a:t>
+            </a:r>
+          </a:p>
+        </p:txBody>
+      </p:sp>
+      <p:pic>
+        <p:nvPicPr>
+          <p:cNvPr id="5" name="Segnaposto contenuto 4" descr="Immagine che contiene testo, mappa&#10;&#10;Descrizione generata automaticamente">
+            <a:extLst>
+              <a:ext uri="{FF2B5EF4-FFF2-40B4-BE49-F238E27FC236}">
+                <a16:creationId xmlns:a16="http://schemas.microsoft.com/office/drawing/2014/main" id="{B3B59158-16B0-41F3-BD7E-1EA2BD8AA98F}"/>
+              </a:ext>
+            </a:extLst>
+          </p:cNvPr>
+          <p:cNvPicPr>
+            <a:picLocks noGrp="1" noChangeAspect="1"/>
+          </p:cNvPicPr>
+          <p:nvPr>
+            <p:ph idx="1"/>
+          </p:nvPr>
+        </p:nvPicPr>
+        <p:blipFill>
+          <a:blip r:embed="rId2">
+            <a:extLst>
+              <a:ext uri="{28A0092B-C50C-407E-A947-70E740481C1C}">
+                <a14:useLocalDpi xmlns:a14="http://schemas.microsoft.com/office/drawing/2010/main" val="0"/>
+              </a:ext>
+            </a:extLst>
+          </a:blip>
+          <a:stretch>
+            <a:fillRect/>
+          </a:stretch>
+        </p:blipFill>
+        <p:spPr>
+          <a:xfrm>
+            <a:off x="587914" y="307731"/>
+            <a:ext cx="4920168" cy="3997637"/>
+          </a:xfrm>
+          <a:prstGeom prst="rect">
+            <a:avLst/>
+          </a:prstGeom>
+        </p:spPr>
+      </p:pic>
+      <p:pic>
+        <p:nvPicPr>
+          <p:cNvPr id="7" name="Immagine 6" descr="Immagine che contiene testo, mappa&#10;&#10;Descrizione generata automaticamente">
+            <a:extLst>
+              <a:ext uri="{FF2B5EF4-FFF2-40B4-BE49-F238E27FC236}">
+                <a16:creationId xmlns:a16="http://schemas.microsoft.com/office/drawing/2014/main" id="{5E614948-4208-4A73-B1F6-EA597DB64E4B}"/>
+              </a:ext>
+            </a:extLst>
+          </p:cNvPr>
+          <p:cNvPicPr>
+            <a:picLocks noChangeAspect="1"/>
+          </p:cNvPicPr>
+          <p:nvPr/>
+        </p:nvPicPr>
+        <p:blipFill>
+          <a:blip r:embed="rId3">
+            <a:extLst>
+              <a:ext uri="{28A0092B-C50C-407E-A947-70E740481C1C}">
+                <a14:useLocalDpi xmlns:a14="http://schemas.microsoft.com/office/drawing/2010/main" val="0"/>
+              </a:ext>
+            </a:extLst>
+          </a:blip>
+          <a:stretch>
+            <a:fillRect/>
+          </a:stretch>
+        </p:blipFill>
+        <p:spPr>
+          <a:xfrm>
+            <a:off x="6676324" y="307731"/>
+            <a:ext cx="4935354" cy="3997637"/>
+          </a:xfrm>
+          <a:prstGeom prst="rect">
+            <a:avLst/>
+          </a:prstGeom>
+        </p:spPr>
+      </p:pic>
+      <p:cxnSp>
+        <p:nvCxnSpPr>
+          <p:cNvPr id="16" name="Straight Connector 15">
+            <a:extLst>
+              <a:ext uri="{FF2B5EF4-FFF2-40B4-BE49-F238E27FC236}">
+                <a16:creationId xmlns:a16="http://schemas.microsoft.com/office/drawing/2014/main" id="{7E7C77BC-7138-40B1-A15B-20F57A494629}"/>
+              </a:ext>
+              <a:ext uri="{C183D7F6-B498-43B3-948B-1728B52AA6E4}">
+                <adec:decorative xmlns:adec="http://schemas.microsoft.com/office/drawing/2017/decorative" val="1"/>
+              </a:ext>
+            </a:extLst>
+          </p:cNvPr>
+          <p:cNvCxnSpPr>
+            <a:cxnSpLocks noGrp="1" noRot="1" noChangeAspect="1" noMove="1" noResize="1" noEditPoints="1" noAdjustHandles="1" noChangeArrowheads="1" noChangeShapeType="1"/>
+          </p:cNvCxnSpPr>
+          <p:nvPr>
+            <p:extLst>
+              <p:ext uri="{386F3935-93C4-4BCD-93E2-E3B085C9AB24}">
+                <p16:designElem xmlns:p16="http://schemas.microsoft.com/office/powerpoint/2015/main" val="1"/>
+              </p:ext>
+            </p:extLst>
+          </p:nvPr>
+        </p:nvCxnSpPr>
+        <p:spPr>
+          <a:xfrm>
+            <a:off x="2209800" y="5738691"/>
+            <a:ext cx="7772400" cy="0"/>
+          </a:xfrm>
+          <a:prstGeom prst="line">
+            <a:avLst/>
+          </a:prstGeom>
+          <a:ln w="22225">
+            <a:solidFill>
+              <a:srgbClr val="D9D9D9"/>
+            </a:solidFill>
+          </a:ln>
+        </p:spPr>
+        <p:style>
+          <a:lnRef idx="1">
+            <a:schemeClr val="accent1"/>
+          </a:lnRef>
+          <a:fillRef idx="0">
+            <a:schemeClr val="accent1"/>
+          </a:fillRef>
+          <a:effectRef idx="0">
+            <a:schemeClr val="accent1"/>
+          </a:effectRef>
+          <a:fontRef idx="minor">
+            <a:schemeClr val="tx1"/>
+          </a:fontRef>
+        </p:style>
+      </p:cxnSp>
+    </p:spTree>
+    <p:extLst>
+      <p:ext uri="{BB962C8B-B14F-4D97-AF65-F5344CB8AC3E}">
+        <p14:creationId xmlns:p14="http://schemas.microsoft.com/office/powerpoint/2010/main" val="2696507"/>
+      </p:ext>
+    </p:extLst>
+  </p:cSld>
+  <p:clrMapOvr>
+    <a:masterClrMapping/>
+  </p:clrMapOvr>
+</p:sld>
+</file>
+
+<file path=ppt/slides/slide29.xml><?xml version="1.0" encoding="utf-8"?>
+<p:sld xmlns:a="http://schemas.openxmlformats.org/drawingml/2006/main" xmlns:r="http://schemas.openxmlformats.org/officeDocument/2006/relationships" xmlns:p="http://schemas.openxmlformats.org/presentationml/2006/main">
+  <p:cSld>
+    <p:spTree>
+      <p:nvGrpSpPr>
+        <p:cNvPr id="1" name=""/>
+        <p:cNvGrpSpPr/>
+        <p:nvPr/>
+      </p:nvGrpSpPr>
+      <p:grpSpPr>
+        <a:xfrm>
+          <a:off x="0" y="0"/>
+          <a:ext cx="0" cy="0"/>
+          <a:chOff x="0" y="0"/>
+          <a:chExt cx="0" cy="0"/>
+        </a:xfrm>
+      </p:grpSpPr>
+      <p:sp>
+        <p:nvSpPr>
+          <p:cNvPr id="2" name="Titolo 1">
+            <a:extLst>
+              <a:ext uri="{FF2B5EF4-FFF2-40B4-BE49-F238E27FC236}">
+                <a16:creationId xmlns:a16="http://schemas.microsoft.com/office/drawing/2014/main" id="{0051DA10-0D2F-4C60-812F-B94E67334105}"/>
+              </a:ext>
+            </a:extLst>
+          </p:cNvPr>
+          <p:cNvSpPr>
+            <a:spLocks noGrp="1"/>
+          </p:cNvSpPr>
+          <p:nvPr>
+            <p:ph type="title"/>
+          </p:nvPr>
+        </p:nvSpPr>
+        <p:spPr/>
+        <p:txBody>
+          <a:bodyPr>
+            <a:normAutofit fontScale="90000"/>
+          </a:bodyPr>
+          <a:lstStyle/>
+          <a:p>
+            <a:r>
+              <a:rPr lang="it-IT" dirty="0"/>
+              <a:t>So… </a:t>
+            </a:r>
+            <a:r>
+              <a:rPr lang="it-IT" dirty="0" err="1"/>
+              <a:t>We</a:t>
+            </a:r>
+            <a:r>
+              <a:rPr lang="it-IT" dirty="0"/>
+              <a:t> </a:t>
+            </a:r>
+            <a:r>
+              <a:rPr lang="it-IT" dirty="0" err="1"/>
+              <a:t>need</a:t>
+            </a:r>
+            <a:r>
+              <a:rPr lang="it-IT" dirty="0"/>
+              <a:t> more bound to </a:t>
+            </a:r>
+            <a:r>
+              <a:rPr lang="it-IT" dirty="0" err="1"/>
+              <a:t>evaluate</a:t>
+            </a:r>
+            <a:r>
+              <a:rPr lang="it-IT" dirty="0"/>
+              <a:t> the points, and so </a:t>
+            </a:r>
+            <a:r>
+              <a:rPr lang="it-IT" dirty="0" err="1"/>
+              <a:t>many</a:t>
+            </a:r>
+            <a:r>
+              <a:rPr lang="it-IT" dirty="0"/>
+              <a:t> </a:t>
+            </a:r>
+            <a:r>
+              <a:rPr lang="it-IT" dirty="0" err="1"/>
+              <a:t>neurons</a:t>
+            </a:r>
+            <a:r>
+              <a:rPr lang="it-IT" dirty="0"/>
+              <a:t>.</a:t>
+            </a:r>
+            <a:br>
+              <a:rPr lang="it-IT" dirty="0"/>
+            </a:br>
+            <a:r>
+              <a:rPr lang="it-IT" dirty="0"/>
+              <a:t>So… multi </a:t>
+            </a:r>
+            <a:r>
+              <a:rPr lang="it-IT" dirty="0" err="1"/>
+              <a:t>layer</a:t>
+            </a:r>
+            <a:r>
+              <a:rPr lang="it-IT" dirty="0"/>
+              <a:t> perceptron!</a:t>
+            </a:r>
+          </a:p>
+        </p:txBody>
+      </p:sp>
+      <p:sp>
+        <p:nvSpPr>
+          <p:cNvPr id="3" name="Segnaposto contenuto 2">
+            <a:extLst>
+              <a:ext uri="{FF2B5EF4-FFF2-40B4-BE49-F238E27FC236}">
+                <a16:creationId xmlns:a16="http://schemas.microsoft.com/office/drawing/2014/main" id="{A9D1F76E-6A26-4C39-A681-41CB4AEE4B8D}"/>
+              </a:ext>
+            </a:extLst>
+          </p:cNvPr>
+          <p:cNvSpPr>
+            <a:spLocks noGrp="1"/>
+          </p:cNvSpPr>
+          <p:nvPr>
+            <p:ph idx="1"/>
+          </p:nvPr>
+        </p:nvSpPr>
+        <p:spPr/>
+        <p:txBody>
+          <a:bodyPr/>
+          <a:lstStyle/>
+          <a:p>
+            <a:pPr marL="0" indent="0">
+              <a:buNone/>
+            </a:pPr>
+            <a:r>
+              <a:rPr lang="it-IT" dirty="0"/>
+              <a:t>Key parts:</a:t>
+            </a:r>
+          </a:p>
+          <a:p>
+            <a:endParaRPr lang="it-IT" dirty="0"/>
+          </a:p>
+        </p:txBody>
+      </p:sp>
+    </p:spTree>
+    <p:extLst>
+      <p:ext uri="{BB962C8B-B14F-4D97-AF65-F5344CB8AC3E}">
+        <p14:creationId xmlns:p14="http://schemas.microsoft.com/office/powerpoint/2010/main" val="2463171951"/>
+      </p:ext>
+    </p:extLst>
+  </p:cSld>
+  <p:clrMapOvr>
+    <a:masterClrMapping/>
+  </p:clrMapOvr>
+</p:sld>
+</file>
+
+<file path=ppt/slides/slide3.xml><?xml version="1.0" encoding="utf-8"?>
+<p:sld xmlns:a="http://schemas.openxmlformats.org/drawingml/2006/main" xmlns:r="http://schemas.openxmlformats.org/officeDocument/2006/relationships" xmlns:p="http://schemas.openxmlformats.org/presentationml/2006/main">
+  <p:cSld>
+    <p:spTree>
+      <p:nvGrpSpPr>
+        <p:cNvPr id="1" name=""/>
+        <p:cNvGrpSpPr/>
+        <p:nvPr/>
+      </p:nvGrpSpPr>
+      <p:grpSpPr>
+        <a:xfrm>
+          <a:off x="0" y="0"/>
+          <a:ext cx="0" cy="0"/>
+          <a:chOff x="0" y="0"/>
+          <a:chExt cx="0" cy="0"/>
+        </a:xfrm>
+      </p:grpSpPr>
+      <p:pic>
+        <p:nvPicPr>
+          <p:cNvPr id="14" name="Picture 13">
+            <a:extLst>
+              <a:ext uri="{FF2B5EF4-FFF2-40B4-BE49-F238E27FC236}">
+                <a16:creationId xmlns:a16="http://schemas.microsoft.com/office/drawing/2014/main" id="{EDBA63DC-2BD3-894B-AA56-258568C68045}"/>
+              </a:ext>
+            </a:extLst>
+          </p:cNvPr>
+          <p:cNvPicPr>
+            <a:picLocks noChangeAspect="1"/>
+          </p:cNvPicPr>
+          <p:nvPr/>
+        </p:nvPicPr>
+        <p:blipFill>
+          <a:blip r:embed="rId2">
+            <a:alphaModFix amt="12000"/>
+            <a:extLst>
+              <a:ext uri="{28A0092B-C50C-407E-A947-70E740481C1C}">
+                <a14:useLocalDpi xmlns:a14="http://schemas.microsoft.com/office/drawing/2010/main" val="0"/>
+              </a:ext>
+            </a:extLst>
+          </a:blip>
+          <a:stretch>
+            <a:fillRect/>
+          </a:stretch>
+        </p:blipFill>
+        <p:spPr>
+          <a:xfrm>
+            <a:off x="4414469" y="-135467"/>
+            <a:ext cx="7494796" cy="6858000"/>
+          </a:xfrm>
+          <a:prstGeom prst="rect">
+            <a:avLst/>
+          </a:prstGeom>
+        </p:spPr>
+      </p:pic>
+      <p:sp>
+        <p:nvSpPr>
+          <p:cNvPr id="2" name="Titolo 1">
+            <a:extLst>
+              <a:ext uri="{FF2B5EF4-FFF2-40B4-BE49-F238E27FC236}">
+                <a16:creationId xmlns:a16="http://schemas.microsoft.com/office/drawing/2014/main" id="{7C3CD4E9-DB64-4918-82F7-8F8A8315170B}"/>
+              </a:ext>
+            </a:extLst>
+          </p:cNvPr>
+          <p:cNvSpPr>
+            <a:spLocks noGrp="1"/>
+          </p:cNvSpPr>
+          <p:nvPr>
+            <p:ph type="title"/>
+          </p:nvPr>
+        </p:nvSpPr>
+        <p:spPr>
+          <a:xfrm>
+            <a:off x="838200" y="0"/>
+            <a:ext cx="10515600" cy="1325563"/>
+          </a:xfrm>
+        </p:spPr>
+        <p:txBody>
+          <a:bodyPr/>
+          <a:lstStyle/>
+          <a:p>
+            <a:r>
+              <a:rPr lang="it-IT" dirty="0" err="1"/>
+              <a:t>Experimental</a:t>
+            </a:r>
+            <a:r>
+              <a:rPr lang="it-IT" dirty="0"/>
+              <a:t> Setup</a:t>
+            </a:r>
+          </a:p>
+        </p:txBody>
+      </p:sp>
+      <p:sp>
+        <p:nvSpPr>
+          <p:cNvPr id="3" name="Segnaposto contenuto 2">
+            <a:extLst>
+              <a:ext uri="{FF2B5EF4-FFF2-40B4-BE49-F238E27FC236}">
+                <a16:creationId xmlns:a16="http://schemas.microsoft.com/office/drawing/2014/main" id="{A3AA93D2-B2C6-4C4F-A26E-E69FFCB3F5B2}"/>
+              </a:ext>
+            </a:extLst>
+          </p:cNvPr>
+          <p:cNvSpPr>
+            <a:spLocks noGrp="1"/>
+          </p:cNvSpPr>
+          <p:nvPr>
+            <p:ph idx="1"/>
+          </p:nvPr>
+        </p:nvSpPr>
+        <p:spPr>
+          <a:xfrm>
+            <a:off x="838200" y="1825625"/>
+            <a:ext cx="10515600" cy="4351338"/>
+          </a:xfrm>
+        </p:spPr>
+        <p:txBody>
+          <a:bodyPr/>
+          <a:lstStyle/>
+          <a:p>
+            <a:r>
+              <a:rPr lang="it-IT" dirty="0"/>
+              <a:t>RNG </a:t>
+            </a:r>
+            <a:r>
+              <a:rPr lang="it-IT" dirty="0" err="1"/>
+              <a:t>seed</a:t>
+            </a:r>
+            <a:r>
+              <a:rPr lang="it-IT" dirty="0"/>
+              <a:t> </a:t>
+            </a:r>
+            <a:r>
+              <a:rPr lang="it-IT" dirty="0" err="1"/>
+              <a:t>fixed</a:t>
+            </a:r>
+            <a:r>
+              <a:rPr lang="it-IT" dirty="0"/>
+              <a:t> </a:t>
+            </a:r>
+            <a:r>
+              <a:rPr lang="it-IT" dirty="0" err="1"/>
+              <a:t>at</a:t>
+            </a:r>
+            <a:r>
+              <a:rPr lang="it-IT" dirty="0"/>
+              <a:t> 420 for </a:t>
+            </a:r>
+            <a:r>
+              <a:rPr lang="it-IT" dirty="0" err="1"/>
+              <a:t>all</a:t>
+            </a:r>
+            <a:r>
+              <a:rPr lang="it-IT" dirty="0"/>
+              <a:t> </a:t>
+            </a:r>
+            <a:r>
+              <a:rPr lang="it-IT" dirty="0" err="1"/>
+              <a:t>runs</a:t>
+            </a:r>
+            <a:r>
+              <a:rPr lang="it-IT" dirty="0"/>
+              <a:t> </a:t>
+            </a:r>
+          </a:p>
+          <a:p>
+            <a:r>
+              <a:rPr lang="it-IT" dirty="0" err="1"/>
+              <a:t>Size</a:t>
+            </a:r>
+            <a:r>
+              <a:rPr lang="it-IT" dirty="0"/>
+              <a:t> of </a:t>
+            </a:r>
+            <a:r>
+              <a:rPr lang="it-IT" dirty="0" err="1"/>
+              <a:t>bandit</a:t>
+            </a:r>
+            <a:r>
+              <a:rPr lang="it-IT" dirty="0"/>
+              <a:t> </a:t>
+            </a:r>
+            <a:r>
+              <a:rPr lang="it-IT" dirty="0" err="1"/>
+              <a:t>reward</a:t>
+            </a:r>
+            <a:r>
+              <a:rPr lang="it-IT" dirty="0"/>
+              <a:t> </a:t>
+            </a:r>
+            <a:r>
+              <a:rPr lang="it-IT" dirty="0" err="1"/>
+              <a:t>interval</a:t>
+            </a:r>
+            <a:r>
+              <a:rPr lang="it-IT" dirty="0"/>
+              <a:t> </a:t>
+            </a:r>
+            <a:r>
+              <a:rPr lang="it-IT" dirty="0" err="1"/>
+              <a:t>fixed</a:t>
+            </a:r>
+            <a:r>
+              <a:rPr lang="it-IT" dirty="0"/>
+              <a:t> </a:t>
+            </a:r>
+            <a:r>
+              <a:rPr lang="it-IT" dirty="0" err="1"/>
+              <a:t>at</a:t>
+            </a:r>
+            <a:r>
+              <a:rPr lang="it-IT" dirty="0"/>
+              <a:t> 8</a:t>
+            </a:r>
+          </a:p>
+          <a:p>
+            <a:r>
+              <a:rPr lang="it-IT" dirty="0" err="1"/>
+              <a:t>Interval</a:t>
+            </a:r>
+            <a:r>
+              <a:rPr lang="it-IT" dirty="0"/>
+              <a:t> </a:t>
+            </a:r>
+            <a:r>
+              <a:rPr lang="it-IT" dirty="0" err="1"/>
+              <a:t>mean</a:t>
+            </a:r>
+            <a:r>
+              <a:rPr lang="it-IT" dirty="0"/>
+              <a:t> </a:t>
+            </a:r>
+            <a:r>
+              <a:rPr lang="it-IT" dirty="0" err="1"/>
+              <a:t>ranging</a:t>
+            </a:r>
+            <a:r>
+              <a:rPr lang="it-IT" dirty="0"/>
+              <a:t> from 0-5</a:t>
+            </a:r>
+          </a:p>
+          <a:p>
+            <a:r>
+              <a:rPr lang="it-IT" dirty="0" err="1"/>
+              <a:t>Mean</a:t>
+            </a:r>
+            <a:r>
+              <a:rPr lang="it-IT" dirty="0"/>
+              <a:t> </a:t>
+            </a:r>
+            <a:r>
+              <a:rPr lang="it-IT" dirty="0" err="1"/>
+              <a:t>picked</a:t>
+            </a:r>
+            <a:r>
+              <a:rPr lang="it-IT" dirty="0"/>
+              <a:t> </a:t>
+            </a:r>
+            <a:r>
+              <a:rPr lang="it-IT" dirty="0" err="1"/>
+              <a:t>at</a:t>
+            </a:r>
+            <a:r>
+              <a:rPr lang="it-IT" dirty="0"/>
+              <a:t> random</a:t>
+            </a:r>
+          </a:p>
+          <a:p>
+            <a:pPr marL="0" indent="0">
+              <a:buNone/>
+            </a:pPr>
+            <a:endParaRPr lang="it-IT" dirty="0"/>
+          </a:p>
+          <a:p>
+            <a:endParaRPr lang="it-IT" dirty="0"/>
+          </a:p>
+        </p:txBody>
+      </p:sp>
+    </p:spTree>
+    <p:extLst>
+      <p:ext uri="{BB962C8B-B14F-4D97-AF65-F5344CB8AC3E}">
+        <p14:creationId xmlns:p14="http://schemas.microsoft.com/office/powerpoint/2010/main" val="1747367825"/>
+      </p:ext>
+    </p:extLst>
+  </p:cSld>
+  <p:clrMapOvr>
+    <a:masterClrMapping/>
+  </p:clrMapOvr>
+</p:sld>
+</file>
+
+<file path=ppt/slides/slide30.xml><?xml version="1.0" encoding="utf-8"?>
+<p:sld xmlns:a="http://schemas.openxmlformats.org/drawingml/2006/main" xmlns:r="http://schemas.openxmlformats.org/officeDocument/2006/relationships" xmlns:p="http://schemas.openxmlformats.org/presentationml/2006/main">
+  <p:cSld>
+    <p:spTree>
+      <p:nvGrpSpPr>
+        <p:cNvPr id="1" name=""/>
+        <p:cNvGrpSpPr/>
+        <p:nvPr/>
+      </p:nvGrpSpPr>
+      <p:grpSpPr>
+        <a:xfrm>
+          <a:off x="0" y="0"/>
+          <a:ext cx="0" cy="0"/>
+          <a:chOff x="0" y="0"/>
+          <a:chExt cx="0" cy="0"/>
+        </a:xfrm>
+      </p:grpSpPr>
+      <p:sp>
+        <p:nvSpPr>
+          <p:cNvPr id="2" name="Titolo 1">
+            <a:extLst>
+              <a:ext uri="{FF2B5EF4-FFF2-40B4-BE49-F238E27FC236}">
+                <a16:creationId xmlns:a16="http://schemas.microsoft.com/office/drawing/2014/main" id="{2176569B-B555-40AE-AFED-874AD5008A4F}"/>
+              </a:ext>
+            </a:extLst>
+          </p:cNvPr>
+          <p:cNvSpPr>
+            <a:spLocks noGrp="1"/>
+          </p:cNvSpPr>
+          <p:nvPr>
+            <p:ph type="title"/>
+          </p:nvPr>
+        </p:nvSpPr>
+        <p:spPr/>
+        <p:txBody>
+          <a:bodyPr/>
+          <a:lstStyle/>
+          <a:p>
+            <a:endParaRPr lang="it-IT"/>
+          </a:p>
+        </p:txBody>
+      </p:sp>
+      <p:pic>
+        <p:nvPicPr>
+          <p:cNvPr id="4" name="Segnaposto contenuto 3">
+            <a:extLst>
+              <a:ext uri="{FF2B5EF4-FFF2-40B4-BE49-F238E27FC236}">
+                <a16:creationId xmlns:a16="http://schemas.microsoft.com/office/drawing/2014/main" id="{C97B5732-6EC4-4DBE-B750-0DEE6648561E}"/>
+              </a:ext>
+            </a:extLst>
+          </p:cNvPr>
+          <p:cNvPicPr>
+            <a:picLocks noGrp="1" noChangeAspect="1"/>
+          </p:cNvPicPr>
+          <p:nvPr>
+            <p:ph idx="1"/>
+          </p:nvPr>
+        </p:nvPicPr>
+        <p:blipFill>
+          <a:blip r:embed="rId2"/>
+          <a:stretch>
+            <a:fillRect/>
+          </a:stretch>
+        </p:blipFill>
+        <p:spPr>
+          <a:xfrm>
+            <a:off x="2053025" y="1825625"/>
+            <a:ext cx="8085950" cy="4351338"/>
+          </a:xfrm>
+          <a:prstGeom prst="rect">
+            <a:avLst/>
+          </a:prstGeom>
+        </p:spPr>
+      </p:pic>
+    </p:spTree>
+    <p:extLst>
+      <p:ext uri="{BB962C8B-B14F-4D97-AF65-F5344CB8AC3E}">
+        <p14:creationId xmlns:p14="http://schemas.microsoft.com/office/powerpoint/2010/main" val="1453051914"/>
+      </p:ext>
+    </p:extLst>
+  </p:cSld>
+  <p:clrMapOvr>
+    <a:masterClrMapping/>
+  </p:clrMapOvr>
+</p:sld>
+</file>
+
+<file path=ppt/slides/slide31.xml><?xml version="1.0" encoding="utf-8"?>
 <p:sld xmlns:a="http://schemas.openxmlformats.org/drawingml/2006/main" xmlns:r="http://schemas.openxmlformats.org/officeDocument/2006/relationships" xmlns:p="http://schemas.openxmlformats.org/presentationml/2006/main">
   <p:cSld>
     <p:bg>
@@ -10019,294 +11591,6 @@
   </p:cSld>
   <p:clrMapOvr>
     <a:overrideClrMapping bg1="dk1" tx1="lt1" bg2="dk2" tx2="lt2" accent1="accent1" accent2="accent2" accent3="accent3" accent4="accent4" accent5="accent5" accent6="accent6" hlink="hlink" folHlink="folHlink"/>
-  </p:clrMapOvr>
-</p:sld>
-</file>
-
-<file path=ppt/slides/slide3.xml><?xml version="1.0" encoding="utf-8"?>
-<p:sld xmlns:a="http://schemas.openxmlformats.org/drawingml/2006/main" xmlns:r="http://schemas.openxmlformats.org/officeDocument/2006/relationships" xmlns:p="http://schemas.openxmlformats.org/presentationml/2006/main">
-  <p:cSld>
-    <p:spTree>
-      <p:nvGrpSpPr>
-        <p:cNvPr id="1" name=""/>
-        <p:cNvGrpSpPr/>
-        <p:nvPr/>
-      </p:nvGrpSpPr>
-      <p:grpSpPr>
-        <a:xfrm>
-          <a:off x="0" y="0"/>
-          <a:ext cx="0" cy="0"/>
-          <a:chOff x="0" y="0"/>
-          <a:chExt cx="0" cy="0"/>
-        </a:xfrm>
-      </p:grpSpPr>
-      <p:pic>
-        <p:nvPicPr>
-          <p:cNvPr id="14" name="Picture 13">
-            <a:extLst>
-              <a:ext uri="{FF2B5EF4-FFF2-40B4-BE49-F238E27FC236}">
-                <a16:creationId xmlns:a16="http://schemas.microsoft.com/office/drawing/2014/main" id="{EDBA63DC-2BD3-894B-AA56-258568C68045}"/>
-              </a:ext>
-            </a:extLst>
-          </p:cNvPr>
-          <p:cNvPicPr>
-            <a:picLocks noChangeAspect="1"/>
-          </p:cNvPicPr>
-          <p:nvPr/>
-        </p:nvPicPr>
-        <p:blipFill>
-          <a:blip r:embed="rId2">
-            <a:alphaModFix amt="12000"/>
-            <a:extLst>
-              <a:ext uri="{28A0092B-C50C-407E-A947-70E740481C1C}">
-                <a14:useLocalDpi xmlns:a14="http://schemas.microsoft.com/office/drawing/2010/main" val="0"/>
-              </a:ext>
-            </a:extLst>
-          </a:blip>
-          <a:stretch>
-            <a:fillRect/>
-          </a:stretch>
-        </p:blipFill>
-        <p:spPr>
-          <a:xfrm>
-            <a:off x="4414469" y="-135467"/>
-            <a:ext cx="7494796" cy="6858000"/>
-          </a:xfrm>
-          <a:prstGeom prst="rect">
-            <a:avLst/>
-          </a:prstGeom>
-        </p:spPr>
-      </p:pic>
-      <p:sp>
-        <p:nvSpPr>
-          <p:cNvPr id="2" name="Titolo 1">
-            <a:extLst>
-              <a:ext uri="{FF2B5EF4-FFF2-40B4-BE49-F238E27FC236}">
-                <a16:creationId xmlns:a16="http://schemas.microsoft.com/office/drawing/2014/main" id="{7C3CD4E9-DB64-4918-82F7-8F8A8315170B}"/>
-              </a:ext>
-            </a:extLst>
-          </p:cNvPr>
-          <p:cNvSpPr>
-            <a:spLocks noGrp="1"/>
-          </p:cNvSpPr>
-          <p:nvPr>
-            <p:ph type="title"/>
-          </p:nvPr>
-        </p:nvSpPr>
-        <p:spPr>
-          <a:xfrm>
-            <a:off x="838200" y="0"/>
-            <a:ext cx="10515600" cy="1325563"/>
-          </a:xfrm>
-        </p:spPr>
-        <p:txBody>
-          <a:bodyPr/>
-          <a:lstStyle/>
-          <a:p>
-            <a:r>
-              <a:rPr lang="it-IT" dirty="0" err="1"/>
-              <a:t>Experimental</a:t>
-            </a:r>
-            <a:r>
-              <a:rPr lang="it-IT" dirty="0"/>
-              <a:t> Setup</a:t>
-            </a:r>
-          </a:p>
-        </p:txBody>
-      </p:sp>
-      <p:sp>
-        <p:nvSpPr>
-          <p:cNvPr id="3" name="Segnaposto contenuto 2">
-            <a:extLst>
-              <a:ext uri="{FF2B5EF4-FFF2-40B4-BE49-F238E27FC236}">
-                <a16:creationId xmlns:a16="http://schemas.microsoft.com/office/drawing/2014/main" id="{A3AA93D2-B2C6-4C4F-A26E-E69FFCB3F5B2}"/>
-              </a:ext>
-            </a:extLst>
-          </p:cNvPr>
-          <p:cNvSpPr>
-            <a:spLocks noGrp="1"/>
-          </p:cNvSpPr>
-          <p:nvPr>
-            <p:ph idx="1"/>
-          </p:nvPr>
-        </p:nvSpPr>
-        <p:spPr>
-          <a:xfrm>
-            <a:off x="838200" y="1825625"/>
-            <a:ext cx="10515600" cy="4351338"/>
-          </a:xfrm>
-        </p:spPr>
-        <p:txBody>
-          <a:bodyPr/>
-          <a:lstStyle/>
-          <a:p>
-            <a:r>
-              <a:rPr lang="it-IT" dirty="0"/>
-              <a:t>RNG </a:t>
-            </a:r>
-            <a:r>
-              <a:rPr lang="it-IT" dirty="0" err="1"/>
-              <a:t>seed</a:t>
-            </a:r>
-            <a:r>
-              <a:rPr lang="it-IT" dirty="0"/>
-              <a:t> </a:t>
-            </a:r>
-            <a:r>
-              <a:rPr lang="it-IT" dirty="0" err="1"/>
-              <a:t>fixed</a:t>
-            </a:r>
-            <a:r>
-              <a:rPr lang="it-IT" dirty="0"/>
-              <a:t> </a:t>
-            </a:r>
-            <a:r>
-              <a:rPr lang="it-IT" dirty="0" err="1"/>
-              <a:t>at</a:t>
-            </a:r>
-            <a:r>
-              <a:rPr lang="it-IT" dirty="0"/>
-              <a:t> 420 for </a:t>
-            </a:r>
-            <a:r>
-              <a:rPr lang="it-IT" dirty="0" err="1"/>
-              <a:t>all</a:t>
-            </a:r>
-            <a:r>
-              <a:rPr lang="it-IT" dirty="0"/>
-              <a:t> </a:t>
-            </a:r>
-            <a:r>
-              <a:rPr lang="it-IT" dirty="0" err="1"/>
-              <a:t>runs</a:t>
-            </a:r>
-            <a:r>
-              <a:rPr lang="it-IT" dirty="0"/>
-              <a:t> </a:t>
-            </a:r>
-          </a:p>
-          <a:p>
-            <a:r>
-              <a:rPr lang="it-IT" dirty="0" err="1"/>
-              <a:t>Size</a:t>
-            </a:r>
-            <a:r>
-              <a:rPr lang="it-IT" dirty="0"/>
-              <a:t> of </a:t>
-            </a:r>
-            <a:r>
-              <a:rPr lang="it-IT" dirty="0" err="1"/>
-              <a:t>bandit</a:t>
-            </a:r>
-            <a:r>
-              <a:rPr lang="it-IT" dirty="0"/>
-              <a:t> </a:t>
-            </a:r>
-            <a:r>
-              <a:rPr lang="it-IT" dirty="0" err="1"/>
-              <a:t>reward</a:t>
-            </a:r>
-            <a:r>
-              <a:rPr lang="it-IT" dirty="0"/>
-              <a:t> </a:t>
-            </a:r>
-            <a:r>
-              <a:rPr lang="it-IT" dirty="0" err="1"/>
-              <a:t>interval</a:t>
-            </a:r>
-            <a:r>
-              <a:rPr lang="it-IT" dirty="0"/>
-              <a:t> </a:t>
-            </a:r>
-            <a:r>
-              <a:rPr lang="it-IT" dirty="0" err="1"/>
-              <a:t>fixed</a:t>
-            </a:r>
-            <a:r>
-              <a:rPr lang="it-IT" dirty="0"/>
-              <a:t> </a:t>
-            </a:r>
-            <a:r>
-              <a:rPr lang="it-IT" dirty="0" err="1"/>
-              <a:t>at</a:t>
-            </a:r>
-            <a:r>
-              <a:rPr lang="it-IT" dirty="0"/>
-              <a:t> 8</a:t>
-            </a:r>
-          </a:p>
-          <a:p>
-            <a:r>
-              <a:rPr lang="it-IT" dirty="0" err="1"/>
-              <a:t>Interval</a:t>
-            </a:r>
-            <a:r>
-              <a:rPr lang="it-IT" dirty="0"/>
-              <a:t> </a:t>
-            </a:r>
-            <a:r>
-              <a:rPr lang="it-IT" dirty="0" err="1"/>
-              <a:t>mean</a:t>
-            </a:r>
-            <a:r>
-              <a:rPr lang="it-IT" dirty="0"/>
-              <a:t> </a:t>
-            </a:r>
-            <a:r>
-              <a:rPr lang="it-IT" dirty="0" err="1"/>
-              <a:t>ranging</a:t>
-            </a:r>
-            <a:r>
-              <a:rPr lang="it-IT" dirty="0"/>
-              <a:t> from 0-5</a:t>
-            </a:r>
-          </a:p>
-          <a:p>
-            <a:r>
-              <a:rPr lang="it-IT" dirty="0" err="1"/>
-              <a:t>Mean</a:t>
-            </a:r>
-            <a:r>
-              <a:rPr lang="it-IT" dirty="0"/>
-              <a:t> </a:t>
-            </a:r>
-            <a:r>
-              <a:rPr lang="it-IT" dirty="0" err="1"/>
-              <a:t>picked</a:t>
-            </a:r>
-            <a:r>
-              <a:rPr lang="it-IT" dirty="0"/>
-              <a:t> </a:t>
-            </a:r>
-            <a:r>
-              <a:rPr lang="it-IT" dirty="0" err="1"/>
-              <a:t>at</a:t>
-            </a:r>
-            <a:r>
-              <a:rPr lang="it-IT" dirty="0"/>
-              <a:t> random</a:t>
-            </a:r>
-          </a:p>
-          <a:p>
-            <a:pPr marL="0" indent="0">
-              <a:buNone/>
-            </a:pPr>
-            <a:endParaRPr lang="it-IT" dirty="0"/>
-          </a:p>
-          <a:p>
-            <a:endParaRPr lang="it-IT" dirty="0"/>
-          </a:p>
-        </p:txBody>
-      </p:sp>
-    </p:spTree>
-    <p:extLst>
-      <p:ext uri="{BB962C8B-B14F-4D97-AF65-F5344CB8AC3E}">
-        <p14:creationId xmlns:p14="http://schemas.microsoft.com/office/powerpoint/2010/main" val="1747367825"/>
-      </p:ext>
-    </p:extLst>
-  </p:cSld>
-  <p:clrMapOvr>
-    <a:masterClrMapping/>
   </p:clrMapOvr>
 </p:sld>
 </file>

</xml_diff>

<commit_message>
Add cart pole code (need to check if it work)
</commit_message>
<xml_diff>
--- a/Presentation/SDU_SummerSchool_Presentation.pptx
+++ b/Presentation/SDU_SummerSchool_Presentation.pptx
@@ -5,7 +5,7 @@
     <p:sldMasterId id="2147483648" r:id="rId1"/>
   </p:sldMasterIdLst>
   <p:notesMasterIdLst>
-    <p:notesMasterId r:id="rId36"/>
+    <p:notesMasterId r:id="rId39"/>
   </p:notesMasterIdLst>
   <p:sldIdLst>
     <p:sldId id="256" r:id="rId2"/>
@@ -42,6 +42,9 @@
     <p:sldId id="292" r:id="rId33"/>
     <p:sldId id="294" r:id="rId34"/>
     <p:sldId id="293" r:id="rId35"/>
+    <p:sldId id="296" r:id="rId36"/>
+    <p:sldId id="295" r:id="rId37"/>
+    <p:sldId id="297" r:id="rId38"/>
   </p:sldIdLst>
   <p:sldSz cx="12192000" cy="6858000"/>
   <p:notesSz cx="6858000" cy="9144000"/>
@@ -242,7 +245,7 @@
           <a:p>
             <a:fld id="{7F514130-6DE0-4058-955F-50E582727B09}" type="datetimeFigureOut">
               <a:rPr lang="it-IT" smtClean="0"/>
-              <a:t>15/08/2019</a:t>
+              <a:t>16/08/2019</a:t>
             </a:fld>
             <a:endParaRPr lang="it-IT"/>
           </a:p>
@@ -2012,7 +2015,7 @@
           <a:p>
             <a:fld id="{8173B6D1-B9A7-4F74-ADCF-EF56F696349F}" type="datetimeFigureOut">
               <a:rPr lang="it-IT" smtClean="0"/>
-              <a:t>15/08/2019</a:t>
+              <a:t>16/08/2019</a:t>
             </a:fld>
             <a:endParaRPr lang="it-IT"/>
           </a:p>
@@ -2210,7 +2213,7 @@
           <a:p>
             <a:fld id="{8173B6D1-B9A7-4F74-ADCF-EF56F696349F}" type="datetimeFigureOut">
               <a:rPr lang="it-IT" smtClean="0"/>
-              <a:t>15/08/2019</a:t>
+              <a:t>16/08/2019</a:t>
             </a:fld>
             <a:endParaRPr lang="it-IT"/>
           </a:p>
@@ -2418,7 +2421,7 @@
           <a:p>
             <a:fld id="{8173B6D1-B9A7-4F74-ADCF-EF56F696349F}" type="datetimeFigureOut">
               <a:rPr lang="it-IT" smtClean="0"/>
-              <a:t>15/08/2019</a:t>
+              <a:t>16/08/2019</a:t>
             </a:fld>
             <a:endParaRPr lang="it-IT"/>
           </a:p>
@@ -2616,7 +2619,7 @@
           <a:p>
             <a:fld id="{8173B6D1-B9A7-4F74-ADCF-EF56F696349F}" type="datetimeFigureOut">
               <a:rPr lang="it-IT" smtClean="0"/>
-              <a:t>15/08/2019</a:t>
+              <a:t>16/08/2019</a:t>
             </a:fld>
             <a:endParaRPr lang="it-IT"/>
           </a:p>
@@ -2891,7 +2894,7 @@
           <a:p>
             <a:fld id="{8173B6D1-B9A7-4F74-ADCF-EF56F696349F}" type="datetimeFigureOut">
               <a:rPr lang="it-IT" smtClean="0"/>
-              <a:t>15/08/2019</a:t>
+              <a:t>16/08/2019</a:t>
             </a:fld>
             <a:endParaRPr lang="it-IT"/>
           </a:p>
@@ -3156,7 +3159,7 @@
           <a:p>
             <a:fld id="{8173B6D1-B9A7-4F74-ADCF-EF56F696349F}" type="datetimeFigureOut">
               <a:rPr lang="it-IT" smtClean="0"/>
-              <a:t>15/08/2019</a:t>
+              <a:t>16/08/2019</a:t>
             </a:fld>
             <a:endParaRPr lang="it-IT"/>
           </a:p>
@@ -3568,7 +3571,7 @@
           <a:p>
             <a:fld id="{8173B6D1-B9A7-4F74-ADCF-EF56F696349F}" type="datetimeFigureOut">
               <a:rPr lang="it-IT" smtClean="0"/>
-              <a:t>15/08/2019</a:t>
+              <a:t>16/08/2019</a:t>
             </a:fld>
             <a:endParaRPr lang="it-IT"/>
           </a:p>
@@ -3709,7 +3712,7 @@
           <a:p>
             <a:fld id="{8173B6D1-B9A7-4F74-ADCF-EF56F696349F}" type="datetimeFigureOut">
               <a:rPr lang="it-IT" smtClean="0"/>
-              <a:t>15/08/2019</a:t>
+              <a:t>16/08/2019</a:t>
             </a:fld>
             <a:endParaRPr lang="it-IT"/>
           </a:p>
@@ -3822,7 +3825,7 @@
           <a:p>
             <a:fld id="{8173B6D1-B9A7-4F74-ADCF-EF56F696349F}" type="datetimeFigureOut">
               <a:rPr lang="it-IT" smtClean="0"/>
-              <a:t>15/08/2019</a:t>
+              <a:t>16/08/2019</a:t>
             </a:fld>
             <a:endParaRPr lang="it-IT"/>
           </a:p>
@@ -4133,7 +4136,7 @@
           <a:p>
             <a:fld id="{8173B6D1-B9A7-4F74-ADCF-EF56F696349F}" type="datetimeFigureOut">
               <a:rPr lang="it-IT" smtClean="0"/>
-              <a:t>15/08/2019</a:t>
+              <a:t>16/08/2019</a:t>
             </a:fld>
             <a:endParaRPr lang="it-IT"/>
           </a:p>
@@ -4421,7 +4424,7 @@
           <a:p>
             <a:fld id="{8173B6D1-B9A7-4F74-ADCF-EF56F696349F}" type="datetimeFigureOut">
               <a:rPr lang="it-IT" smtClean="0"/>
-              <a:t>15/08/2019</a:t>
+              <a:t>16/08/2019</a:t>
             </a:fld>
             <a:endParaRPr lang="it-IT"/>
           </a:p>
@@ -4662,7 +4665,7 @@
           <a:p>
             <a:fld id="{8173B6D1-B9A7-4F74-ADCF-EF56F696349F}" type="datetimeFigureOut">
               <a:rPr lang="it-IT" smtClean="0"/>
-              <a:t>15/08/2019</a:t>
+              <a:t>16/08/2019</a:t>
             </a:fld>
             <a:endParaRPr lang="it-IT"/>
           </a:p>
@@ -10692,8 +10695,8 @@
           </a:p>
         </p:txBody>
       </p:sp>
-      <mc:AlternateContent xmlns:mc="http://schemas.openxmlformats.org/markup-compatibility/2006">
-        <mc:Choice xmlns:a14="http://schemas.microsoft.com/office/drawing/2010/main" Requires="a14">
+      <mc:AlternateContent xmlns:mc="http://schemas.openxmlformats.org/markup-compatibility/2006" xmlns:a14="http://schemas.microsoft.com/office/drawing/2010/main">
+        <mc:Choice Requires="a14">
           <p:sp>
             <p:nvSpPr>
               <p:cNvPr id="3" name="Segnaposto contenuto 2">
@@ -10909,7 +10912,7 @@
             </p:txBody>
           </p:sp>
         </mc:Choice>
-        <mc:Fallback>
+        <mc:Fallback xmlns="">
           <p:sp>
             <p:nvSpPr>
               <p:cNvPr id="3" name="Segnaposto contenuto 2">
@@ -13084,8 +13087,8 @@
           </a:p>
         </p:txBody>
       </p:sp>
-      <mc:AlternateContent xmlns:mc="http://schemas.openxmlformats.org/markup-compatibility/2006">
-        <mc:Choice xmlns:a14="http://schemas.microsoft.com/office/drawing/2010/main" Requires="a14">
+      <mc:AlternateContent xmlns:mc="http://schemas.openxmlformats.org/markup-compatibility/2006" xmlns:a14="http://schemas.microsoft.com/office/drawing/2010/main">
+        <mc:Choice Requires="a14">
           <p:sp>
             <p:nvSpPr>
               <p:cNvPr id="3" name="Segnaposto contenuto 2">
@@ -13175,7 +13178,7 @@
             </p:txBody>
           </p:sp>
         </mc:Choice>
-        <mc:Fallback>
+        <mc:Fallback xmlns="">
           <p:sp>
             <p:nvSpPr>
               <p:cNvPr id="3" name="Segnaposto contenuto 2">
@@ -14036,6 +14039,414 @@
     <p:extLst>
       <p:ext uri="{BB962C8B-B14F-4D97-AF65-F5344CB8AC3E}">
         <p14:creationId xmlns:p14="http://schemas.microsoft.com/office/powerpoint/2010/main" val="3006794094"/>
+      </p:ext>
+    </p:extLst>
+  </p:cSld>
+  <p:clrMapOvr>
+    <a:masterClrMapping/>
+  </p:clrMapOvr>
+</p:sld>
+</file>
+
+<file path=ppt/slides/slide35.xml><?xml version="1.0" encoding="utf-8"?>
+<p:sld xmlns:a="http://schemas.openxmlformats.org/drawingml/2006/main" xmlns:r="http://schemas.openxmlformats.org/officeDocument/2006/relationships" xmlns:p="http://schemas.openxmlformats.org/presentationml/2006/main">
+  <p:cSld>
+    <p:bg>
+      <p:bgPr>
+        <a:solidFill>
+          <a:schemeClr val="tx1"/>
+        </a:solidFill>
+        <a:effectLst/>
+      </p:bgPr>
+    </p:bg>
+    <p:spTree>
+      <p:nvGrpSpPr>
+        <p:cNvPr id="1" name=""/>
+        <p:cNvGrpSpPr/>
+        <p:nvPr/>
+      </p:nvGrpSpPr>
+      <p:grpSpPr>
+        <a:xfrm>
+          <a:off x="0" y="0"/>
+          <a:ext cx="0" cy="0"/>
+          <a:chOff x="0" y="0"/>
+          <a:chExt cx="0" cy="0"/>
+        </a:xfrm>
+      </p:grpSpPr>
+      <p:sp>
+        <p:nvSpPr>
+          <p:cNvPr id="73" name="Rectangle 72">
+            <a:extLst>
+              <a:ext uri="{FF2B5EF4-FFF2-40B4-BE49-F238E27FC236}">
+                <a16:creationId xmlns:a16="http://schemas.microsoft.com/office/drawing/2014/main" id="{867D4867-5BA7-4462-B2F6-A23F4A622AA7}"/>
+              </a:ext>
+              <a:ext uri="{C183D7F6-B498-43B3-948B-1728B52AA6E4}">
+                <adec:decorative xmlns:adec="http://schemas.microsoft.com/office/drawing/2017/decorative" val="1"/>
+              </a:ext>
+            </a:extLst>
+          </p:cNvPr>
+          <p:cNvSpPr>
+            <a:spLocks noGrp="1" noRot="1" noChangeAspect="1" noMove="1" noResize="1" noEditPoints="1" noAdjustHandles="1" noChangeArrowheads="1" noChangeShapeType="1" noTextEdit="1"/>
+          </p:cNvSpPr>
+          <p:nvPr>
+            <p:extLst>
+              <p:ext uri="{386F3935-93C4-4BCD-93E2-E3B085C9AB24}">
+                <p16:designElem xmlns:p16="http://schemas.microsoft.com/office/powerpoint/2015/main" val="1"/>
+              </p:ext>
+            </p:extLst>
+          </p:nvPr>
+        </p:nvSpPr>
+        <p:spPr>
+          <a:xfrm>
+            <a:off x="0" y="0"/>
+            <a:ext cx="4654296" cy="6858000"/>
+          </a:xfrm>
+          <a:prstGeom prst="rect">
+            <a:avLst/>
+          </a:prstGeom>
+          <a:solidFill>
+            <a:srgbClr val="3F3F3F"/>
+          </a:solidFill>
+          <a:ln>
+            <a:noFill/>
+          </a:ln>
+        </p:spPr>
+        <p:style>
+          <a:lnRef idx="0">
+            <a:scrgbClr r="0" g="0" b="0"/>
+          </a:lnRef>
+          <a:fillRef idx="0">
+            <a:scrgbClr r="0" g="0" b="0"/>
+          </a:fillRef>
+          <a:effectRef idx="0">
+            <a:scrgbClr r="0" g="0" b="0"/>
+          </a:effectRef>
+          <a:fontRef idx="minor">
+            <a:schemeClr val="lt1"/>
+          </a:fontRef>
+        </p:style>
+        <p:txBody>
+          <a:bodyPr rtlCol="0" anchor="ctr"/>
+          <a:lstStyle/>
+          <a:p>
+            <a:pPr algn="ctr"/>
+            <a:endParaRPr lang="en-US" dirty="0"/>
+          </a:p>
+        </p:txBody>
+      </p:sp>
+      <p:sp>
+        <p:nvSpPr>
+          <p:cNvPr id="2" name="Titolo 1">
+            <a:extLst>
+              <a:ext uri="{FF2B5EF4-FFF2-40B4-BE49-F238E27FC236}">
+                <a16:creationId xmlns:a16="http://schemas.microsoft.com/office/drawing/2014/main" id="{1149EC29-349C-4442-9C49-A4F0B810A158}"/>
+              </a:ext>
+            </a:extLst>
+          </p:cNvPr>
+          <p:cNvSpPr>
+            <a:spLocks noGrp="1"/>
+          </p:cNvSpPr>
+          <p:nvPr>
+            <p:ph type="title"/>
+          </p:nvPr>
+        </p:nvSpPr>
+        <p:spPr>
+          <a:xfrm>
+            <a:off x="643468" y="623392"/>
+            <a:ext cx="3363974" cy="1607060"/>
+          </a:xfrm>
+          <a:noFill/>
+          <a:ln w="19050">
+            <a:solidFill>
+              <a:schemeClr val="tx1"/>
+            </a:solidFill>
+          </a:ln>
+        </p:spPr>
+        <p:txBody>
+          <a:bodyPr wrap="square" anchor="ctr">
+            <a:normAutofit/>
+          </a:bodyPr>
+          <a:lstStyle/>
+          <a:p>
+            <a:pPr algn="ctr"/>
+            <a:r>
+              <a:rPr lang="it-IT" sz="2800" dirty="0" err="1"/>
+              <a:t>Exercise</a:t>
+            </a:r>
+            <a:r>
+              <a:rPr lang="it-IT" sz="2800" dirty="0"/>
+              <a:t> 4 – Control of </a:t>
+            </a:r>
+            <a:r>
+              <a:rPr lang="it-IT" sz="2800" dirty="0" err="1"/>
+              <a:t>invers</a:t>
+            </a:r>
+            <a:r>
+              <a:rPr lang="it-IT" sz="2800" dirty="0"/>
+              <a:t> </a:t>
+            </a:r>
+            <a:r>
+              <a:rPr lang="it-IT" sz="2800" dirty="0" err="1"/>
+              <a:t>pendulum</a:t>
+            </a:r>
+            <a:r>
+              <a:rPr lang="it-IT" sz="2800" dirty="0"/>
+              <a:t> with FD</a:t>
+            </a:r>
+          </a:p>
+        </p:txBody>
+      </p:sp>
+      <p:pic>
+        <p:nvPicPr>
+          <p:cNvPr id="2050" name="Picture 2" descr="Risultati immagini per invert pendulum real">
+            <a:extLst>
+              <a:ext uri="{FF2B5EF4-FFF2-40B4-BE49-F238E27FC236}">
+                <a16:creationId xmlns:a16="http://schemas.microsoft.com/office/drawing/2014/main" id="{516E839A-12E6-4FF4-8D32-3F45E857274F}"/>
+              </a:ext>
+            </a:extLst>
+          </p:cNvPr>
+          <p:cNvPicPr>
+            <a:picLocks noChangeAspect="1" noChangeArrowheads="1"/>
+          </p:cNvPicPr>
+          <p:nvPr/>
+        </p:nvPicPr>
+        <p:blipFill>
+          <a:blip r:embed="rId2">
+            <a:extLst>
+              <a:ext uri="{28A0092B-C50C-407E-A947-70E740481C1C}">
+                <a14:useLocalDpi xmlns:a14="http://schemas.microsoft.com/office/drawing/2010/main" val="0"/>
+              </a:ext>
+            </a:extLst>
+          </a:blip>
+          <a:srcRect/>
+          <a:stretch>
+            <a:fillRect/>
+          </a:stretch>
+        </p:blipFill>
+        <p:spPr bwMode="auto">
+          <a:xfrm>
+            <a:off x="7129741" y="1367227"/>
+            <a:ext cx="2830183" cy="4123546"/>
+          </a:xfrm>
+          <a:prstGeom prst="rect">
+            <a:avLst/>
+          </a:prstGeom>
+          <a:noFill/>
+          <a:extLst>
+            <a:ext uri="{909E8E84-426E-40DD-AFC4-6F175D3DCCD1}">
+              <a14:hiddenFill xmlns:a14="http://schemas.microsoft.com/office/drawing/2010/main">
+                <a:solidFill>
+                  <a:srgbClr val="FFFFFF"/>
+                </a:solidFill>
+              </a14:hiddenFill>
+            </a:ext>
+          </a:extLst>
+        </p:spPr>
+      </p:pic>
+    </p:spTree>
+    <p:extLst>
+      <p:ext uri="{BB962C8B-B14F-4D97-AF65-F5344CB8AC3E}">
+        <p14:creationId xmlns:p14="http://schemas.microsoft.com/office/powerpoint/2010/main" val="1498284276"/>
+      </p:ext>
+    </p:extLst>
+  </p:cSld>
+  <p:clrMapOvr>
+    <a:overrideClrMapping bg1="dk1" tx1="lt1" bg2="dk2" tx2="lt2" accent1="accent1" accent2="accent2" accent3="accent3" accent4="accent4" accent5="accent5" accent6="accent6" hlink="hlink" folHlink="folHlink"/>
+  </p:clrMapOvr>
+</p:sld>
+</file>
+
+<file path=ppt/slides/slide36.xml><?xml version="1.0" encoding="utf-8"?>
+<p:sld xmlns:a="http://schemas.openxmlformats.org/drawingml/2006/main" xmlns:r="http://schemas.openxmlformats.org/officeDocument/2006/relationships" xmlns:p="http://schemas.openxmlformats.org/presentationml/2006/main">
+  <p:cSld>
+    <p:spTree>
+      <p:nvGrpSpPr>
+        <p:cNvPr id="1" name=""/>
+        <p:cNvGrpSpPr/>
+        <p:nvPr/>
+      </p:nvGrpSpPr>
+      <p:grpSpPr>
+        <a:xfrm>
+          <a:off x="0" y="0"/>
+          <a:ext cx="0" cy="0"/>
+          <a:chOff x="0" y="0"/>
+          <a:chExt cx="0" cy="0"/>
+        </a:xfrm>
+      </p:grpSpPr>
+      <p:sp>
+        <p:nvSpPr>
+          <p:cNvPr id="4" name="CasellaDiTesto 3">
+            <a:extLst>
+              <a:ext uri="{FF2B5EF4-FFF2-40B4-BE49-F238E27FC236}">
+                <a16:creationId xmlns:a16="http://schemas.microsoft.com/office/drawing/2014/main" id="{628C399B-1722-4863-B7C0-12321A2CDBA7}"/>
+              </a:ext>
+            </a:extLst>
+          </p:cNvPr>
+          <p:cNvSpPr txBox="1"/>
+          <p:nvPr/>
+        </p:nvSpPr>
+        <p:spPr>
+          <a:xfrm>
+            <a:off x="1055076" y="2844225"/>
+            <a:ext cx="4562467" cy="584775"/>
+          </a:xfrm>
+          <a:prstGeom prst="rect">
+            <a:avLst/>
+          </a:prstGeom>
+          <a:noFill/>
+        </p:spPr>
+        <p:txBody>
+          <a:bodyPr wrap="none" rtlCol="0">
+            <a:spAutoFit/>
+          </a:bodyPr>
+          <a:lstStyle/>
+          <a:p>
+            <a:r>
+              <a:rPr lang="it-IT" sz="3200" dirty="0"/>
+              <a:t>Still under </a:t>
+            </a:r>
+            <a:r>
+              <a:rPr lang="it-IT" sz="3200" dirty="0" err="1"/>
+              <a:t>construction</a:t>
+            </a:r>
+            <a:r>
+              <a:rPr lang="it-IT" sz="3200" dirty="0"/>
+              <a:t>…..</a:t>
+            </a:r>
+          </a:p>
+        </p:txBody>
+      </p:sp>
+    </p:spTree>
+    <p:extLst>
+      <p:ext uri="{BB962C8B-B14F-4D97-AF65-F5344CB8AC3E}">
+        <p14:creationId xmlns:p14="http://schemas.microsoft.com/office/powerpoint/2010/main" val="1568540037"/>
+      </p:ext>
+    </p:extLst>
+  </p:cSld>
+  <p:clrMapOvr>
+    <a:masterClrMapping/>
+  </p:clrMapOvr>
+</p:sld>
+</file>
+
+<file path=ppt/slides/slide37.xml><?xml version="1.0" encoding="utf-8"?>
+<p:sld xmlns:a="http://schemas.openxmlformats.org/drawingml/2006/main" xmlns:r="http://schemas.openxmlformats.org/officeDocument/2006/relationships" xmlns:p="http://schemas.openxmlformats.org/presentationml/2006/main">
+  <p:cSld>
+    <p:spTree>
+      <p:nvGrpSpPr>
+        <p:cNvPr id="1" name=""/>
+        <p:cNvGrpSpPr/>
+        <p:nvPr/>
+      </p:nvGrpSpPr>
+      <p:grpSpPr>
+        <a:xfrm>
+          <a:off x="0" y="0"/>
+          <a:ext cx="0" cy="0"/>
+          <a:chOff x="0" y="0"/>
+          <a:chExt cx="0" cy="0"/>
+        </a:xfrm>
+      </p:grpSpPr>
+      <p:sp>
+        <p:nvSpPr>
+          <p:cNvPr id="4" name="CasellaDiTesto 3">
+            <a:extLst>
+              <a:ext uri="{FF2B5EF4-FFF2-40B4-BE49-F238E27FC236}">
+                <a16:creationId xmlns:a16="http://schemas.microsoft.com/office/drawing/2014/main" id="{BE183F09-43AF-40EA-9774-864843E95221}"/>
+              </a:ext>
+            </a:extLst>
+          </p:cNvPr>
+          <p:cNvSpPr txBox="1"/>
+          <p:nvPr/>
+        </p:nvSpPr>
+        <p:spPr>
+          <a:xfrm>
+            <a:off x="2926080" y="2293034"/>
+            <a:ext cx="3094501" cy="707886"/>
+          </a:xfrm>
+          <a:prstGeom prst="rect">
+            <a:avLst/>
+          </a:prstGeom>
+          <a:noFill/>
+        </p:spPr>
+        <p:txBody>
+          <a:bodyPr wrap="none" rtlCol="0">
+            <a:spAutoFit/>
+          </a:bodyPr>
+          <a:lstStyle/>
+          <a:p>
+            <a:r>
+              <a:rPr lang="it-IT" sz="4000" dirty="0"/>
+              <a:t>Thank </a:t>
+            </a:r>
+            <a:r>
+              <a:rPr lang="it-IT" sz="4000" dirty="0" err="1"/>
+              <a:t>you</a:t>
+            </a:r>
+            <a:r>
+              <a:rPr lang="it-IT" sz="4000" dirty="0"/>
+              <a:t> </a:t>
+            </a:r>
+            <a:r>
+              <a:rPr lang="it-IT" sz="4000" dirty="0" err="1"/>
+              <a:t>all</a:t>
+            </a:r>
+            <a:r>
+              <a:rPr lang="it-IT" sz="4000" dirty="0"/>
+              <a:t>!</a:t>
+            </a:r>
+          </a:p>
+        </p:txBody>
+      </p:sp>
+      <p:sp>
+        <p:nvSpPr>
+          <p:cNvPr id="5" name="Smile 4">
+            <a:extLst>
+              <a:ext uri="{FF2B5EF4-FFF2-40B4-BE49-F238E27FC236}">
+                <a16:creationId xmlns:a16="http://schemas.microsoft.com/office/drawing/2014/main" id="{C5813784-AB46-49E3-A9F2-35ACD33B0C73}"/>
+              </a:ext>
+            </a:extLst>
+          </p:cNvPr>
+          <p:cNvSpPr/>
+          <p:nvPr/>
+        </p:nvSpPr>
+        <p:spPr>
+          <a:xfrm>
+            <a:off x="7287065" y="1845118"/>
+            <a:ext cx="1519310" cy="1603717"/>
+          </a:xfrm>
+          <a:prstGeom prst="smileyFace">
+            <a:avLst/>
+          </a:prstGeom>
+        </p:spPr>
+        <p:style>
+          <a:lnRef idx="2">
+            <a:schemeClr val="accent1">
+              <a:shade val="50000"/>
+            </a:schemeClr>
+          </a:lnRef>
+          <a:fillRef idx="1">
+            <a:schemeClr val="accent1"/>
+          </a:fillRef>
+          <a:effectRef idx="0">
+            <a:schemeClr val="accent1"/>
+          </a:effectRef>
+          <a:fontRef idx="minor">
+            <a:schemeClr val="lt1"/>
+          </a:fontRef>
+        </p:style>
+        <p:txBody>
+          <a:bodyPr rtlCol="0" anchor="ctr"/>
+          <a:lstStyle/>
+          <a:p>
+            <a:pPr algn="ctr"/>
+            <a:endParaRPr lang="it-IT"/>
+          </a:p>
+        </p:txBody>
+      </p:sp>
+    </p:spTree>
+    <p:extLst>
+      <p:ext uri="{BB962C8B-B14F-4D97-AF65-F5344CB8AC3E}">
+        <p14:creationId xmlns:p14="http://schemas.microsoft.com/office/powerpoint/2010/main" val="530885589"/>
       </p:ext>
     </p:extLst>
   </p:cSld>

</xml_diff>